<commit_message>
Finish first draft of part 1
</commit_message>
<xml_diff>
--- a/ppt/medium.pptx
+++ b/ppt/medium.pptx
@@ -6,6 +6,16 @@
   </p:sldMasterIdLst>
   <p:sldIdLst>
     <p:sldId id="256" r:id="rId2"/>
+    <p:sldId id="257" r:id="rId3"/>
+    <p:sldId id="258" r:id="rId4"/>
+    <p:sldId id="259" r:id="rId5"/>
+    <p:sldId id="260" r:id="rId6"/>
+    <p:sldId id="261" r:id="rId7"/>
+    <p:sldId id="262" r:id="rId8"/>
+    <p:sldId id="263" r:id="rId9"/>
+    <p:sldId id="264" r:id="rId10"/>
+    <p:sldId id="265" r:id="rId11"/>
+    <p:sldId id="266" r:id="rId12"/>
   </p:sldIdLst>
   <p:sldSz cx="12192000" cy="6858000"/>
   <p:notesSz cx="6858000" cy="9144000"/>
@@ -104,6 +114,11 @@
       </a:defRPr>
     </a:lvl9pPr>
   </p:defaultTextStyle>
+  <p:extLst>
+    <p:ext uri="{EFAFB233-063F-42B5-8137-9DF3F51BA10A}">
+      <p15:sldGuideLst xmlns:p15="http://schemas.microsoft.com/office/powerpoint/2012/main"/>
+    </p:ext>
+  </p:extLst>
 </p:presentation>
 </file>
 
@@ -2919,48 +2934,2763 @@
           <a:chExt cx="0" cy="0"/>
         </a:xfrm>
       </p:grpSpPr>
-      <p:sp>
-        <p:nvSpPr>
-          <p:cNvPr id="2" name="Title 1"/>
-          <p:cNvSpPr>
-            <a:spLocks noGrp="1"/>
-          </p:cNvSpPr>
-          <p:nvPr>
-            <p:ph type="ctrTitle"/>
-          </p:nvPr>
-        </p:nvSpPr>
-        <p:spPr/>
-        <p:txBody>
-          <a:bodyPr/>
-          <a:lstStyle/>
-          <a:p>
-            <a:endParaRPr lang="en-US"/>
-          </a:p>
-        </p:txBody>
-      </p:sp>
-      <p:sp>
-        <p:nvSpPr>
-          <p:cNvPr id="3" name="Subtitle 2"/>
-          <p:cNvSpPr>
-            <a:spLocks noGrp="1"/>
-          </p:cNvSpPr>
-          <p:nvPr>
-            <p:ph type="subTitle" idx="1"/>
-          </p:nvPr>
-        </p:nvSpPr>
-        <p:spPr/>
-        <p:txBody>
-          <a:bodyPr/>
-          <a:lstStyle/>
-          <a:p>
-            <a:endParaRPr lang="en-US"/>
-          </a:p>
-        </p:txBody>
-      </p:sp>
+      <p:pic>
+        <p:nvPicPr>
+          <p:cNvPr id="8" name="Picture 7"/>
+          <p:cNvPicPr>
+            <a:picLocks noChangeAspect="1"/>
+          </p:cNvPicPr>
+          <p:nvPr/>
+        </p:nvPicPr>
+        <p:blipFill>
+          <a:blip r:embed="rId2">
+            <a:extLst>
+              <a:ext uri="{28A0092B-C50C-407E-A947-70E740481C1C}">
+                <a14:useLocalDpi xmlns:a14="http://schemas.microsoft.com/office/drawing/2010/main" val="0"/>
+              </a:ext>
+            </a:extLst>
+          </a:blip>
+          <a:stretch>
+            <a:fillRect/>
+          </a:stretch>
+        </p:blipFill>
+        <p:spPr>
+          <a:xfrm>
+            <a:off x="769668" y="1266645"/>
+            <a:ext cx="7823200" cy="3048000"/>
+          </a:xfrm>
+          <a:prstGeom prst="rect">
+            <a:avLst/>
+          </a:prstGeom>
+        </p:spPr>
+      </p:pic>
+      <p:pic>
+        <p:nvPicPr>
+          <p:cNvPr id="10" name="Picture 9"/>
+          <p:cNvPicPr>
+            <a:picLocks noChangeAspect="1"/>
+          </p:cNvPicPr>
+          <p:nvPr/>
+        </p:nvPicPr>
+        <p:blipFill>
+          <a:blip r:embed="rId3">
+            <a:extLst>
+              <a:ext uri="{28A0092B-C50C-407E-A947-70E740481C1C}">
+                <a14:useLocalDpi xmlns:a14="http://schemas.microsoft.com/office/drawing/2010/main" val="0"/>
+              </a:ext>
+            </a:extLst>
+          </a:blip>
+          <a:stretch>
+            <a:fillRect/>
+          </a:stretch>
+        </p:blipFill>
+        <p:spPr>
+          <a:xfrm>
+            <a:off x="934049" y="657045"/>
+            <a:ext cx="7874000" cy="609600"/>
+          </a:xfrm>
+          <a:prstGeom prst="rect">
+            <a:avLst/>
+          </a:prstGeom>
+        </p:spPr>
+      </p:pic>
     </p:spTree>
     <p:extLst>
       <p:ext uri="{BB962C8B-B14F-4D97-AF65-F5344CB8AC3E}">
         <p14:creationId xmlns:p14="http://schemas.microsoft.com/office/powerpoint/2010/main" val="1166999986"/>
+      </p:ext>
+    </p:extLst>
+  </p:cSld>
+  <p:clrMapOvr>
+    <a:masterClrMapping/>
+  </p:clrMapOvr>
+</p:sld>
+</file>
+
+<file path=ppt/slides/slide10.xml><?xml version="1.0" encoding="utf-8"?>
+<p:sld xmlns:a="http://schemas.openxmlformats.org/drawingml/2006/main" xmlns:r="http://schemas.openxmlformats.org/officeDocument/2006/relationships" xmlns:p="http://schemas.openxmlformats.org/presentationml/2006/main">
+  <p:cSld>
+    <p:spTree>
+      <p:nvGrpSpPr>
+        <p:cNvPr id="1" name=""/>
+        <p:cNvGrpSpPr/>
+        <p:nvPr/>
+      </p:nvGrpSpPr>
+      <p:grpSpPr>
+        <a:xfrm>
+          <a:off x="0" y="0"/>
+          <a:ext cx="0" cy="0"/>
+          <a:chOff x="0" y="0"/>
+          <a:chExt cx="0" cy="0"/>
+        </a:xfrm>
+      </p:grpSpPr>
+      <p:graphicFrame>
+        <p:nvGraphicFramePr>
+          <p:cNvPr id="2" name="Table 1"/>
+          <p:cNvGraphicFramePr>
+            <a:graphicFrameLocks noGrp="1"/>
+          </p:cNvGraphicFramePr>
+          <p:nvPr>
+            <p:extLst>
+              <p:ext uri="{D42A27DB-BD31-4B8C-83A1-F6EECF244321}">
+                <p14:modId xmlns:p14="http://schemas.microsoft.com/office/powerpoint/2010/main" val="797761269"/>
+              </p:ext>
+            </p:extLst>
+          </p:nvPr>
+        </p:nvGraphicFramePr>
+        <p:xfrm>
+          <a:off x="4210957" y="2754007"/>
+          <a:ext cx="4163786" cy="3099754"/>
+        </p:xfrm>
+        <a:graphic>
+          <a:graphicData uri="http://schemas.openxmlformats.org/drawingml/2006/table">
+            <a:tbl>
+              <a:tblPr/>
+              <a:tblGrid>
+                <a:gridCol w="2081893"/>
+                <a:gridCol w="2081893"/>
+              </a:tblGrid>
+              <a:tr h="679198">
+                <a:tc>
+                  <a:txBody>
+                    <a:bodyPr/>
+                    <a:lstStyle/>
+                    <a:p>
+                      <a:pPr algn="ctr" fontAlgn="b"/>
+                      <a:endParaRPr lang="en-US" sz="2400" b="0" i="0" u="none" strike="noStrike">
+                        <a:solidFill>
+                          <a:srgbClr val="000000"/>
+                        </a:solidFill>
+                        <a:effectLst/>
+                        <a:latin typeface="Calibri" charset="0"/>
+                      </a:endParaRPr>
+                    </a:p>
+                  </a:txBody>
+                  <a:tcPr marL="10767" marR="10767" marT="10767" marB="0" anchor="ctr">
+                    <a:lnL w="6350" cap="flat" cmpd="sng" algn="ctr">
+                      <a:solidFill>
+                        <a:srgbClr val="000000"/>
+                      </a:solidFill>
+                      <a:prstDash val="solid"/>
+                      <a:round/>
+                      <a:headEnd type="none" w="med" len="med"/>
+                      <a:tailEnd type="none" w="med" len="med"/>
+                    </a:lnL>
+                    <a:lnR w="6350" cap="flat" cmpd="sng" algn="ctr">
+                      <a:solidFill>
+                        <a:srgbClr val="000000"/>
+                      </a:solidFill>
+                      <a:prstDash val="solid"/>
+                      <a:round/>
+                      <a:headEnd type="none" w="med" len="med"/>
+                      <a:tailEnd type="none" w="med" len="med"/>
+                    </a:lnR>
+                    <a:lnT w="6350" cap="flat" cmpd="sng" algn="ctr">
+                      <a:solidFill>
+                        <a:srgbClr val="000000"/>
+                      </a:solidFill>
+                      <a:prstDash val="solid"/>
+                      <a:round/>
+                      <a:headEnd type="none" w="med" len="med"/>
+                      <a:tailEnd type="none" w="med" len="med"/>
+                    </a:lnT>
+                    <a:lnB w="6350" cap="flat" cmpd="sng" algn="ctr">
+                      <a:solidFill>
+                        <a:srgbClr val="000000"/>
+                      </a:solidFill>
+                      <a:prstDash val="solid"/>
+                      <a:round/>
+                      <a:headEnd type="none" w="med" len="med"/>
+                      <a:tailEnd type="none" w="med" len="med"/>
+                    </a:lnB>
+                    <a:solidFill>
+                      <a:schemeClr val="bg2"/>
+                    </a:solidFill>
+                  </a:tcPr>
+                </a:tc>
+                <a:tc>
+                  <a:txBody>
+                    <a:bodyPr/>
+                    <a:lstStyle/>
+                    <a:p>
+                      <a:pPr algn="ctr" fontAlgn="b"/>
+                      <a:endParaRPr lang="sk-SK" sz="2400" b="0" i="0" u="none" strike="noStrike">
+                        <a:solidFill>
+                          <a:srgbClr val="000000"/>
+                        </a:solidFill>
+                        <a:effectLst/>
+                        <a:latin typeface="Calibri" charset="0"/>
+                      </a:endParaRPr>
+                    </a:p>
+                  </a:txBody>
+                  <a:tcPr marL="10767" marR="10767" marT="10767" marB="0" anchor="ctr">
+                    <a:lnL w="6350" cap="flat" cmpd="sng" algn="ctr">
+                      <a:solidFill>
+                        <a:srgbClr val="000000"/>
+                      </a:solidFill>
+                      <a:prstDash val="solid"/>
+                      <a:round/>
+                      <a:headEnd type="none" w="med" len="med"/>
+                      <a:tailEnd type="none" w="med" len="med"/>
+                    </a:lnL>
+                    <a:lnR w="6350" cap="flat" cmpd="sng" algn="ctr">
+                      <a:solidFill>
+                        <a:srgbClr val="000000"/>
+                      </a:solidFill>
+                      <a:prstDash val="solid"/>
+                      <a:round/>
+                      <a:headEnd type="none" w="med" len="med"/>
+                      <a:tailEnd type="none" w="med" len="med"/>
+                    </a:lnR>
+                    <a:lnT w="6350" cap="flat" cmpd="sng" algn="ctr">
+                      <a:solidFill>
+                        <a:srgbClr val="000000"/>
+                      </a:solidFill>
+                      <a:prstDash val="solid"/>
+                      <a:round/>
+                      <a:headEnd type="none" w="med" len="med"/>
+                      <a:tailEnd type="none" w="med" len="med"/>
+                    </a:lnT>
+                    <a:lnB w="6350" cap="flat" cmpd="sng" algn="ctr">
+                      <a:solidFill>
+                        <a:srgbClr val="000000"/>
+                      </a:solidFill>
+                      <a:prstDash val="solid"/>
+                      <a:round/>
+                      <a:headEnd type="none" w="med" len="med"/>
+                      <a:tailEnd type="none" w="med" len="med"/>
+                    </a:lnB>
+                    <a:solidFill>
+                      <a:schemeClr val="bg2"/>
+                    </a:solidFill>
+                  </a:tcPr>
+                </a:tc>
+              </a:tr>
+              <a:tr h="403426">
+                <a:tc>
+                  <a:txBody>
+                    <a:bodyPr/>
+                    <a:lstStyle/>
+                    <a:p>
+                      <a:pPr algn="ctr" fontAlgn="b"/>
+                      <a:r>
+                        <a:rPr lang="en-US" sz="2400" b="0" i="0" u="none" strike="noStrike">
+                          <a:solidFill>
+                            <a:srgbClr val="000000"/>
+                          </a:solidFill>
+                          <a:effectLst/>
+                          <a:latin typeface="Calibri" charset="0"/>
+                        </a:rPr>
+                        <a:t>0</a:t>
+                      </a:r>
+                    </a:p>
+                  </a:txBody>
+                  <a:tcPr marL="10767" marR="10767" marT="10767" marB="0" anchor="ctr">
+                    <a:lnL w="6350" cap="flat" cmpd="sng" algn="ctr">
+                      <a:solidFill>
+                        <a:srgbClr val="000000"/>
+                      </a:solidFill>
+                      <a:prstDash val="solid"/>
+                      <a:round/>
+                      <a:headEnd type="none" w="med" len="med"/>
+                      <a:tailEnd type="none" w="med" len="med"/>
+                    </a:lnL>
+                    <a:lnR w="6350" cap="flat" cmpd="sng" algn="ctr">
+                      <a:solidFill>
+                        <a:srgbClr val="000000"/>
+                      </a:solidFill>
+                      <a:prstDash val="solid"/>
+                      <a:round/>
+                      <a:headEnd type="none" w="med" len="med"/>
+                      <a:tailEnd type="none" w="med" len="med"/>
+                    </a:lnR>
+                    <a:lnT w="6350" cap="flat" cmpd="sng" algn="ctr">
+                      <a:solidFill>
+                        <a:srgbClr val="000000"/>
+                      </a:solidFill>
+                      <a:prstDash val="solid"/>
+                      <a:round/>
+                      <a:headEnd type="none" w="med" len="med"/>
+                      <a:tailEnd type="none" w="med" len="med"/>
+                    </a:lnT>
+                    <a:lnB w="6350" cap="flat" cmpd="sng" algn="ctr">
+                      <a:solidFill>
+                        <a:srgbClr val="000000"/>
+                      </a:solidFill>
+                      <a:prstDash val="solid"/>
+                      <a:round/>
+                      <a:headEnd type="none" w="med" len="med"/>
+                      <a:tailEnd type="none" w="med" len="med"/>
+                    </a:lnB>
+                  </a:tcPr>
+                </a:tc>
+                <a:tc>
+                  <a:txBody>
+                    <a:bodyPr/>
+                    <a:lstStyle/>
+                    <a:p>
+                      <a:pPr algn="ctr" fontAlgn="b"/>
+                      <a:r>
+                        <a:rPr lang="sk-SK" sz="2400" b="0" i="0" u="none" strike="noStrike">
+                          <a:solidFill>
+                            <a:srgbClr val="000000"/>
+                          </a:solidFill>
+                          <a:effectLst/>
+                          <a:latin typeface="Calibri" charset="0"/>
+                        </a:rPr>
+                        <a:t> </a:t>
+                      </a:r>
+                    </a:p>
+                  </a:txBody>
+                  <a:tcPr marL="10767" marR="10767" marT="10767" marB="0" anchor="ctr">
+                    <a:lnL w="6350" cap="flat" cmpd="sng" algn="ctr">
+                      <a:solidFill>
+                        <a:srgbClr val="000000"/>
+                      </a:solidFill>
+                      <a:prstDash val="solid"/>
+                      <a:round/>
+                      <a:headEnd type="none" w="med" len="med"/>
+                      <a:tailEnd type="none" w="med" len="med"/>
+                    </a:lnL>
+                    <a:lnR w="6350" cap="flat" cmpd="sng" algn="ctr">
+                      <a:solidFill>
+                        <a:srgbClr val="000000"/>
+                      </a:solidFill>
+                      <a:prstDash val="solid"/>
+                      <a:round/>
+                      <a:headEnd type="none" w="med" len="med"/>
+                      <a:tailEnd type="none" w="med" len="med"/>
+                    </a:lnR>
+                    <a:lnT w="6350" cap="flat" cmpd="sng" algn="ctr">
+                      <a:solidFill>
+                        <a:srgbClr val="000000"/>
+                      </a:solidFill>
+                      <a:prstDash val="solid"/>
+                      <a:round/>
+                      <a:headEnd type="none" w="med" len="med"/>
+                      <a:tailEnd type="none" w="med" len="med"/>
+                    </a:lnT>
+                    <a:lnB w="6350" cap="flat" cmpd="sng" algn="ctr">
+                      <a:solidFill>
+                        <a:srgbClr val="000000"/>
+                      </a:solidFill>
+                      <a:prstDash val="solid"/>
+                      <a:round/>
+                      <a:headEnd type="none" w="med" len="med"/>
+                      <a:tailEnd type="none" w="med" len="med"/>
+                    </a:lnB>
+                  </a:tcPr>
+                </a:tc>
+              </a:tr>
+              <a:tr h="403426">
+                <a:tc>
+                  <a:txBody>
+                    <a:bodyPr/>
+                    <a:lstStyle/>
+                    <a:p>
+                      <a:pPr algn="ctr" fontAlgn="b"/>
+                      <a:r>
+                        <a:rPr lang="nb-NO" sz="2400" b="0" i="0" u="none" strike="noStrike">
+                          <a:solidFill>
+                            <a:srgbClr val="000000"/>
+                          </a:solidFill>
+                          <a:effectLst/>
+                          <a:latin typeface="Calibri" charset="0"/>
+                        </a:rPr>
+                        <a:t>0.2</a:t>
+                      </a:r>
+                    </a:p>
+                  </a:txBody>
+                  <a:tcPr marL="10767" marR="10767" marT="10767" marB="0" anchor="ctr">
+                    <a:lnL w="6350" cap="flat" cmpd="sng" algn="ctr">
+                      <a:solidFill>
+                        <a:srgbClr val="000000"/>
+                      </a:solidFill>
+                      <a:prstDash val="solid"/>
+                      <a:round/>
+                      <a:headEnd type="none" w="med" len="med"/>
+                      <a:tailEnd type="none" w="med" len="med"/>
+                    </a:lnL>
+                    <a:lnR w="6350" cap="flat" cmpd="sng" algn="ctr">
+                      <a:solidFill>
+                        <a:srgbClr val="000000"/>
+                      </a:solidFill>
+                      <a:prstDash val="solid"/>
+                      <a:round/>
+                      <a:headEnd type="none" w="med" len="med"/>
+                      <a:tailEnd type="none" w="med" len="med"/>
+                    </a:lnR>
+                    <a:lnT w="6350" cap="flat" cmpd="sng" algn="ctr">
+                      <a:solidFill>
+                        <a:srgbClr val="000000"/>
+                      </a:solidFill>
+                      <a:prstDash val="solid"/>
+                      <a:round/>
+                      <a:headEnd type="none" w="med" len="med"/>
+                      <a:tailEnd type="none" w="med" len="med"/>
+                    </a:lnT>
+                    <a:lnB w="6350" cap="flat" cmpd="sng" algn="ctr">
+                      <a:solidFill>
+                        <a:srgbClr val="000000"/>
+                      </a:solidFill>
+                      <a:prstDash val="solid"/>
+                      <a:round/>
+                      <a:headEnd type="none" w="med" len="med"/>
+                      <a:tailEnd type="none" w="med" len="med"/>
+                    </a:lnB>
+                  </a:tcPr>
+                </a:tc>
+                <a:tc>
+                  <a:txBody>
+                    <a:bodyPr/>
+                    <a:lstStyle/>
+                    <a:p>
+                      <a:pPr algn="ctr" fontAlgn="b"/>
+                      <a:r>
+                        <a:rPr lang="is-IS" sz="2400" b="0" i="0" u="none" strike="noStrike">
+                          <a:solidFill>
+                            <a:srgbClr val="000000"/>
+                          </a:solidFill>
+                          <a:effectLst/>
+                          <a:latin typeface="Calibri" charset="0"/>
+                        </a:rPr>
+                        <a:t>106</a:t>
+                      </a:r>
+                    </a:p>
+                  </a:txBody>
+                  <a:tcPr marL="10767" marR="10767" marT="10767" marB="0" anchor="ctr">
+                    <a:lnL w="6350" cap="flat" cmpd="sng" algn="ctr">
+                      <a:solidFill>
+                        <a:srgbClr val="000000"/>
+                      </a:solidFill>
+                      <a:prstDash val="solid"/>
+                      <a:round/>
+                      <a:headEnd type="none" w="med" len="med"/>
+                      <a:tailEnd type="none" w="med" len="med"/>
+                    </a:lnL>
+                    <a:lnR w="6350" cap="flat" cmpd="sng" algn="ctr">
+                      <a:solidFill>
+                        <a:srgbClr val="000000"/>
+                      </a:solidFill>
+                      <a:prstDash val="solid"/>
+                      <a:round/>
+                      <a:headEnd type="none" w="med" len="med"/>
+                      <a:tailEnd type="none" w="med" len="med"/>
+                    </a:lnR>
+                    <a:lnT w="6350" cap="flat" cmpd="sng" algn="ctr">
+                      <a:solidFill>
+                        <a:srgbClr val="000000"/>
+                      </a:solidFill>
+                      <a:prstDash val="solid"/>
+                      <a:round/>
+                      <a:headEnd type="none" w="med" len="med"/>
+                      <a:tailEnd type="none" w="med" len="med"/>
+                    </a:lnT>
+                    <a:lnB w="6350" cap="flat" cmpd="sng" algn="ctr">
+                      <a:solidFill>
+                        <a:srgbClr val="000000"/>
+                      </a:solidFill>
+                      <a:prstDash val="solid"/>
+                      <a:round/>
+                      <a:headEnd type="none" w="med" len="med"/>
+                      <a:tailEnd type="none" w="med" len="med"/>
+                    </a:lnB>
+                  </a:tcPr>
+                </a:tc>
+              </a:tr>
+              <a:tr h="403426">
+                <a:tc>
+                  <a:txBody>
+                    <a:bodyPr/>
+                    <a:lstStyle/>
+                    <a:p>
+                      <a:pPr algn="ctr" fontAlgn="b"/>
+                      <a:r>
+                        <a:rPr lang="nb-NO" sz="2400" b="0" i="0" u="none" strike="noStrike">
+                          <a:solidFill>
+                            <a:srgbClr val="000000"/>
+                          </a:solidFill>
+                          <a:effectLst/>
+                          <a:latin typeface="Calibri" charset="0"/>
+                        </a:rPr>
+                        <a:t>0.4</a:t>
+                      </a:r>
+                    </a:p>
+                  </a:txBody>
+                  <a:tcPr marL="10767" marR="10767" marT="10767" marB="0" anchor="ctr">
+                    <a:lnL w="6350" cap="flat" cmpd="sng" algn="ctr">
+                      <a:solidFill>
+                        <a:srgbClr val="000000"/>
+                      </a:solidFill>
+                      <a:prstDash val="solid"/>
+                      <a:round/>
+                      <a:headEnd type="none" w="med" len="med"/>
+                      <a:tailEnd type="none" w="med" len="med"/>
+                    </a:lnL>
+                    <a:lnR w="6350" cap="flat" cmpd="sng" algn="ctr">
+                      <a:solidFill>
+                        <a:srgbClr val="000000"/>
+                      </a:solidFill>
+                      <a:prstDash val="solid"/>
+                      <a:round/>
+                      <a:headEnd type="none" w="med" len="med"/>
+                      <a:tailEnd type="none" w="med" len="med"/>
+                    </a:lnR>
+                    <a:lnT w="6350" cap="flat" cmpd="sng" algn="ctr">
+                      <a:solidFill>
+                        <a:srgbClr val="000000"/>
+                      </a:solidFill>
+                      <a:prstDash val="solid"/>
+                      <a:round/>
+                      <a:headEnd type="none" w="med" len="med"/>
+                      <a:tailEnd type="none" w="med" len="med"/>
+                    </a:lnT>
+                    <a:lnB w="6350" cap="flat" cmpd="sng" algn="ctr">
+                      <a:solidFill>
+                        <a:srgbClr val="000000"/>
+                      </a:solidFill>
+                      <a:prstDash val="solid"/>
+                      <a:round/>
+                      <a:headEnd type="none" w="med" len="med"/>
+                      <a:tailEnd type="none" w="med" len="med"/>
+                    </a:lnB>
+                  </a:tcPr>
+                </a:tc>
+                <a:tc>
+                  <a:txBody>
+                    <a:bodyPr/>
+                    <a:lstStyle/>
+                    <a:p>
+                      <a:pPr algn="ctr" fontAlgn="b"/>
+                      <a:r>
+                        <a:rPr lang="en-US" sz="2400" b="0" i="0" u="none" strike="noStrike">
+                          <a:solidFill>
+                            <a:srgbClr val="000000"/>
+                          </a:solidFill>
+                          <a:effectLst/>
+                          <a:latin typeface="Calibri" charset="0"/>
+                        </a:rPr>
+                        <a:t>40</a:t>
+                      </a:r>
+                    </a:p>
+                  </a:txBody>
+                  <a:tcPr marL="10767" marR="10767" marT="10767" marB="0" anchor="ctr">
+                    <a:lnL w="6350" cap="flat" cmpd="sng" algn="ctr">
+                      <a:solidFill>
+                        <a:srgbClr val="000000"/>
+                      </a:solidFill>
+                      <a:prstDash val="solid"/>
+                      <a:round/>
+                      <a:headEnd type="none" w="med" len="med"/>
+                      <a:tailEnd type="none" w="med" len="med"/>
+                    </a:lnL>
+                    <a:lnR w="6350" cap="flat" cmpd="sng" algn="ctr">
+                      <a:solidFill>
+                        <a:srgbClr val="000000"/>
+                      </a:solidFill>
+                      <a:prstDash val="solid"/>
+                      <a:round/>
+                      <a:headEnd type="none" w="med" len="med"/>
+                      <a:tailEnd type="none" w="med" len="med"/>
+                    </a:lnR>
+                    <a:lnT w="6350" cap="flat" cmpd="sng" algn="ctr">
+                      <a:solidFill>
+                        <a:srgbClr val="000000"/>
+                      </a:solidFill>
+                      <a:prstDash val="solid"/>
+                      <a:round/>
+                      <a:headEnd type="none" w="med" len="med"/>
+                      <a:tailEnd type="none" w="med" len="med"/>
+                    </a:lnT>
+                    <a:lnB w="6350" cap="flat" cmpd="sng" algn="ctr">
+                      <a:solidFill>
+                        <a:srgbClr val="000000"/>
+                      </a:solidFill>
+                      <a:prstDash val="solid"/>
+                      <a:round/>
+                      <a:headEnd type="none" w="med" len="med"/>
+                      <a:tailEnd type="none" w="med" len="med"/>
+                    </a:lnB>
+                  </a:tcPr>
+                </a:tc>
+              </a:tr>
+              <a:tr h="403426">
+                <a:tc>
+                  <a:txBody>
+                    <a:bodyPr/>
+                    <a:lstStyle/>
+                    <a:p>
+                      <a:pPr algn="ctr" fontAlgn="b"/>
+                      <a:r>
+                        <a:rPr lang="nb-NO" sz="2400" b="0" i="0" u="none" strike="noStrike">
+                          <a:solidFill>
+                            <a:srgbClr val="000000"/>
+                          </a:solidFill>
+                          <a:effectLst/>
+                          <a:latin typeface="Calibri" charset="0"/>
+                        </a:rPr>
+                        <a:t>0.6</a:t>
+                      </a:r>
+                    </a:p>
+                  </a:txBody>
+                  <a:tcPr marL="10767" marR="10767" marT="10767" marB="0" anchor="ctr">
+                    <a:lnL w="6350" cap="flat" cmpd="sng" algn="ctr">
+                      <a:solidFill>
+                        <a:srgbClr val="000000"/>
+                      </a:solidFill>
+                      <a:prstDash val="solid"/>
+                      <a:round/>
+                      <a:headEnd type="none" w="med" len="med"/>
+                      <a:tailEnd type="none" w="med" len="med"/>
+                    </a:lnL>
+                    <a:lnR w="6350" cap="flat" cmpd="sng" algn="ctr">
+                      <a:solidFill>
+                        <a:srgbClr val="000000"/>
+                      </a:solidFill>
+                      <a:prstDash val="solid"/>
+                      <a:round/>
+                      <a:headEnd type="none" w="med" len="med"/>
+                      <a:tailEnd type="none" w="med" len="med"/>
+                    </a:lnR>
+                    <a:lnT w="6350" cap="flat" cmpd="sng" algn="ctr">
+                      <a:solidFill>
+                        <a:srgbClr val="000000"/>
+                      </a:solidFill>
+                      <a:prstDash val="solid"/>
+                      <a:round/>
+                      <a:headEnd type="none" w="med" len="med"/>
+                      <a:tailEnd type="none" w="med" len="med"/>
+                    </a:lnT>
+                    <a:lnB w="6350" cap="flat" cmpd="sng" algn="ctr">
+                      <a:solidFill>
+                        <a:srgbClr val="000000"/>
+                      </a:solidFill>
+                      <a:prstDash val="solid"/>
+                      <a:round/>
+                      <a:headEnd type="none" w="med" len="med"/>
+                      <a:tailEnd type="none" w="med" len="med"/>
+                    </a:lnB>
+                  </a:tcPr>
+                </a:tc>
+                <a:tc>
+                  <a:txBody>
+                    <a:bodyPr/>
+                    <a:lstStyle/>
+                    <a:p>
+                      <a:pPr algn="ctr" fontAlgn="b"/>
+                      <a:r>
+                        <a:rPr lang="fi-FI" sz="2400" b="0" i="0" u="none" strike="noStrike">
+                          <a:solidFill>
+                            <a:srgbClr val="000000"/>
+                          </a:solidFill>
+                          <a:effectLst/>
+                          <a:latin typeface="Calibri" charset="0"/>
+                        </a:rPr>
+                        <a:t>18</a:t>
+                      </a:r>
+                    </a:p>
+                  </a:txBody>
+                  <a:tcPr marL="10767" marR="10767" marT="10767" marB="0" anchor="ctr">
+                    <a:lnL w="6350" cap="flat" cmpd="sng" algn="ctr">
+                      <a:solidFill>
+                        <a:srgbClr val="000000"/>
+                      </a:solidFill>
+                      <a:prstDash val="solid"/>
+                      <a:round/>
+                      <a:headEnd type="none" w="med" len="med"/>
+                      <a:tailEnd type="none" w="med" len="med"/>
+                    </a:lnL>
+                    <a:lnR w="6350" cap="flat" cmpd="sng" algn="ctr">
+                      <a:solidFill>
+                        <a:srgbClr val="000000"/>
+                      </a:solidFill>
+                      <a:prstDash val="solid"/>
+                      <a:round/>
+                      <a:headEnd type="none" w="med" len="med"/>
+                      <a:tailEnd type="none" w="med" len="med"/>
+                    </a:lnR>
+                    <a:lnT w="6350" cap="flat" cmpd="sng" algn="ctr">
+                      <a:solidFill>
+                        <a:srgbClr val="000000"/>
+                      </a:solidFill>
+                      <a:prstDash val="solid"/>
+                      <a:round/>
+                      <a:headEnd type="none" w="med" len="med"/>
+                      <a:tailEnd type="none" w="med" len="med"/>
+                    </a:lnT>
+                    <a:lnB w="6350" cap="flat" cmpd="sng" algn="ctr">
+                      <a:solidFill>
+                        <a:srgbClr val="000000"/>
+                      </a:solidFill>
+                      <a:prstDash val="solid"/>
+                      <a:round/>
+                      <a:headEnd type="none" w="med" len="med"/>
+                      <a:tailEnd type="none" w="med" len="med"/>
+                    </a:lnB>
+                  </a:tcPr>
+                </a:tc>
+              </a:tr>
+              <a:tr h="403426">
+                <a:tc>
+                  <a:txBody>
+                    <a:bodyPr/>
+                    <a:lstStyle/>
+                    <a:p>
+                      <a:pPr algn="ctr" fontAlgn="b"/>
+                      <a:r>
+                        <a:rPr lang="nb-NO" sz="2400" b="0" i="0" u="none" strike="noStrike">
+                          <a:solidFill>
+                            <a:srgbClr val="000000"/>
+                          </a:solidFill>
+                          <a:effectLst/>
+                          <a:latin typeface="Calibri" charset="0"/>
+                        </a:rPr>
+                        <a:t>0.8</a:t>
+                      </a:r>
+                    </a:p>
+                  </a:txBody>
+                  <a:tcPr marL="10767" marR="10767" marT="10767" marB="0" anchor="ctr">
+                    <a:lnL w="6350" cap="flat" cmpd="sng" algn="ctr">
+                      <a:solidFill>
+                        <a:srgbClr val="000000"/>
+                      </a:solidFill>
+                      <a:prstDash val="solid"/>
+                      <a:round/>
+                      <a:headEnd type="none" w="med" len="med"/>
+                      <a:tailEnd type="none" w="med" len="med"/>
+                    </a:lnL>
+                    <a:lnR w="6350" cap="flat" cmpd="sng" algn="ctr">
+                      <a:solidFill>
+                        <a:srgbClr val="000000"/>
+                      </a:solidFill>
+                      <a:prstDash val="solid"/>
+                      <a:round/>
+                      <a:headEnd type="none" w="med" len="med"/>
+                      <a:tailEnd type="none" w="med" len="med"/>
+                    </a:lnR>
+                    <a:lnT w="6350" cap="flat" cmpd="sng" algn="ctr">
+                      <a:solidFill>
+                        <a:srgbClr val="000000"/>
+                      </a:solidFill>
+                      <a:prstDash val="solid"/>
+                      <a:round/>
+                      <a:headEnd type="none" w="med" len="med"/>
+                      <a:tailEnd type="none" w="med" len="med"/>
+                    </a:lnT>
+                    <a:lnB w="6350" cap="flat" cmpd="sng" algn="ctr">
+                      <a:solidFill>
+                        <a:srgbClr val="000000"/>
+                      </a:solidFill>
+                      <a:prstDash val="solid"/>
+                      <a:round/>
+                      <a:headEnd type="none" w="med" len="med"/>
+                      <a:tailEnd type="none" w="med" len="med"/>
+                    </a:lnB>
+                  </a:tcPr>
+                </a:tc>
+                <a:tc>
+                  <a:txBody>
+                    <a:bodyPr/>
+                    <a:lstStyle/>
+                    <a:p>
+                      <a:pPr algn="ctr" fontAlgn="b"/>
+                      <a:r>
+                        <a:rPr lang="en-US" sz="2400" b="0" i="0" u="none" strike="noStrike">
+                          <a:solidFill>
+                            <a:srgbClr val="000000"/>
+                          </a:solidFill>
+                          <a:effectLst/>
+                          <a:latin typeface="Calibri" charset="0"/>
+                        </a:rPr>
+                        <a:t>7</a:t>
+                      </a:r>
+                    </a:p>
+                  </a:txBody>
+                  <a:tcPr marL="10767" marR="10767" marT="10767" marB="0" anchor="ctr">
+                    <a:lnL w="6350" cap="flat" cmpd="sng" algn="ctr">
+                      <a:solidFill>
+                        <a:srgbClr val="000000"/>
+                      </a:solidFill>
+                      <a:prstDash val="solid"/>
+                      <a:round/>
+                      <a:headEnd type="none" w="med" len="med"/>
+                      <a:tailEnd type="none" w="med" len="med"/>
+                    </a:lnL>
+                    <a:lnR w="6350" cap="flat" cmpd="sng" algn="ctr">
+                      <a:solidFill>
+                        <a:srgbClr val="000000"/>
+                      </a:solidFill>
+                      <a:prstDash val="solid"/>
+                      <a:round/>
+                      <a:headEnd type="none" w="med" len="med"/>
+                      <a:tailEnd type="none" w="med" len="med"/>
+                    </a:lnR>
+                    <a:lnT w="6350" cap="flat" cmpd="sng" algn="ctr">
+                      <a:solidFill>
+                        <a:srgbClr val="000000"/>
+                      </a:solidFill>
+                      <a:prstDash val="solid"/>
+                      <a:round/>
+                      <a:headEnd type="none" w="med" len="med"/>
+                      <a:tailEnd type="none" w="med" len="med"/>
+                    </a:lnT>
+                    <a:lnB w="6350" cap="flat" cmpd="sng" algn="ctr">
+                      <a:solidFill>
+                        <a:srgbClr val="000000"/>
+                      </a:solidFill>
+                      <a:prstDash val="solid"/>
+                      <a:round/>
+                      <a:headEnd type="none" w="med" len="med"/>
+                      <a:tailEnd type="none" w="med" len="med"/>
+                    </a:lnB>
+                  </a:tcPr>
+                </a:tc>
+              </a:tr>
+              <a:tr h="403426">
+                <a:tc>
+                  <a:txBody>
+                    <a:bodyPr/>
+                    <a:lstStyle/>
+                    <a:p>
+                      <a:pPr algn="ctr" fontAlgn="b"/>
+                      <a:r>
+                        <a:rPr lang="en-US" sz="2400" b="0" i="0" u="none" strike="noStrike">
+                          <a:solidFill>
+                            <a:srgbClr val="000000"/>
+                          </a:solidFill>
+                          <a:effectLst/>
+                          <a:latin typeface="Calibri" charset="0"/>
+                        </a:rPr>
+                        <a:t>1</a:t>
+                      </a:r>
+                    </a:p>
+                  </a:txBody>
+                  <a:tcPr marL="10767" marR="10767" marT="10767" marB="0" anchor="ctr">
+                    <a:lnL w="6350" cap="flat" cmpd="sng" algn="ctr">
+                      <a:solidFill>
+                        <a:srgbClr val="000000"/>
+                      </a:solidFill>
+                      <a:prstDash val="solid"/>
+                      <a:round/>
+                      <a:headEnd type="none" w="med" len="med"/>
+                      <a:tailEnd type="none" w="med" len="med"/>
+                    </a:lnL>
+                    <a:lnR w="6350" cap="flat" cmpd="sng" algn="ctr">
+                      <a:solidFill>
+                        <a:srgbClr val="000000"/>
+                      </a:solidFill>
+                      <a:prstDash val="solid"/>
+                      <a:round/>
+                      <a:headEnd type="none" w="med" len="med"/>
+                      <a:tailEnd type="none" w="med" len="med"/>
+                    </a:lnR>
+                    <a:lnT w="6350" cap="flat" cmpd="sng" algn="ctr">
+                      <a:solidFill>
+                        <a:srgbClr val="000000"/>
+                      </a:solidFill>
+                      <a:prstDash val="solid"/>
+                      <a:round/>
+                      <a:headEnd type="none" w="med" len="med"/>
+                      <a:tailEnd type="none" w="med" len="med"/>
+                    </a:lnT>
+                    <a:lnB w="6350" cap="flat" cmpd="sng" algn="ctr">
+                      <a:solidFill>
+                        <a:srgbClr val="000000"/>
+                      </a:solidFill>
+                      <a:prstDash val="solid"/>
+                      <a:round/>
+                      <a:headEnd type="none" w="med" len="med"/>
+                      <a:tailEnd type="none" w="med" len="med"/>
+                    </a:lnB>
+                  </a:tcPr>
+                </a:tc>
+                <a:tc>
+                  <a:txBody>
+                    <a:bodyPr/>
+                    <a:lstStyle/>
+                    <a:p>
+                      <a:pPr algn="ctr" fontAlgn="b"/>
+                      <a:r>
+                        <a:rPr lang="en-US" sz="2400" b="0" i="0" u="none" strike="noStrike">
+                          <a:solidFill>
+                            <a:srgbClr val="000000"/>
+                          </a:solidFill>
+                          <a:effectLst/>
+                          <a:latin typeface="Calibri" charset="0"/>
+                        </a:rPr>
+                        <a:t>0</a:t>
+                      </a:r>
+                    </a:p>
+                  </a:txBody>
+                  <a:tcPr marL="10767" marR="10767" marT="10767" marB="0" anchor="ctr">
+                    <a:lnL w="6350" cap="flat" cmpd="sng" algn="ctr">
+                      <a:solidFill>
+                        <a:srgbClr val="000000"/>
+                      </a:solidFill>
+                      <a:prstDash val="solid"/>
+                      <a:round/>
+                      <a:headEnd type="none" w="med" len="med"/>
+                      <a:tailEnd type="none" w="med" len="med"/>
+                    </a:lnL>
+                    <a:lnR w="6350" cap="flat" cmpd="sng" algn="ctr">
+                      <a:solidFill>
+                        <a:srgbClr val="000000"/>
+                      </a:solidFill>
+                      <a:prstDash val="solid"/>
+                      <a:round/>
+                      <a:headEnd type="none" w="med" len="med"/>
+                      <a:tailEnd type="none" w="med" len="med"/>
+                    </a:lnR>
+                    <a:lnT w="6350" cap="flat" cmpd="sng" algn="ctr">
+                      <a:solidFill>
+                        <a:srgbClr val="000000"/>
+                      </a:solidFill>
+                      <a:prstDash val="solid"/>
+                      <a:round/>
+                      <a:headEnd type="none" w="med" len="med"/>
+                      <a:tailEnd type="none" w="med" len="med"/>
+                    </a:lnT>
+                    <a:lnB w="6350" cap="flat" cmpd="sng" algn="ctr">
+                      <a:solidFill>
+                        <a:srgbClr val="000000"/>
+                      </a:solidFill>
+                      <a:prstDash val="solid"/>
+                      <a:round/>
+                      <a:headEnd type="none" w="med" len="med"/>
+                      <a:tailEnd type="none" w="med" len="med"/>
+                    </a:lnB>
+                  </a:tcPr>
+                </a:tc>
+              </a:tr>
+            </a:tbl>
+          </a:graphicData>
+        </a:graphic>
+      </p:graphicFrame>
+      <p:pic>
+        <p:nvPicPr>
+          <p:cNvPr id="3" name="Picture 2"/>
+          <p:cNvPicPr>
+            <a:picLocks noChangeAspect="1"/>
+          </p:cNvPicPr>
+          <p:nvPr/>
+        </p:nvPicPr>
+        <p:blipFill>
+          <a:blip r:embed="rId2">
+            <a:extLst>
+              <a:ext uri="{28A0092B-C50C-407E-A947-70E740481C1C}">
+                <a14:useLocalDpi xmlns:a14="http://schemas.microsoft.com/office/drawing/2010/main" val="0"/>
+              </a:ext>
+            </a:extLst>
+          </a:blip>
+          <a:stretch>
+            <a:fillRect/>
+          </a:stretch>
+        </p:blipFill>
+        <p:spPr>
+          <a:xfrm>
+            <a:off x="4461329" y="2645149"/>
+            <a:ext cx="1498600" cy="660400"/>
+          </a:xfrm>
+          <a:prstGeom prst="rect">
+            <a:avLst/>
+          </a:prstGeom>
+        </p:spPr>
+      </p:pic>
+      <p:pic>
+        <p:nvPicPr>
+          <p:cNvPr id="4" name="Picture 3"/>
+          <p:cNvPicPr>
+            <a:picLocks noChangeAspect="1"/>
+          </p:cNvPicPr>
+          <p:nvPr/>
+        </p:nvPicPr>
+        <p:blipFill>
+          <a:blip r:embed="rId3">
+            <a:extLst>
+              <a:ext uri="{28A0092B-C50C-407E-A947-70E740481C1C}">
+                <a14:useLocalDpi xmlns:a14="http://schemas.microsoft.com/office/drawing/2010/main" val="0"/>
+              </a:ext>
+            </a:extLst>
+          </a:blip>
+          <a:stretch>
+            <a:fillRect/>
+          </a:stretch>
+        </p:blipFill>
+        <p:spPr>
+          <a:xfrm>
+            <a:off x="7150100" y="2739491"/>
+            <a:ext cx="330200" cy="609600"/>
+          </a:xfrm>
+          <a:prstGeom prst="rect">
+            <a:avLst/>
+          </a:prstGeom>
+        </p:spPr>
+      </p:pic>
+      <p:pic>
+        <p:nvPicPr>
+          <p:cNvPr id="5" name="Picture 4"/>
+          <p:cNvPicPr>
+            <a:picLocks noChangeAspect="1"/>
+          </p:cNvPicPr>
+          <p:nvPr/>
+        </p:nvPicPr>
+        <p:blipFill>
+          <a:blip r:embed="rId4">
+            <a:extLst>
+              <a:ext uri="{28A0092B-C50C-407E-A947-70E740481C1C}">
+                <a14:useLocalDpi xmlns:a14="http://schemas.microsoft.com/office/drawing/2010/main" val="0"/>
+              </a:ext>
+            </a:extLst>
+          </a:blip>
+          <a:stretch>
+            <a:fillRect/>
+          </a:stretch>
+        </p:blipFill>
+        <p:spPr>
+          <a:xfrm>
+            <a:off x="7073900" y="3280450"/>
+            <a:ext cx="482600" cy="609600"/>
+          </a:xfrm>
+          <a:prstGeom prst="rect">
+            <a:avLst/>
+          </a:prstGeom>
+        </p:spPr>
+      </p:pic>
+      <p:pic>
+        <p:nvPicPr>
+          <p:cNvPr id="6" name="Picture 5"/>
+          <p:cNvPicPr>
+            <a:picLocks noChangeAspect="1"/>
+          </p:cNvPicPr>
+          <p:nvPr/>
+        </p:nvPicPr>
+        <p:blipFill>
+          <a:blip r:embed="rId5">
+            <a:extLst>
+              <a:ext uri="{28A0092B-C50C-407E-A947-70E740481C1C}">
+                <a14:useLocalDpi xmlns:a14="http://schemas.microsoft.com/office/drawing/2010/main" val="0"/>
+              </a:ext>
+            </a:extLst>
+          </a:blip>
+          <a:stretch>
+            <a:fillRect/>
+          </a:stretch>
+        </p:blipFill>
+        <p:spPr>
+          <a:xfrm>
+            <a:off x="3095170" y="1618500"/>
+            <a:ext cx="6935865" cy="937757"/>
+          </a:xfrm>
+          <a:prstGeom prst="rect">
+            <a:avLst/>
+          </a:prstGeom>
+        </p:spPr>
+      </p:pic>
+      <p:sp>
+        <p:nvSpPr>
+          <p:cNvPr id="8" name="TextBox 7"/>
+          <p:cNvSpPr txBox="1"/>
+          <p:nvPr/>
+        </p:nvSpPr>
+        <p:spPr>
+          <a:xfrm>
+            <a:off x="446558" y="1553678"/>
+            <a:ext cx="2303899" cy="1200329"/>
+          </a:xfrm>
+          <a:prstGeom prst="rect">
+            <a:avLst/>
+          </a:prstGeom>
+          <a:noFill/>
+        </p:spPr>
+        <p:txBody>
+          <a:bodyPr wrap="square" rtlCol="0">
+            <a:spAutoFit/>
+          </a:bodyPr>
+          <a:lstStyle/>
+          <a:p>
+            <a:pPr algn="ctr"/>
+            <a:r>
+              <a:rPr lang="en-US" sz="2400">
+                <a:solidFill>
+                  <a:srgbClr val="C00000"/>
+                </a:solidFill>
+              </a:rPr>
+              <a:t>proportion of un-smoothed unigram model</a:t>
+            </a:r>
+            <a:endParaRPr lang="en-US">
+              <a:solidFill>
+                <a:srgbClr val="C00000"/>
+              </a:solidFill>
+            </a:endParaRPr>
+          </a:p>
+        </p:txBody>
+      </p:sp>
+      <p:cxnSp>
+        <p:nvCxnSpPr>
+          <p:cNvPr id="13" name="Straight Arrow Connector 12"/>
+          <p:cNvCxnSpPr/>
+          <p:nvPr/>
+        </p:nvCxnSpPr>
+        <p:spPr>
+          <a:xfrm>
+            <a:off x="2529113" y="2153762"/>
+            <a:ext cx="442687" cy="0"/>
+          </a:xfrm>
+          <a:prstGeom prst="straightConnector1">
+            <a:avLst/>
+          </a:prstGeom>
+          <a:ln>
+            <a:solidFill>
+              <a:srgbClr val="C00000"/>
+            </a:solidFill>
+            <a:tailEnd type="triangle"/>
+          </a:ln>
+        </p:spPr>
+        <p:style>
+          <a:lnRef idx="1">
+            <a:schemeClr val="accent1"/>
+          </a:lnRef>
+          <a:fillRef idx="0">
+            <a:schemeClr val="accent1"/>
+          </a:fillRef>
+          <a:effectRef idx="0">
+            <a:schemeClr val="accent1"/>
+          </a:effectRef>
+          <a:fontRef idx="minor">
+            <a:schemeClr val="tx1"/>
+          </a:fontRef>
+        </p:style>
+      </p:cxnSp>
+    </p:spTree>
+    <p:extLst>
+      <p:ext uri="{BB962C8B-B14F-4D97-AF65-F5344CB8AC3E}">
+        <p14:creationId xmlns:p14="http://schemas.microsoft.com/office/powerpoint/2010/main" val="1808017118"/>
+      </p:ext>
+    </p:extLst>
+  </p:cSld>
+  <p:clrMapOvr>
+    <a:masterClrMapping/>
+  </p:clrMapOvr>
+</p:sld>
+</file>
+
+<file path=ppt/slides/slide11.xml><?xml version="1.0" encoding="utf-8"?>
+<p:sld xmlns:a="http://schemas.openxmlformats.org/drawingml/2006/main" xmlns:r="http://schemas.openxmlformats.org/officeDocument/2006/relationships" xmlns:p="http://schemas.openxmlformats.org/presentationml/2006/main">
+  <p:cSld>
+    <p:spTree>
+      <p:nvGrpSpPr>
+        <p:cNvPr id="1" name=""/>
+        <p:cNvGrpSpPr/>
+        <p:nvPr/>
+      </p:nvGrpSpPr>
+      <p:grpSpPr>
+        <a:xfrm>
+          <a:off x="0" y="0"/>
+          <a:ext cx="0" cy="0"/>
+          <a:chOff x="0" y="0"/>
+          <a:chExt cx="0" cy="0"/>
+        </a:xfrm>
+      </p:grpSpPr>
+      <p:pic>
+        <p:nvPicPr>
+          <p:cNvPr id="2" name="Picture 1"/>
+          <p:cNvPicPr>
+            <a:picLocks noChangeAspect="1"/>
+          </p:cNvPicPr>
+          <p:nvPr/>
+        </p:nvPicPr>
+        <p:blipFill>
+          <a:blip r:embed="rId2">
+            <a:extLst>
+              <a:ext uri="{28A0092B-C50C-407E-A947-70E740481C1C}">
+                <a14:useLocalDpi xmlns:a14="http://schemas.microsoft.com/office/drawing/2010/main" val="0"/>
+              </a:ext>
+            </a:extLst>
+          </a:blip>
+          <a:stretch>
+            <a:fillRect/>
+          </a:stretch>
+        </p:blipFill>
+        <p:spPr>
+          <a:xfrm>
+            <a:off x="3632200" y="1295400"/>
+            <a:ext cx="4914900" cy="4254500"/>
+          </a:xfrm>
+          <a:prstGeom prst="rect">
+            <a:avLst/>
+          </a:prstGeom>
+        </p:spPr>
+      </p:pic>
+      <p:sp>
+        <p:nvSpPr>
+          <p:cNvPr id="3" name="TextBox 2"/>
+          <p:cNvSpPr txBox="1"/>
+          <p:nvPr/>
+        </p:nvSpPr>
+        <p:spPr>
+          <a:xfrm>
+            <a:off x="3632200" y="660737"/>
+            <a:ext cx="1901371" cy="646331"/>
+          </a:xfrm>
+          <a:prstGeom prst="rect">
+            <a:avLst/>
+          </a:prstGeom>
+          <a:noFill/>
+        </p:spPr>
+        <p:txBody>
+          <a:bodyPr wrap="square" rtlCol="0">
+            <a:spAutoFit/>
+          </a:bodyPr>
+          <a:lstStyle/>
+          <a:p>
+            <a:pPr algn="ctr"/>
+            <a:r>
+              <a:rPr lang="en-US">
+                <a:solidFill>
+                  <a:schemeClr val="tx1">
+                    <a:lumMod val="50000"/>
+                    <a:lumOff val="50000"/>
+                  </a:schemeClr>
+                </a:solidFill>
+              </a:rPr>
+              <a:t>100%</a:t>
+            </a:r>
+          </a:p>
+          <a:p>
+            <a:pPr algn="ctr"/>
+            <a:r>
+              <a:rPr lang="en-US">
+                <a:solidFill>
+                  <a:schemeClr val="tx1">
+                    <a:lumMod val="50000"/>
+                    <a:lumOff val="50000"/>
+                  </a:schemeClr>
+                </a:solidFill>
+              </a:rPr>
+              <a:t>uniform</a:t>
+            </a:r>
+          </a:p>
+        </p:txBody>
+      </p:sp>
+      <p:sp>
+        <p:nvSpPr>
+          <p:cNvPr id="4" name="TextBox 3"/>
+          <p:cNvSpPr txBox="1"/>
+          <p:nvPr/>
+        </p:nvSpPr>
+        <p:spPr>
+          <a:xfrm>
+            <a:off x="7050314" y="649069"/>
+            <a:ext cx="1901371" cy="646331"/>
+          </a:xfrm>
+          <a:prstGeom prst="rect">
+            <a:avLst/>
+          </a:prstGeom>
+          <a:noFill/>
+        </p:spPr>
+        <p:txBody>
+          <a:bodyPr wrap="square" rtlCol="0">
+            <a:spAutoFit/>
+          </a:bodyPr>
+          <a:lstStyle/>
+          <a:p>
+            <a:pPr algn="ctr"/>
+            <a:r>
+              <a:rPr lang="en-US">
+                <a:solidFill>
+                  <a:schemeClr val="tx1">
+                    <a:lumMod val="50000"/>
+                    <a:lumOff val="50000"/>
+                  </a:schemeClr>
+                </a:solidFill>
+              </a:rPr>
+              <a:t>100%</a:t>
+            </a:r>
+          </a:p>
+          <a:p>
+            <a:pPr algn="ctr"/>
+            <a:r>
+              <a:rPr lang="en-US">
+                <a:solidFill>
+                  <a:schemeClr val="tx1">
+                    <a:lumMod val="50000"/>
+                    <a:lumOff val="50000"/>
+                  </a:schemeClr>
+                </a:solidFill>
+              </a:rPr>
+              <a:t>unigram</a:t>
+            </a:r>
+          </a:p>
+        </p:txBody>
+      </p:sp>
+      <p:sp>
+        <p:nvSpPr>
+          <p:cNvPr id="5" name="TextBox 4"/>
+          <p:cNvSpPr txBox="1"/>
+          <p:nvPr/>
+        </p:nvSpPr>
+        <p:spPr>
+          <a:xfrm>
+            <a:off x="4449536" y="3947883"/>
+            <a:ext cx="1640114" cy="923330"/>
+          </a:xfrm>
+          <a:prstGeom prst="rect">
+            <a:avLst/>
+          </a:prstGeom>
+          <a:noFill/>
+        </p:spPr>
+        <p:txBody>
+          <a:bodyPr wrap="square" rtlCol="0">
+            <a:spAutoFit/>
+          </a:bodyPr>
+          <a:lstStyle/>
+          <a:p>
+            <a:r>
+              <a:rPr lang="en-US" b="1">
+                <a:solidFill>
+                  <a:srgbClr val="C00000"/>
+                </a:solidFill>
+              </a:rPr>
+              <a:t>Underfit</a:t>
+            </a:r>
+            <a:endParaRPr lang="en-US" b="1">
+              <a:solidFill>
+                <a:srgbClr val="C00000"/>
+              </a:solidFill>
+            </a:endParaRPr>
+          </a:p>
+          <a:p>
+            <a:r>
+              <a:rPr lang="en-US" b="1">
+                <a:solidFill>
+                  <a:srgbClr val="C00000"/>
+                </a:solidFill>
+              </a:rPr>
+              <a:t>High</a:t>
+            </a:r>
+            <a:r>
+              <a:rPr lang="en-US">
+                <a:solidFill>
+                  <a:srgbClr val="C00000"/>
+                </a:solidFill>
+              </a:rPr>
+              <a:t> bias</a:t>
+            </a:r>
+          </a:p>
+          <a:p>
+            <a:r>
+              <a:rPr lang="en-US" b="1">
+                <a:solidFill>
+                  <a:srgbClr val="C00000"/>
+                </a:solidFill>
+              </a:rPr>
+              <a:t>Low</a:t>
+            </a:r>
+            <a:r>
+              <a:rPr lang="en-US">
+                <a:solidFill>
+                  <a:srgbClr val="C00000"/>
+                </a:solidFill>
+              </a:rPr>
+              <a:t> variance</a:t>
+            </a:r>
+          </a:p>
+        </p:txBody>
+      </p:sp>
+      <p:sp>
+        <p:nvSpPr>
+          <p:cNvPr id="6" name="TextBox 5"/>
+          <p:cNvSpPr txBox="1"/>
+          <p:nvPr/>
+        </p:nvSpPr>
+        <p:spPr>
+          <a:xfrm>
+            <a:off x="6289222" y="2337038"/>
+            <a:ext cx="1640114" cy="1200329"/>
+          </a:xfrm>
+          <a:prstGeom prst="rect">
+            <a:avLst/>
+          </a:prstGeom>
+          <a:noFill/>
+        </p:spPr>
+        <p:txBody>
+          <a:bodyPr wrap="square" rtlCol="0">
+            <a:spAutoFit/>
+          </a:bodyPr>
+          <a:lstStyle/>
+          <a:p>
+            <a:pPr algn="r"/>
+            <a:r>
+              <a:rPr lang="en-US" b="1">
+                <a:solidFill>
+                  <a:srgbClr val="C00000"/>
+                </a:solidFill>
+              </a:rPr>
+              <a:t>Overfit</a:t>
+            </a:r>
+          </a:p>
+          <a:p>
+            <a:pPr algn="r"/>
+            <a:r>
+              <a:rPr lang="en-US" b="1">
+                <a:solidFill>
+                  <a:srgbClr val="C00000"/>
+                </a:solidFill>
+              </a:rPr>
+              <a:t>Low</a:t>
+            </a:r>
+            <a:r>
+              <a:rPr lang="en-US">
+                <a:solidFill>
+                  <a:srgbClr val="C00000"/>
+                </a:solidFill>
+              </a:rPr>
+              <a:t> bias</a:t>
+            </a:r>
+          </a:p>
+          <a:p>
+            <a:pPr algn="r"/>
+            <a:r>
+              <a:rPr lang="en-US" b="1">
+                <a:solidFill>
+                  <a:srgbClr val="C00000"/>
+                </a:solidFill>
+              </a:rPr>
+              <a:t>High</a:t>
+            </a:r>
+            <a:r>
+              <a:rPr lang="en-US">
+                <a:solidFill>
+                  <a:srgbClr val="C00000"/>
+                </a:solidFill>
+              </a:rPr>
+              <a:t> variance</a:t>
+            </a:r>
+          </a:p>
+          <a:p>
+            <a:pPr algn="r"/>
+            <a:endParaRPr lang="en-US">
+              <a:solidFill>
+                <a:srgbClr val="C00000"/>
+              </a:solidFill>
+            </a:endParaRPr>
+          </a:p>
+        </p:txBody>
+      </p:sp>
+    </p:spTree>
+    <p:extLst>
+      <p:ext uri="{BB962C8B-B14F-4D97-AF65-F5344CB8AC3E}">
+        <p14:creationId xmlns:p14="http://schemas.microsoft.com/office/powerpoint/2010/main" val="1247243529"/>
+      </p:ext>
+    </p:extLst>
+  </p:cSld>
+  <p:clrMapOvr>
+    <a:masterClrMapping/>
+  </p:clrMapOvr>
+</p:sld>
+</file>
+
+<file path=ppt/slides/slide2.xml><?xml version="1.0" encoding="utf-8"?>
+<p:sld xmlns:a="http://schemas.openxmlformats.org/drawingml/2006/main" xmlns:r="http://schemas.openxmlformats.org/officeDocument/2006/relationships" xmlns:p="http://schemas.openxmlformats.org/presentationml/2006/main">
+  <p:cSld>
+    <p:spTree>
+      <p:nvGrpSpPr>
+        <p:cNvPr id="1" name=""/>
+        <p:cNvGrpSpPr/>
+        <p:nvPr/>
+      </p:nvGrpSpPr>
+      <p:grpSpPr>
+        <a:xfrm>
+          <a:off x="0" y="0"/>
+          <a:ext cx="0" cy="0"/>
+          <a:chOff x="0" y="0"/>
+          <a:chExt cx="0" cy="0"/>
+        </a:xfrm>
+      </p:grpSpPr>
+      <p:pic>
+        <p:nvPicPr>
+          <p:cNvPr id="2" name="Picture 1"/>
+          <p:cNvPicPr>
+            <a:picLocks noChangeAspect="1"/>
+          </p:cNvPicPr>
+          <p:nvPr/>
+        </p:nvPicPr>
+        <p:blipFill>
+          <a:blip r:embed="rId2">
+            <a:extLst>
+              <a:ext uri="{28A0092B-C50C-407E-A947-70E740481C1C}">
+                <a14:useLocalDpi xmlns:a14="http://schemas.microsoft.com/office/drawing/2010/main" val="0"/>
+              </a:ext>
+            </a:extLst>
+          </a:blip>
+          <a:stretch>
+            <a:fillRect/>
+          </a:stretch>
+        </p:blipFill>
+        <p:spPr>
+          <a:xfrm>
+            <a:off x="938721" y="2168342"/>
+            <a:ext cx="9663262" cy="1244600"/>
+          </a:xfrm>
+          <a:prstGeom prst="rect">
+            <a:avLst/>
+          </a:prstGeom>
+        </p:spPr>
+      </p:pic>
+      <p:cxnSp>
+        <p:nvCxnSpPr>
+          <p:cNvPr id="5" name="Straight Connector 4"/>
+          <p:cNvCxnSpPr/>
+          <p:nvPr/>
+        </p:nvCxnSpPr>
+        <p:spPr>
+          <a:xfrm>
+            <a:off x="3260785" y="2501659"/>
+            <a:ext cx="1673524" cy="690113"/>
+          </a:xfrm>
+          <a:prstGeom prst="line">
+            <a:avLst/>
+          </a:prstGeom>
+          <a:ln>
+            <a:solidFill>
+              <a:srgbClr val="C00000"/>
+            </a:solidFill>
+          </a:ln>
+        </p:spPr>
+        <p:style>
+          <a:lnRef idx="1">
+            <a:schemeClr val="accent1"/>
+          </a:lnRef>
+          <a:fillRef idx="0">
+            <a:schemeClr val="accent1"/>
+          </a:fillRef>
+          <a:effectRef idx="0">
+            <a:schemeClr val="accent1"/>
+          </a:effectRef>
+          <a:fontRef idx="minor">
+            <a:schemeClr val="tx1"/>
+          </a:fontRef>
+        </p:style>
+      </p:cxnSp>
+      <p:cxnSp>
+        <p:nvCxnSpPr>
+          <p:cNvPr id="6" name="Straight Connector 5"/>
+          <p:cNvCxnSpPr/>
+          <p:nvPr/>
+        </p:nvCxnSpPr>
+        <p:spPr>
+          <a:xfrm flipV="1">
+            <a:off x="3260785" y="2497345"/>
+            <a:ext cx="1673524" cy="690113"/>
+          </a:xfrm>
+          <a:prstGeom prst="line">
+            <a:avLst/>
+          </a:prstGeom>
+          <a:ln>
+            <a:solidFill>
+              <a:srgbClr val="C00000"/>
+            </a:solidFill>
+          </a:ln>
+        </p:spPr>
+        <p:style>
+          <a:lnRef idx="1">
+            <a:schemeClr val="accent1"/>
+          </a:lnRef>
+          <a:fillRef idx="0">
+            <a:schemeClr val="accent1"/>
+          </a:fillRef>
+          <a:effectRef idx="0">
+            <a:schemeClr val="accent1"/>
+          </a:effectRef>
+          <a:fontRef idx="minor">
+            <a:schemeClr val="tx1"/>
+          </a:fontRef>
+        </p:style>
+      </p:cxnSp>
+      <p:cxnSp>
+        <p:nvCxnSpPr>
+          <p:cNvPr id="8" name="Straight Arrow Connector 7"/>
+          <p:cNvCxnSpPr/>
+          <p:nvPr/>
+        </p:nvCxnSpPr>
+        <p:spPr>
+          <a:xfrm flipV="1">
+            <a:off x="9364213" y="3482766"/>
+            <a:ext cx="0" cy="655608"/>
+          </a:xfrm>
+          <a:prstGeom prst="straightConnector1">
+            <a:avLst/>
+          </a:prstGeom>
+          <a:ln>
+            <a:solidFill>
+              <a:srgbClr val="C00000"/>
+            </a:solidFill>
+            <a:tailEnd type="triangle"/>
+          </a:ln>
+        </p:spPr>
+        <p:style>
+          <a:lnRef idx="1">
+            <a:schemeClr val="accent1"/>
+          </a:lnRef>
+          <a:fillRef idx="0">
+            <a:schemeClr val="accent1"/>
+          </a:fillRef>
+          <a:effectRef idx="0">
+            <a:schemeClr val="accent1"/>
+          </a:effectRef>
+          <a:fontRef idx="minor">
+            <a:schemeClr val="tx1"/>
+          </a:fontRef>
+        </p:style>
+      </p:cxnSp>
+      <p:sp>
+        <p:nvSpPr>
+          <p:cNvPr id="9" name="TextBox 8"/>
+          <p:cNvSpPr txBox="1"/>
+          <p:nvPr/>
+        </p:nvSpPr>
+        <p:spPr>
+          <a:xfrm>
+            <a:off x="7281053" y="4190945"/>
+            <a:ext cx="4166319" cy="830997"/>
+          </a:xfrm>
+          <a:prstGeom prst="rect">
+            <a:avLst/>
+          </a:prstGeom>
+          <a:noFill/>
+        </p:spPr>
+        <p:txBody>
+          <a:bodyPr wrap="square" rtlCol="0">
+            <a:spAutoFit/>
+          </a:bodyPr>
+          <a:lstStyle/>
+          <a:p>
+            <a:pPr algn="ctr"/>
+            <a:r>
+              <a:rPr lang="en-US" sz="2400">
+                <a:solidFill>
+                  <a:srgbClr val="C00000"/>
+                </a:solidFill>
+              </a:rPr>
+              <a:t>total number of words in training text</a:t>
+            </a:r>
+            <a:endParaRPr lang="en-US">
+              <a:solidFill>
+                <a:srgbClr val="C00000"/>
+              </a:solidFill>
+            </a:endParaRPr>
+          </a:p>
+        </p:txBody>
+      </p:sp>
+    </p:spTree>
+    <p:extLst>
+      <p:ext uri="{BB962C8B-B14F-4D97-AF65-F5344CB8AC3E}">
+        <p14:creationId xmlns:p14="http://schemas.microsoft.com/office/powerpoint/2010/main" val="491942807"/>
+      </p:ext>
+    </p:extLst>
+  </p:cSld>
+  <p:clrMapOvr>
+    <a:masterClrMapping/>
+  </p:clrMapOvr>
+</p:sld>
+</file>
+
+<file path=ppt/slides/slide3.xml><?xml version="1.0" encoding="utf-8"?>
+<p:sld xmlns:a="http://schemas.openxmlformats.org/drawingml/2006/main" xmlns:r="http://schemas.openxmlformats.org/officeDocument/2006/relationships" xmlns:p="http://schemas.openxmlformats.org/presentationml/2006/main">
+  <p:cSld>
+    <p:spTree>
+      <p:nvGrpSpPr>
+        <p:cNvPr id="1" name=""/>
+        <p:cNvGrpSpPr/>
+        <p:nvPr/>
+      </p:nvGrpSpPr>
+      <p:grpSpPr>
+        <a:xfrm>
+          <a:off x="0" y="0"/>
+          <a:ext cx="0" cy="0"/>
+          <a:chOff x="0" y="0"/>
+          <a:chExt cx="0" cy="0"/>
+        </a:xfrm>
+      </p:grpSpPr>
+      <p:pic>
+        <p:nvPicPr>
+          <p:cNvPr id="2" name="Picture 1"/>
+          <p:cNvPicPr>
+            <a:picLocks noChangeAspect="1"/>
+          </p:cNvPicPr>
+          <p:nvPr/>
+        </p:nvPicPr>
+        <p:blipFill>
+          <a:blip r:embed="rId2">
+            <a:extLst>
+              <a:ext uri="{28A0092B-C50C-407E-A947-70E740481C1C}">
+                <a14:useLocalDpi xmlns:a14="http://schemas.microsoft.com/office/drawing/2010/main" val="0"/>
+              </a:ext>
+            </a:extLst>
+          </a:blip>
+          <a:stretch>
+            <a:fillRect/>
+          </a:stretch>
+        </p:blipFill>
+        <p:spPr>
+          <a:xfrm>
+            <a:off x="1203025" y="2634172"/>
+            <a:ext cx="6598728" cy="1244600"/>
+          </a:xfrm>
+          <a:prstGeom prst="rect">
+            <a:avLst/>
+          </a:prstGeom>
+        </p:spPr>
+      </p:pic>
+      <p:cxnSp>
+        <p:nvCxnSpPr>
+          <p:cNvPr id="7" name="Straight Arrow Connector 6"/>
+          <p:cNvCxnSpPr/>
+          <p:nvPr/>
+        </p:nvCxnSpPr>
+        <p:spPr>
+          <a:xfrm flipV="1">
+            <a:off x="6907021" y="3878772"/>
+            <a:ext cx="0" cy="655608"/>
+          </a:xfrm>
+          <a:prstGeom prst="straightConnector1">
+            <a:avLst/>
+          </a:prstGeom>
+          <a:ln>
+            <a:solidFill>
+              <a:srgbClr val="C00000"/>
+            </a:solidFill>
+            <a:tailEnd type="triangle"/>
+          </a:ln>
+        </p:spPr>
+        <p:style>
+          <a:lnRef idx="1">
+            <a:schemeClr val="accent1"/>
+          </a:lnRef>
+          <a:fillRef idx="0">
+            <a:schemeClr val="accent1"/>
+          </a:fillRef>
+          <a:effectRef idx="0">
+            <a:schemeClr val="accent1"/>
+          </a:effectRef>
+          <a:fontRef idx="minor">
+            <a:schemeClr val="tx1"/>
+          </a:fontRef>
+        </p:style>
+      </p:cxnSp>
+      <p:sp>
+        <p:nvSpPr>
+          <p:cNvPr id="8" name="TextBox 7"/>
+          <p:cNvSpPr txBox="1"/>
+          <p:nvPr/>
+        </p:nvSpPr>
+        <p:spPr>
+          <a:xfrm>
+            <a:off x="4677092" y="4548518"/>
+            <a:ext cx="4459857" cy="738664"/>
+          </a:xfrm>
+          <a:prstGeom prst="rect">
+            <a:avLst/>
+          </a:prstGeom>
+          <a:noFill/>
+        </p:spPr>
+        <p:txBody>
+          <a:bodyPr wrap="square" rtlCol="0">
+            <a:spAutoFit/>
+          </a:bodyPr>
+          <a:lstStyle/>
+          <a:p>
+            <a:pPr algn="ctr"/>
+            <a:r>
+              <a:rPr lang="en-US" sz="2400">
+                <a:solidFill>
+                  <a:srgbClr val="C00000"/>
+                </a:solidFill>
+              </a:rPr>
+              <a:t>unigram vocabulary size</a:t>
+            </a:r>
+          </a:p>
+          <a:p>
+            <a:pPr algn="ctr"/>
+            <a:r>
+              <a:rPr lang="en-US">
+                <a:solidFill>
+                  <a:srgbClr val="C00000"/>
+                </a:solidFill>
+              </a:rPr>
+              <a:t>(number of unique unigrams in training text)</a:t>
+            </a:r>
+          </a:p>
+        </p:txBody>
+      </p:sp>
+    </p:spTree>
+    <p:extLst>
+      <p:ext uri="{BB962C8B-B14F-4D97-AF65-F5344CB8AC3E}">
+        <p14:creationId xmlns:p14="http://schemas.microsoft.com/office/powerpoint/2010/main" val="1304958663"/>
+      </p:ext>
+    </p:extLst>
+  </p:cSld>
+  <p:clrMapOvr>
+    <a:masterClrMapping/>
+  </p:clrMapOvr>
+</p:sld>
+</file>
+
+<file path=ppt/slides/slide4.xml><?xml version="1.0" encoding="utf-8"?>
+<p:sld xmlns:a="http://schemas.openxmlformats.org/drawingml/2006/main" xmlns:r="http://schemas.openxmlformats.org/officeDocument/2006/relationships" xmlns:p="http://schemas.openxmlformats.org/presentationml/2006/main">
+  <p:cSld>
+    <p:spTree>
+      <p:nvGrpSpPr>
+        <p:cNvPr id="1" name=""/>
+        <p:cNvGrpSpPr/>
+        <p:nvPr/>
+      </p:nvGrpSpPr>
+      <p:grpSpPr>
+        <a:xfrm>
+          <a:off x="0" y="0"/>
+          <a:ext cx="0" cy="0"/>
+          <a:chOff x="0" y="0"/>
+          <a:chExt cx="0" cy="0"/>
+        </a:xfrm>
+      </p:grpSpPr>
+      <p:pic>
+        <p:nvPicPr>
+          <p:cNvPr id="2" name="Picture 1"/>
+          <p:cNvPicPr>
+            <a:picLocks noChangeAspect="1"/>
+          </p:cNvPicPr>
+          <p:nvPr/>
+        </p:nvPicPr>
+        <p:blipFill>
+          <a:blip r:embed="rId2">
+            <a:extLst>
+              <a:ext uri="{28A0092B-C50C-407E-A947-70E740481C1C}">
+                <a14:useLocalDpi xmlns:a14="http://schemas.microsoft.com/office/drawing/2010/main" val="0"/>
+              </a:ext>
+            </a:extLst>
+          </a:blip>
+          <a:stretch>
+            <a:fillRect/>
+          </a:stretch>
+        </p:blipFill>
+        <p:spPr>
+          <a:xfrm>
+            <a:off x="1968500" y="2806700"/>
+            <a:ext cx="8255000" cy="1244600"/>
+          </a:xfrm>
+          <a:prstGeom prst="rect">
+            <a:avLst/>
+          </a:prstGeom>
+        </p:spPr>
+      </p:pic>
+    </p:spTree>
+    <p:extLst>
+      <p:ext uri="{BB962C8B-B14F-4D97-AF65-F5344CB8AC3E}">
+        <p14:creationId xmlns:p14="http://schemas.microsoft.com/office/powerpoint/2010/main" val="162767986"/>
+      </p:ext>
+    </p:extLst>
+  </p:cSld>
+  <p:clrMapOvr>
+    <a:masterClrMapping/>
+  </p:clrMapOvr>
+</p:sld>
+</file>
+
+<file path=ppt/slides/slide5.xml><?xml version="1.0" encoding="utf-8"?>
+<p:sld xmlns:a="http://schemas.openxmlformats.org/drawingml/2006/main" xmlns:r="http://schemas.openxmlformats.org/officeDocument/2006/relationships" xmlns:p="http://schemas.openxmlformats.org/presentationml/2006/main">
+  <p:cSld>
+    <p:spTree>
+      <p:nvGrpSpPr>
+        <p:cNvPr id="1" name=""/>
+        <p:cNvGrpSpPr/>
+        <p:nvPr/>
+      </p:nvGrpSpPr>
+      <p:grpSpPr>
+        <a:xfrm>
+          <a:off x="0" y="0"/>
+          <a:ext cx="0" cy="0"/>
+          <a:chOff x="0" y="0"/>
+          <a:chExt cx="0" cy="0"/>
+        </a:xfrm>
+      </p:grpSpPr>
+      <p:pic>
+        <p:nvPicPr>
+          <p:cNvPr id="2" name="Picture 1"/>
+          <p:cNvPicPr>
+            <a:picLocks noChangeAspect="1"/>
+          </p:cNvPicPr>
+          <p:nvPr/>
+        </p:nvPicPr>
+        <p:blipFill>
+          <a:blip r:embed="rId2">
+            <a:extLst>
+              <a:ext uri="{28A0092B-C50C-407E-A947-70E740481C1C}">
+                <a14:useLocalDpi xmlns:a14="http://schemas.microsoft.com/office/drawing/2010/main" val="0"/>
+              </a:ext>
+            </a:extLst>
+          </a:blip>
+          <a:stretch>
+            <a:fillRect/>
+          </a:stretch>
+        </p:blipFill>
+        <p:spPr>
+          <a:xfrm>
+            <a:off x="874383" y="646022"/>
+            <a:ext cx="10236200" cy="4013200"/>
+          </a:xfrm>
+          <a:prstGeom prst="rect">
+            <a:avLst/>
+          </a:prstGeom>
+        </p:spPr>
+      </p:pic>
+      <p:cxnSp>
+        <p:nvCxnSpPr>
+          <p:cNvPr id="3" name="Straight Arrow Connector 2"/>
+          <p:cNvCxnSpPr/>
+          <p:nvPr/>
+        </p:nvCxnSpPr>
+        <p:spPr>
+          <a:xfrm flipV="1">
+            <a:off x="8880655" y="4622412"/>
+            <a:ext cx="0" cy="655608"/>
+          </a:xfrm>
+          <a:prstGeom prst="straightConnector1">
+            <a:avLst/>
+          </a:prstGeom>
+          <a:ln>
+            <a:solidFill>
+              <a:srgbClr val="C00000"/>
+            </a:solidFill>
+            <a:tailEnd type="triangle"/>
+          </a:ln>
+        </p:spPr>
+        <p:style>
+          <a:lnRef idx="1">
+            <a:schemeClr val="accent1"/>
+          </a:lnRef>
+          <a:fillRef idx="0">
+            <a:schemeClr val="accent1"/>
+          </a:fillRef>
+          <a:effectRef idx="0">
+            <a:schemeClr val="accent1"/>
+          </a:effectRef>
+          <a:fontRef idx="minor">
+            <a:schemeClr val="tx1"/>
+          </a:fontRef>
+        </p:style>
+      </p:cxnSp>
+      <p:sp>
+        <p:nvSpPr>
+          <p:cNvPr id="4" name="TextBox 3"/>
+          <p:cNvSpPr txBox="1"/>
+          <p:nvPr/>
+        </p:nvSpPr>
+        <p:spPr>
+          <a:xfrm>
+            <a:off x="6650726" y="5292158"/>
+            <a:ext cx="4459857" cy="830997"/>
+          </a:xfrm>
+          <a:prstGeom prst="rect">
+            <a:avLst/>
+          </a:prstGeom>
+          <a:noFill/>
+        </p:spPr>
+        <p:txBody>
+          <a:bodyPr wrap="square" rtlCol="0">
+            <a:spAutoFit/>
+          </a:bodyPr>
+          <a:lstStyle/>
+          <a:p>
+            <a:pPr algn="ctr"/>
+            <a:r>
+              <a:rPr lang="en-US" sz="2400">
+                <a:solidFill>
+                  <a:srgbClr val="C00000"/>
+                </a:solidFill>
+              </a:rPr>
+              <a:t>total number of words in evaluation text</a:t>
+            </a:r>
+            <a:endParaRPr lang="en-US">
+              <a:solidFill>
+                <a:srgbClr val="C00000"/>
+              </a:solidFill>
+            </a:endParaRPr>
+          </a:p>
+        </p:txBody>
+      </p:sp>
+    </p:spTree>
+    <p:extLst>
+      <p:ext uri="{BB962C8B-B14F-4D97-AF65-F5344CB8AC3E}">
+        <p14:creationId xmlns:p14="http://schemas.microsoft.com/office/powerpoint/2010/main" val="1303311434"/>
+      </p:ext>
+    </p:extLst>
+  </p:cSld>
+  <p:clrMapOvr>
+    <a:masterClrMapping/>
+  </p:clrMapOvr>
+</p:sld>
+</file>
+
+<file path=ppt/slides/slide6.xml><?xml version="1.0" encoding="utf-8"?>
+<p:sld xmlns:a="http://schemas.openxmlformats.org/drawingml/2006/main" xmlns:r="http://schemas.openxmlformats.org/officeDocument/2006/relationships" xmlns:p="http://schemas.openxmlformats.org/presentationml/2006/main">
+  <p:cSld>
+    <p:spTree>
+      <p:nvGrpSpPr>
+        <p:cNvPr id="1" name=""/>
+        <p:cNvGrpSpPr/>
+        <p:nvPr/>
+      </p:nvGrpSpPr>
+      <p:grpSpPr>
+        <a:xfrm>
+          <a:off x="0" y="0"/>
+          <a:ext cx="0" cy="0"/>
+          <a:chOff x="0" y="0"/>
+          <a:chExt cx="0" cy="0"/>
+        </a:xfrm>
+      </p:grpSpPr>
+      <p:pic>
+        <p:nvPicPr>
+          <p:cNvPr id="12" name="Picture 11"/>
+          <p:cNvPicPr>
+            <a:picLocks noChangeAspect="1"/>
+          </p:cNvPicPr>
+          <p:nvPr/>
+        </p:nvPicPr>
+        <p:blipFill>
+          <a:blip r:embed="rId3">
+            <a:extLst>
+              <a:ext uri="{28A0092B-C50C-407E-A947-70E740481C1C}">
+                <a14:useLocalDpi xmlns:a14="http://schemas.microsoft.com/office/drawing/2010/main" val="0"/>
+              </a:ext>
+            </a:extLst>
+          </a:blip>
+          <a:stretch>
+            <a:fillRect/>
+          </a:stretch>
+        </p:blipFill>
+        <p:spPr>
+          <a:xfrm>
+            <a:off x="2810936" y="975483"/>
+            <a:ext cx="7433733" cy="2375729"/>
+          </a:xfrm>
+          <a:prstGeom prst="rect">
+            <a:avLst/>
+          </a:prstGeom>
+        </p:spPr>
+      </p:pic>
+      <p:pic>
+        <p:nvPicPr>
+          <p:cNvPr id="13" name="Picture 12"/>
+          <p:cNvPicPr>
+            <a:picLocks noChangeAspect="1"/>
+          </p:cNvPicPr>
+          <p:nvPr/>
+        </p:nvPicPr>
+        <p:blipFill>
+          <a:blip r:embed="rId4">
+            <a:extLst>
+              <a:ext uri="{28A0092B-C50C-407E-A947-70E740481C1C}">
+                <a14:useLocalDpi xmlns:a14="http://schemas.microsoft.com/office/drawing/2010/main" val="0"/>
+              </a:ext>
+            </a:extLst>
+          </a:blip>
+          <a:stretch>
+            <a:fillRect/>
+          </a:stretch>
+        </p:blipFill>
+        <p:spPr>
+          <a:xfrm>
+            <a:off x="2810936" y="4312937"/>
+            <a:ext cx="7433730" cy="2375729"/>
+          </a:xfrm>
+          <a:prstGeom prst="rect">
+            <a:avLst/>
+          </a:prstGeom>
+        </p:spPr>
+      </p:pic>
+      <p:sp>
+        <p:nvSpPr>
+          <p:cNvPr id="14" name="TextBox 13"/>
+          <p:cNvSpPr txBox="1"/>
+          <p:nvPr/>
+        </p:nvSpPr>
+        <p:spPr>
+          <a:xfrm>
+            <a:off x="1119716" y="458370"/>
+            <a:ext cx="8822267" cy="461665"/>
+          </a:xfrm>
+          <a:prstGeom prst="rect">
+            <a:avLst/>
+          </a:prstGeom>
+          <a:noFill/>
+        </p:spPr>
+        <p:txBody>
+          <a:bodyPr wrap="square" rtlCol="0">
+            <a:spAutoFit/>
+          </a:bodyPr>
+          <a:lstStyle/>
+          <a:p>
+            <a:r>
+              <a:rPr lang="en-US" sz="2400" u="sng"/>
+              <a:t>Similar unigram distributions between training and evaluation texts</a:t>
+            </a:r>
+          </a:p>
+        </p:txBody>
+      </p:sp>
+      <p:sp>
+        <p:nvSpPr>
+          <p:cNvPr id="15" name="TextBox 14"/>
+          <p:cNvSpPr txBox="1"/>
+          <p:nvPr/>
+        </p:nvSpPr>
+        <p:spPr>
+          <a:xfrm>
+            <a:off x="1119715" y="3796618"/>
+            <a:ext cx="8822267" cy="461665"/>
+          </a:xfrm>
+          <a:prstGeom prst="rect">
+            <a:avLst/>
+          </a:prstGeom>
+          <a:noFill/>
+        </p:spPr>
+        <p:txBody>
+          <a:bodyPr wrap="square" rtlCol="0">
+            <a:spAutoFit/>
+          </a:bodyPr>
+          <a:lstStyle/>
+          <a:p>
+            <a:r>
+              <a:rPr lang="en-US" sz="2400" u="sng"/>
+              <a:t>Different unigram distributions between training and evaluation texts</a:t>
+            </a:r>
+          </a:p>
+        </p:txBody>
+      </p:sp>
+      <p:graphicFrame>
+        <p:nvGraphicFramePr>
+          <p:cNvPr id="16" name="Object 15"/>
+          <p:cNvGraphicFramePr>
+            <a:graphicFrameLocks noChangeAspect="1"/>
+          </p:cNvGraphicFramePr>
+          <p:nvPr>
+            <p:extLst>
+              <p:ext uri="{D42A27DB-BD31-4B8C-83A1-F6EECF244321}">
+                <p14:modId xmlns:p14="http://schemas.microsoft.com/office/powerpoint/2010/main" val="32680535"/>
+              </p:ext>
+            </p:extLst>
+          </p:nvPr>
+        </p:nvGraphicFramePr>
+        <p:xfrm>
+          <a:off x="1119715" y="1145211"/>
+          <a:ext cx="1892300" cy="1193800"/>
+        </p:xfrm>
+        <a:graphic>
+          <a:graphicData uri="http://schemas.openxmlformats.org/presentationml/2006/ole">
+            <mc:AlternateContent xmlns:mc="http://schemas.openxmlformats.org/markup-compatibility/2006">
+              <mc:Choice xmlns:v="urn:schemas-microsoft-com:vml" Requires="v">
+                <p:oleObj spid="_x0000_s1033" name="Worksheet" r:id="rId5" imgW="1892300" imgH="1193800" progId="Excel.Sheet.12">
+                  <p:embed/>
+                </p:oleObj>
+              </mc:Choice>
+              <mc:Fallback>
+                <p:oleObj name="Worksheet" r:id="rId5" imgW="1892300" imgH="1193800" progId="Excel.Sheet.12">
+                  <p:embed/>
+                  <p:pic>
+                    <p:nvPicPr>
+                      <p:cNvPr id="0" name=""/>
+                      <p:cNvPicPr/>
+                      <p:nvPr/>
+                    </p:nvPicPr>
+                    <p:blipFill>
+                      <a:blip r:embed="rId6"/>
+                      <a:stretch>
+                        <a:fillRect/>
+                      </a:stretch>
+                    </p:blipFill>
+                    <p:spPr>
+                      <a:xfrm>
+                        <a:off x="1119715" y="1145211"/>
+                        <a:ext cx="1892300" cy="1193800"/>
+                      </a:xfrm>
+                      <a:prstGeom prst="rect">
+                        <a:avLst/>
+                      </a:prstGeom>
+                    </p:spPr>
+                  </p:pic>
+                </p:oleObj>
+              </mc:Fallback>
+            </mc:AlternateContent>
+          </a:graphicData>
+        </a:graphic>
+      </p:graphicFrame>
+      <p:graphicFrame>
+        <p:nvGraphicFramePr>
+          <p:cNvPr id="17" name="Object 16"/>
+          <p:cNvGraphicFramePr>
+            <a:graphicFrameLocks noChangeAspect="1"/>
+          </p:cNvGraphicFramePr>
+          <p:nvPr>
+            <p:extLst>
+              <p:ext uri="{D42A27DB-BD31-4B8C-83A1-F6EECF244321}">
+                <p14:modId xmlns:p14="http://schemas.microsoft.com/office/powerpoint/2010/main" val="409612050"/>
+              </p:ext>
+            </p:extLst>
+          </p:nvPr>
+        </p:nvGraphicFramePr>
+        <p:xfrm>
+          <a:off x="1119715" y="4483459"/>
+          <a:ext cx="1892300" cy="1193800"/>
+        </p:xfrm>
+        <a:graphic>
+          <a:graphicData uri="http://schemas.openxmlformats.org/presentationml/2006/ole">
+            <mc:AlternateContent xmlns:mc="http://schemas.openxmlformats.org/markup-compatibility/2006">
+              <mc:Choice xmlns:v="urn:schemas-microsoft-com:vml" Requires="v">
+                <p:oleObj spid="_x0000_s1034" name="Worksheet" r:id="rId7" imgW="1892300" imgH="1193800" progId="Excel.Sheet.12">
+                  <p:embed/>
+                </p:oleObj>
+              </mc:Choice>
+              <mc:Fallback>
+                <p:oleObj name="Worksheet" r:id="rId7" imgW="1892300" imgH="1193800" progId="Excel.Sheet.12">
+                  <p:embed/>
+                  <p:pic>
+                    <p:nvPicPr>
+                      <p:cNvPr id="0" name=""/>
+                      <p:cNvPicPr/>
+                      <p:nvPr/>
+                    </p:nvPicPr>
+                    <p:blipFill>
+                      <a:blip r:embed="rId8"/>
+                      <a:stretch>
+                        <a:fillRect/>
+                      </a:stretch>
+                    </p:blipFill>
+                    <p:spPr>
+                      <a:xfrm>
+                        <a:off x="1119715" y="4483459"/>
+                        <a:ext cx="1892300" cy="1193800"/>
+                      </a:xfrm>
+                      <a:prstGeom prst="rect">
+                        <a:avLst/>
+                      </a:prstGeom>
+                    </p:spPr>
+                  </p:pic>
+                </p:oleObj>
+              </mc:Fallback>
+            </mc:AlternateContent>
+          </a:graphicData>
+        </a:graphic>
+      </p:graphicFrame>
+    </p:spTree>
+    <p:extLst>
+      <p:ext uri="{BB962C8B-B14F-4D97-AF65-F5344CB8AC3E}">
+        <p14:creationId xmlns:p14="http://schemas.microsoft.com/office/powerpoint/2010/main" val="431342911"/>
+      </p:ext>
+    </p:extLst>
+  </p:cSld>
+  <p:clrMapOvr>
+    <a:masterClrMapping/>
+  </p:clrMapOvr>
+</p:sld>
+</file>
+
+<file path=ppt/slides/slide7.xml><?xml version="1.0" encoding="utf-8"?>
+<p:sld xmlns:a="http://schemas.openxmlformats.org/drawingml/2006/main" xmlns:r="http://schemas.openxmlformats.org/officeDocument/2006/relationships" xmlns:p="http://schemas.openxmlformats.org/presentationml/2006/main">
+  <p:cSld>
+    <p:spTree>
+      <p:nvGrpSpPr>
+        <p:cNvPr id="1" name=""/>
+        <p:cNvGrpSpPr/>
+        <p:nvPr/>
+      </p:nvGrpSpPr>
+      <p:grpSpPr>
+        <a:xfrm>
+          <a:off x="0" y="0"/>
+          <a:ext cx="0" cy="0"/>
+          <a:chOff x="0" y="0"/>
+          <a:chExt cx="0" cy="0"/>
+        </a:xfrm>
+      </p:grpSpPr>
+      <p:pic>
+        <p:nvPicPr>
+          <p:cNvPr id="2" name="Picture 1"/>
+          <p:cNvPicPr>
+            <a:picLocks noChangeAspect="1"/>
+          </p:cNvPicPr>
+          <p:nvPr/>
+        </p:nvPicPr>
+        <p:blipFill>
+          <a:blip r:embed="rId2">
+            <a:extLst>
+              <a:ext uri="{28A0092B-C50C-407E-A947-70E740481C1C}">
+                <a14:useLocalDpi xmlns:a14="http://schemas.microsoft.com/office/drawing/2010/main" val="0"/>
+              </a:ext>
+            </a:extLst>
+          </a:blip>
+          <a:stretch>
+            <a:fillRect/>
+          </a:stretch>
+        </p:blipFill>
+        <p:spPr>
+          <a:xfrm>
+            <a:off x="434359" y="1358900"/>
+            <a:ext cx="11310582" cy="4127500"/>
+          </a:xfrm>
+          <a:prstGeom prst="rect">
+            <a:avLst/>
+          </a:prstGeom>
+        </p:spPr>
+      </p:pic>
+      <p:sp>
+        <p:nvSpPr>
+          <p:cNvPr id="4" name="TextBox 3"/>
+          <p:cNvSpPr txBox="1"/>
+          <p:nvPr/>
+        </p:nvSpPr>
+        <p:spPr>
+          <a:xfrm>
+            <a:off x="1553028" y="4572000"/>
+            <a:ext cx="478971" cy="369332"/>
+          </a:xfrm>
+          <a:prstGeom prst="rect">
+            <a:avLst/>
+          </a:prstGeom>
+          <a:noFill/>
+        </p:spPr>
+        <p:txBody>
+          <a:bodyPr wrap="square" rtlCol="0">
+            <a:spAutoFit/>
+          </a:bodyPr>
+          <a:lstStyle/>
+          <a:p>
+            <a:pPr algn="ctr"/>
+            <a:r>
+              <a:rPr lang="en-US">
+                <a:solidFill>
+                  <a:srgbClr val="2E9F2B"/>
+                </a:solidFill>
+              </a:rPr>
+              <a:t>his</a:t>
+            </a:r>
+          </a:p>
+        </p:txBody>
+      </p:sp>
+      <p:sp>
+        <p:nvSpPr>
+          <p:cNvPr id="5" name="TextBox 4"/>
+          <p:cNvSpPr txBox="1"/>
+          <p:nvPr/>
+        </p:nvSpPr>
+        <p:spPr>
+          <a:xfrm>
+            <a:off x="1752599" y="3885808"/>
+            <a:ext cx="529771" cy="369332"/>
+          </a:xfrm>
+          <a:prstGeom prst="rect">
+            <a:avLst/>
+          </a:prstGeom>
+          <a:noFill/>
+        </p:spPr>
+        <p:txBody>
+          <a:bodyPr wrap="square" rtlCol="0">
+            <a:spAutoFit/>
+          </a:bodyPr>
+          <a:lstStyle/>
+          <a:p>
+            <a:pPr algn="ctr"/>
+            <a:r>
+              <a:rPr lang="en-US">
+                <a:solidFill>
+                  <a:srgbClr val="2E9F2B"/>
+                </a:solidFill>
+              </a:rPr>
+              <a:t>her</a:t>
+            </a:r>
+          </a:p>
+        </p:txBody>
+      </p:sp>
+      <p:sp>
+        <p:nvSpPr>
+          <p:cNvPr id="6" name="TextBox 5"/>
+          <p:cNvSpPr txBox="1"/>
+          <p:nvPr/>
+        </p:nvSpPr>
+        <p:spPr>
+          <a:xfrm>
+            <a:off x="2383971" y="3885808"/>
+            <a:ext cx="529771" cy="369332"/>
+          </a:xfrm>
+          <a:prstGeom prst="rect">
+            <a:avLst/>
+          </a:prstGeom>
+          <a:noFill/>
+        </p:spPr>
+        <p:txBody>
+          <a:bodyPr wrap="square" rtlCol="0">
+            <a:spAutoFit/>
+          </a:bodyPr>
+          <a:lstStyle/>
+          <a:p>
+            <a:pPr algn="ctr"/>
+            <a:r>
+              <a:rPr lang="en-US">
+                <a:solidFill>
+                  <a:srgbClr val="2E9F2B"/>
+                </a:solidFill>
+              </a:rPr>
+              <a:t>she</a:t>
+            </a:r>
+          </a:p>
+        </p:txBody>
+      </p:sp>
+    </p:spTree>
+    <p:extLst>
+      <p:ext uri="{BB962C8B-B14F-4D97-AF65-F5344CB8AC3E}">
+        <p14:creationId xmlns:p14="http://schemas.microsoft.com/office/powerpoint/2010/main" val="689517930"/>
+      </p:ext>
+    </p:extLst>
+  </p:cSld>
+  <p:clrMapOvr>
+    <a:masterClrMapping/>
+  </p:clrMapOvr>
+</p:sld>
+</file>
+
+<file path=ppt/slides/slide8.xml><?xml version="1.0" encoding="utf-8"?>
+<p:sld xmlns:a="http://schemas.openxmlformats.org/drawingml/2006/main" xmlns:r="http://schemas.openxmlformats.org/officeDocument/2006/relationships" xmlns:p="http://schemas.openxmlformats.org/presentationml/2006/main">
+  <p:cSld>
+    <p:spTree>
+      <p:nvGrpSpPr>
+        <p:cNvPr id="1" name=""/>
+        <p:cNvGrpSpPr/>
+        <p:nvPr/>
+      </p:nvGrpSpPr>
+      <p:grpSpPr>
+        <a:xfrm>
+          <a:off x="0" y="0"/>
+          <a:ext cx="0" cy="0"/>
+          <a:chOff x="0" y="0"/>
+          <a:chExt cx="0" cy="0"/>
+        </a:xfrm>
+      </p:grpSpPr>
+      <p:pic>
+        <p:nvPicPr>
+          <p:cNvPr id="3" name="Picture 2"/>
+          <p:cNvPicPr>
+            <a:picLocks noChangeAspect="1"/>
+          </p:cNvPicPr>
+          <p:nvPr/>
+        </p:nvPicPr>
+        <p:blipFill>
+          <a:blip r:embed="rId2">
+            <a:extLst>
+              <a:ext uri="{28A0092B-C50C-407E-A947-70E740481C1C}">
+                <a14:useLocalDpi xmlns:a14="http://schemas.microsoft.com/office/drawing/2010/main" val="0"/>
+              </a:ext>
+            </a:extLst>
+          </a:blip>
+          <a:stretch>
+            <a:fillRect/>
+          </a:stretch>
+        </p:blipFill>
+        <p:spPr>
+          <a:xfrm>
+            <a:off x="2061029" y="806580"/>
+            <a:ext cx="7939314" cy="3402563"/>
+          </a:xfrm>
+          <a:prstGeom prst="rect">
+            <a:avLst/>
+          </a:prstGeom>
+        </p:spPr>
+      </p:pic>
+      <p:cxnSp>
+        <p:nvCxnSpPr>
+          <p:cNvPr id="4" name="Straight Arrow Connector 3"/>
+          <p:cNvCxnSpPr/>
+          <p:nvPr/>
+        </p:nvCxnSpPr>
+        <p:spPr>
+          <a:xfrm flipV="1">
+            <a:off x="6819627" y="4245041"/>
+            <a:ext cx="0" cy="655608"/>
+          </a:xfrm>
+          <a:prstGeom prst="straightConnector1">
+            <a:avLst/>
+          </a:prstGeom>
+          <a:ln>
+            <a:solidFill>
+              <a:srgbClr val="C00000"/>
+            </a:solidFill>
+            <a:tailEnd type="triangle"/>
+          </a:ln>
+        </p:spPr>
+        <p:style>
+          <a:lnRef idx="1">
+            <a:schemeClr val="accent1"/>
+          </a:lnRef>
+          <a:fillRef idx="0">
+            <a:schemeClr val="accent1"/>
+          </a:fillRef>
+          <a:effectRef idx="0">
+            <a:schemeClr val="accent1"/>
+          </a:effectRef>
+          <a:fontRef idx="minor">
+            <a:schemeClr val="tx1"/>
+          </a:fontRef>
+        </p:style>
+      </p:cxnSp>
+      <p:sp>
+        <p:nvSpPr>
+          <p:cNvPr id="5" name="TextBox 4"/>
+          <p:cNvSpPr txBox="1"/>
+          <p:nvPr/>
+        </p:nvSpPr>
+        <p:spPr>
+          <a:xfrm>
+            <a:off x="5449619" y="4880955"/>
+            <a:ext cx="2740016" cy="830997"/>
+          </a:xfrm>
+          <a:prstGeom prst="rect">
+            <a:avLst/>
+          </a:prstGeom>
+          <a:noFill/>
+        </p:spPr>
+        <p:txBody>
+          <a:bodyPr wrap="square" rtlCol="0">
+            <a:spAutoFit/>
+          </a:bodyPr>
+          <a:lstStyle/>
+          <a:p>
+            <a:pPr algn="ctr"/>
+            <a:r>
+              <a:rPr lang="en-US" sz="2400">
+                <a:solidFill>
+                  <a:srgbClr val="C00000"/>
+                </a:solidFill>
+              </a:rPr>
+              <a:t>un-smoothed unigram probability</a:t>
+            </a:r>
+            <a:endParaRPr lang="en-US">
+              <a:solidFill>
+                <a:srgbClr val="C00000"/>
+              </a:solidFill>
+            </a:endParaRPr>
+          </a:p>
+        </p:txBody>
+      </p:sp>
+      <p:cxnSp>
+        <p:nvCxnSpPr>
+          <p:cNvPr id="8" name="Straight Arrow Connector 7"/>
+          <p:cNvCxnSpPr/>
+          <p:nvPr/>
+        </p:nvCxnSpPr>
+        <p:spPr>
+          <a:xfrm flipV="1">
+            <a:off x="9574157" y="4209143"/>
+            <a:ext cx="0" cy="655608"/>
+          </a:xfrm>
+          <a:prstGeom prst="straightConnector1">
+            <a:avLst/>
+          </a:prstGeom>
+          <a:ln>
+            <a:solidFill>
+              <a:srgbClr val="C00000"/>
+            </a:solidFill>
+            <a:tailEnd type="triangle"/>
+          </a:ln>
+        </p:spPr>
+        <p:style>
+          <a:lnRef idx="1">
+            <a:schemeClr val="accent1"/>
+          </a:lnRef>
+          <a:fillRef idx="0">
+            <a:schemeClr val="accent1"/>
+          </a:fillRef>
+          <a:effectRef idx="0">
+            <a:schemeClr val="accent1"/>
+          </a:effectRef>
+          <a:fontRef idx="minor">
+            <a:schemeClr val="tx1"/>
+          </a:fontRef>
+        </p:style>
+      </p:cxnSp>
+      <p:sp>
+        <p:nvSpPr>
+          <p:cNvPr id="9" name="TextBox 8"/>
+          <p:cNvSpPr txBox="1"/>
+          <p:nvPr/>
+        </p:nvSpPr>
+        <p:spPr>
+          <a:xfrm>
+            <a:off x="8320460" y="4880954"/>
+            <a:ext cx="2507394" cy="830997"/>
+          </a:xfrm>
+          <a:prstGeom prst="rect">
+            <a:avLst/>
+          </a:prstGeom>
+          <a:noFill/>
+        </p:spPr>
+        <p:txBody>
+          <a:bodyPr wrap="square" rtlCol="0">
+            <a:spAutoFit/>
+          </a:bodyPr>
+          <a:lstStyle/>
+          <a:p>
+            <a:pPr algn="ctr"/>
+            <a:r>
+              <a:rPr lang="en-US" sz="2400">
+                <a:solidFill>
+                  <a:srgbClr val="C00000"/>
+                </a:solidFill>
+              </a:rPr>
+              <a:t>uniform probability</a:t>
+            </a:r>
+            <a:endParaRPr lang="en-US">
+              <a:solidFill>
+                <a:srgbClr val="C00000"/>
+              </a:solidFill>
+            </a:endParaRPr>
+          </a:p>
+        </p:txBody>
+      </p:sp>
+    </p:spTree>
+    <p:extLst>
+      <p:ext uri="{BB962C8B-B14F-4D97-AF65-F5344CB8AC3E}">
+        <p14:creationId xmlns:p14="http://schemas.microsoft.com/office/powerpoint/2010/main" val="778292815"/>
+      </p:ext>
+    </p:extLst>
+  </p:cSld>
+  <p:clrMapOvr>
+    <a:masterClrMapping/>
+  </p:clrMapOvr>
+</p:sld>
+</file>
+
+<file path=ppt/slides/slide9.xml><?xml version="1.0" encoding="utf-8"?>
+<p:sld xmlns:a="http://schemas.openxmlformats.org/drawingml/2006/main" xmlns:r="http://schemas.openxmlformats.org/officeDocument/2006/relationships" xmlns:p="http://schemas.openxmlformats.org/presentationml/2006/main">
+  <p:cSld>
+    <p:spTree>
+      <p:nvGrpSpPr>
+        <p:cNvPr id="1" name=""/>
+        <p:cNvGrpSpPr/>
+        <p:nvPr/>
+      </p:nvGrpSpPr>
+      <p:grpSpPr>
+        <a:xfrm>
+          <a:off x="0" y="0"/>
+          <a:ext cx="0" cy="0"/>
+          <a:chOff x="0" y="0"/>
+          <a:chExt cx="0" cy="0"/>
+        </a:xfrm>
+      </p:grpSpPr>
+      <p:pic>
+        <p:nvPicPr>
+          <p:cNvPr id="2" name="Picture 1"/>
+          <p:cNvPicPr>
+            <a:picLocks noChangeAspect="1"/>
+          </p:cNvPicPr>
+          <p:nvPr/>
+        </p:nvPicPr>
+        <p:blipFill>
+          <a:blip r:embed="rId2">
+            <a:extLst>
+              <a:ext uri="{28A0092B-C50C-407E-A947-70E740481C1C}">
+                <a14:useLocalDpi xmlns:a14="http://schemas.microsoft.com/office/drawing/2010/main" val="0"/>
+              </a:ext>
+            </a:extLst>
+          </a:blip>
+          <a:stretch>
+            <a:fillRect/>
+          </a:stretch>
+        </p:blipFill>
+        <p:spPr>
+          <a:xfrm>
+            <a:off x="1275965" y="694872"/>
+            <a:ext cx="9956800" cy="1346200"/>
+          </a:xfrm>
+          <a:prstGeom prst="rect">
+            <a:avLst/>
+          </a:prstGeom>
+        </p:spPr>
+      </p:pic>
+      <p:cxnSp>
+        <p:nvCxnSpPr>
+          <p:cNvPr id="3" name="Straight Arrow Connector 2"/>
+          <p:cNvCxnSpPr/>
+          <p:nvPr/>
+        </p:nvCxnSpPr>
+        <p:spPr>
+          <a:xfrm flipV="1">
+            <a:off x="1985077" y="1806641"/>
+            <a:ext cx="0" cy="655608"/>
+          </a:xfrm>
+          <a:prstGeom prst="straightConnector1">
+            <a:avLst/>
+          </a:prstGeom>
+          <a:ln>
+            <a:solidFill>
+              <a:srgbClr val="C00000"/>
+            </a:solidFill>
+            <a:tailEnd type="triangle"/>
+          </a:ln>
+        </p:spPr>
+        <p:style>
+          <a:lnRef idx="1">
+            <a:schemeClr val="accent1"/>
+          </a:lnRef>
+          <a:fillRef idx="0">
+            <a:schemeClr val="accent1"/>
+          </a:fillRef>
+          <a:effectRef idx="0">
+            <a:schemeClr val="accent1"/>
+          </a:effectRef>
+          <a:fontRef idx="minor">
+            <a:schemeClr val="tx1"/>
+          </a:fontRef>
+        </p:style>
+      </p:cxnSp>
+      <p:sp>
+        <p:nvSpPr>
+          <p:cNvPr id="4" name="TextBox 3"/>
+          <p:cNvSpPr txBox="1"/>
+          <p:nvPr/>
+        </p:nvSpPr>
+        <p:spPr>
+          <a:xfrm>
+            <a:off x="0" y="2500612"/>
+            <a:ext cx="3970153" cy="830997"/>
+          </a:xfrm>
+          <a:prstGeom prst="rect">
+            <a:avLst/>
+          </a:prstGeom>
+          <a:noFill/>
+        </p:spPr>
+        <p:txBody>
+          <a:bodyPr wrap="square" rtlCol="0">
+            <a:spAutoFit/>
+          </a:bodyPr>
+          <a:lstStyle/>
+          <a:p>
+            <a:pPr algn="ctr"/>
+            <a:r>
+              <a:rPr lang="en-US" sz="2400">
+                <a:solidFill>
+                  <a:srgbClr val="C00000"/>
+                </a:solidFill>
+              </a:rPr>
+              <a:t>proportion of un-smoothed unigram model</a:t>
+            </a:r>
+            <a:endParaRPr lang="en-US">
+              <a:solidFill>
+                <a:srgbClr val="C00000"/>
+              </a:solidFill>
+            </a:endParaRPr>
+          </a:p>
+        </p:txBody>
+      </p:sp>
+    </p:spTree>
+    <p:extLst>
+      <p:ext uri="{BB962C8B-B14F-4D97-AF65-F5344CB8AC3E}">
+        <p14:creationId xmlns:p14="http://schemas.microsoft.com/office/powerpoint/2010/main" val="1616797430"/>
       </p:ext>
     </p:extLst>
   </p:cSld>

</xml_diff>

<commit_message>
Finish part 1 write-up
</commit_message>
<xml_diff>
--- a/ppt/medium.pptx
+++ b/ppt/medium.pptx
@@ -16,6 +16,7 @@
     <p:sldId id="264" r:id="rId10"/>
     <p:sldId id="265" r:id="rId11"/>
     <p:sldId id="266" r:id="rId12"/>
+    <p:sldId id="267" r:id="rId13"/>
   </p:sldIdLst>
   <p:sldSz cx="12192000" cy="6858000"/>
   <p:notesSz cx="6858000" cy="9144000"/>
@@ -4390,6 +4391,248 @@
 </p:sld>
 </file>
 
+<file path=ppt/slides/slide12.xml><?xml version="1.0" encoding="utf-8"?>
+<p:sld xmlns:a="http://schemas.openxmlformats.org/drawingml/2006/main" xmlns:r="http://schemas.openxmlformats.org/officeDocument/2006/relationships" xmlns:p="http://schemas.openxmlformats.org/presentationml/2006/main">
+  <p:cSld>
+    <p:spTree>
+      <p:nvGrpSpPr>
+        <p:cNvPr id="1" name=""/>
+        <p:cNvGrpSpPr/>
+        <p:nvPr/>
+      </p:nvGrpSpPr>
+      <p:grpSpPr>
+        <a:xfrm>
+          <a:off x="0" y="0"/>
+          <a:ext cx="0" cy="0"/>
+          <a:chOff x="0" y="0"/>
+          <a:chExt cx="0" cy="0"/>
+        </a:xfrm>
+      </p:grpSpPr>
+      <p:pic>
+        <p:nvPicPr>
+          <p:cNvPr id="2" name="Picture 1"/>
+          <p:cNvPicPr>
+            <a:picLocks noChangeAspect="1"/>
+          </p:cNvPicPr>
+          <p:nvPr/>
+        </p:nvPicPr>
+        <p:blipFill>
+          <a:blip r:embed="rId2">
+            <a:duotone>
+              <a:prstClr val="black"/>
+              <a:srgbClr val="3DA63C">
+                <a:tint val="45000"/>
+                <a:satMod val="400000"/>
+              </a:srgbClr>
+            </a:duotone>
+            <a:extLst>
+              <a:ext uri="{28A0092B-C50C-407E-A947-70E740481C1C}">
+                <a14:useLocalDpi xmlns:a14="http://schemas.microsoft.com/office/drawing/2010/main" val="0"/>
+              </a:ext>
+            </a:extLst>
+          </a:blip>
+          <a:stretch>
+            <a:fillRect/>
+          </a:stretch>
+        </p:blipFill>
+        <p:spPr>
+          <a:xfrm>
+            <a:off x="8730342" y="611414"/>
+            <a:ext cx="3043348" cy="4648200"/>
+          </a:xfrm>
+          <a:prstGeom prst="rect">
+            <a:avLst/>
+          </a:prstGeom>
+        </p:spPr>
+      </p:pic>
+      <p:pic>
+        <p:nvPicPr>
+          <p:cNvPr id="3" name="Picture 2"/>
+          <p:cNvPicPr>
+            <a:picLocks noChangeAspect="1"/>
+          </p:cNvPicPr>
+          <p:nvPr/>
+        </p:nvPicPr>
+        <p:blipFill rotWithShape="1">
+          <a:blip r:embed="rId3">
+            <a:duotone>
+              <a:prstClr val="black"/>
+              <a:srgbClr val="3985BB">
+                <a:tint val="45000"/>
+                <a:satMod val="400000"/>
+              </a:srgbClr>
+            </a:duotone>
+            <a:extLst>
+              <a:ext uri="{28A0092B-C50C-407E-A947-70E740481C1C}">
+                <a14:useLocalDpi xmlns:a14="http://schemas.microsoft.com/office/drawing/2010/main" val="0"/>
+              </a:ext>
+            </a:extLst>
+          </a:blip>
+          <a:srcRect l="17149" r="17590"/>
+          <a:stretch/>
+        </p:blipFill>
+        <p:spPr>
+          <a:xfrm>
+            <a:off x="4596774" y="611414"/>
+            <a:ext cx="3033486" cy="4648200"/>
+          </a:xfrm>
+          <a:prstGeom prst="rect">
+            <a:avLst/>
+          </a:prstGeom>
+        </p:spPr>
+      </p:pic>
+      <p:pic>
+        <p:nvPicPr>
+          <p:cNvPr id="4" name="Picture 3"/>
+          <p:cNvPicPr>
+            <a:picLocks noChangeAspect="1"/>
+          </p:cNvPicPr>
+          <p:nvPr/>
+        </p:nvPicPr>
+        <p:blipFill>
+          <a:blip r:embed="rId4">
+            <a:duotone>
+              <a:prstClr val="black"/>
+              <a:srgbClr val="D83737">
+                <a:tint val="45000"/>
+                <a:satMod val="400000"/>
+              </a:srgbClr>
+            </a:duotone>
+            <a:extLst>
+              <a:ext uri="{28A0092B-C50C-407E-A947-70E740481C1C}">
+                <a14:useLocalDpi xmlns:a14="http://schemas.microsoft.com/office/drawing/2010/main" val="0"/>
+              </a:ext>
+            </a:extLst>
+          </a:blip>
+          <a:stretch>
+            <a:fillRect/>
+          </a:stretch>
+        </p:blipFill>
+        <p:spPr>
+          <a:xfrm>
+            <a:off x="451758" y="611414"/>
+            <a:ext cx="3044934" cy="4648200"/>
+          </a:xfrm>
+          <a:prstGeom prst="rect">
+            <a:avLst/>
+          </a:prstGeom>
+        </p:spPr>
+      </p:pic>
+      <p:sp>
+        <p:nvSpPr>
+          <p:cNvPr id="5" name="TextBox 4"/>
+          <p:cNvSpPr txBox="1"/>
+          <p:nvPr/>
+        </p:nvSpPr>
+        <p:spPr>
+          <a:xfrm>
+            <a:off x="762282" y="5279571"/>
+            <a:ext cx="2423886" cy="461665"/>
+          </a:xfrm>
+          <a:prstGeom prst="rect">
+            <a:avLst/>
+          </a:prstGeom>
+          <a:noFill/>
+        </p:spPr>
+        <p:txBody>
+          <a:bodyPr wrap="square" rtlCol="0">
+            <a:spAutoFit/>
+          </a:bodyPr>
+          <a:lstStyle/>
+          <a:p>
+            <a:pPr algn="ctr"/>
+            <a:r>
+              <a:rPr lang="en-US" sz="2400">
+                <a:solidFill>
+                  <a:srgbClr val="D83737"/>
+                </a:solidFill>
+              </a:rPr>
+              <a:t>train</a:t>
+            </a:r>
+          </a:p>
+        </p:txBody>
+      </p:sp>
+      <p:sp>
+        <p:nvSpPr>
+          <p:cNvPr id="6" name="TextBox 5"/>
+          <p:cNvSpPr txBox="1"/>
+          <p:nvPr/>
+        </p:nvSpPr>
+        <p:spPr>
+          <a:xfrm>
+            <a:off x="4901574" y="5279570"/>
+            <a:ext cx="2423886" cy="461665"/>
+          </a:xfrm>
+          <a:prstGeom prst="rect">
+            <a:avLst/>
+          </a:prstGeom>
+          <a:noFill/>
+        </p:spPr>
+        <p:txBody>
+          <a:bodyPr wrap="square" rtlCol="0">
+            <a:spAutoFit/>
+          </a:bodyPr>
+          <a:lstStyle/>
+          <a:p>
+            <a:pPr algn="ctr"/>
+            <a:r>
+              <a:rPr lang="en-US" sz="2400">
+                <a:solidFill>
+                  <a:srgbClr val="3985BB"/>
+                </a:solidFill>
+              </a:rPr>
+              <a:t>dev1</a:t>
+            </a:r>
+          </a:p>
+        </p:txBody>
+      </p:sp>
+      <p:sp>
+        <p:nvSpPr>
+          <p:cNvPr id="7" name="TextBox 6"/>
+          <p:cNvSpPr txBox="1"/>
+          <p:nvPr/>
+        </p:nvSpPr>
+        <p:spPr>
+          <a:xfrm>
+            <a:off x="9040073" y="5279570"/>
+            <a:ext cx="2423886" cy="461665"/>
+          </a:xfrm>
+          <a:prstGeom prst="rect">
+            <a:avLst/>
+          </a:prstGeom>
+          <a:noFill/>
+        </p:spPr>
+        <p:txBody>
+          <a:bodyPr wrap="square" rtlCol="0">
+            <a:spAutoFit/>
+          </a:bodyPr>
+          <a:lstStyle/>
+          <a:p>
+            <a:pPr algn="ctr"/>
+            <a:r>
+              <a:rPr lang="en-US" sz="2400">
+                <a:solidFill>
+                  <a:srgbClr val="3DA63C"/>
+                </a:solidFill>
+              </a:rPr>
+              <a:t>dev2</a:t>
+            </a:r>
+          </a:p>
+        </p:txBody>
+      </p:sp>
+    </p:spTree>
+    <p:extLst>
+      <p:ext uri="{BB962C8B-B14F-4D97-AF65-F5344CB8AC3E}">
+        <p14:creationId xmlns:p14="http://schemas.microsoft.com/office/powerpoint/2010/main" val="928061466"/>
+      </p:ext>
+    </p:extLst>
+  </p:cSld>
+  <p:clrMapOvr>
+    <a:masterClrMapping/>
+  </p:clrMapOvr>
+</p:sld>
+</file>
+
 <file path=ppt/slides/slide2.xml><?xml version="1.0" encoding="utf-8"?>
 <p:sld xmlns:a="http://schemas.openxmlformats.org/drawingml/2006/main" xmlns:r="http://schemas.openxmlformats.org/officeDocument/2006/relationships" xmlns:p="http://schemas.openxmlformats.org/presentationml/2006/main">
   <p:cSld>
@@ -5088,7 +5331,7 @@
           <a:graphicData uri="http://schemas.openxmlformats.org/presentationml/2006/ole">
             <mc:AlternateContent xmlns:mc="http://schemas.openxmlformats.org/markup-compatibility/2006">
               <mc:Choice xmlns:v="urn:schemas-microsoft-com:vml" Requires="v">
-                <p:oleObj spid="_x0000_s1033" name="Worksheet" r:id="rId5" imgW="1892300" imgH="1193800" progId="Excel.Sheet.12">
+                <p:oleObj spid="_x0000_s1039" name="Worksheet" r:id="rId5" imgW="1892300" imgH="1193800" progId="Excel.Sheet.12">
                   <p:embed/>
                 </p:oleObj>
               </mc:Choice>
@@ -5145,7 +5388,7 @@
           <a:graphicData uri="http://schemas.openxmlformats.org/presentationml/2006/ole">
             <mc:AlternateContent xmlns:mc="http://schemas.openxmlformats.org/markup-compatibility/2006">
               <mc:Choice xmlns:v="urn:schemas-microsoft-com:vml" Requires="v">
-                <p:oleObj spid="_x0000_s1034" name="Worksheet" r:id="rId7" imgW="1892300" imgH="1193800" progId="Excel.Sheet.12">
+                <p:oleObj spid="_x0000_s1040" name="Worksheet" r:id="rId7" imgW="1892300" imgH="1193800" progId="Excel.Sheet.12">
                   <p:embed/>
                 </p:oleObj>
               </mc:Choice>

</xml_diff>

<commit_message>
Finish part 2 write-up
</commit_message>
<xml_diff>
--- a/ppt/medium.pptx
+++ b/ppt/medium.pptx
@@ -11,12 +11,23 @@
     <p:sldId id="259" r:id="rId5"/>
     <p:sldId id="260" r:id="rId6"/>
     <p:sldId id="261" r:id="rId7"/>
-    <p:sldId id="262" r:id="rId8"/>
-    <p:sldId id="263" r:id="rId9"/>
-    <p:sldId id="264" r:id="rId10"/>
-    <p:sldId id="265" r:id="rId11"/>
-    <p:sldId id="266" r:id="rId12"/>
-    <p:sldId id="267" r:id="rId13"/>
+    <p:sldId id="270" r:id="rId8"/>
+    <p:sldId id="262" r:id="rId9"/>
+    <p:sldId id="263" r:id="rId10"/>
+    <p:sldId id="264" r:id="rId11"/>
+    <p:sldId id="265" r:id="rId12"/>
+    <p:sldId id="266" r:id="rId13"/>
+    <p:sldId id="267" r:id="rId14"/>
+    <p:sldId id="268" r:id="rId15"/>
+    <p:sldId id="269" r:id="rId16"/>
+    <p:sldId id="271" r:id="rId17"/>
+    <p:sldId id="272" r:id="rId18"/>
+    <p:sldId id="273" r:id="rId19"/>
+    <p:sldId id="274" r:id="rId20"/>
+    <p:sldId id="275" r:id="rId21"/>
+    <p:sldId id="276" r:id="rId22"/>
+    <p:sldId id="277" r:id="rId23"/>
+    <p:sldId id="278" r:id="rId24"/>
   </p:sldIdLst>
   <p:sldSz cx="12192000" cy="6858000"/>
   <p:notesSz cx="6858000" cy="9144000"/>
@@ -251,7 +262,7 @@
           <a:lstStyle/>
           <a:p>
             <a:fld id="{DF88F67A-92FA-F745-A6F5-E05B74F10186}" type="datetimeFigureOut">
-              <a:t>5/19/20</a:t>
+              <a:t>5/23/20</a:t>
             </a:fld>
             <a:endParaRPr lang="en-US"/>
           </a:p>
@@ -417,7 +428,7 @@
           <a:lstStyle/>
           <a:p>
             <a:fld id="{DF88F67A-92FA-F745-A6F5-E05B74F10186}" type="datetimeFigureOut">
-              <a:t>5/19/20</a:t>
+              <a:t>5/23/20</a:t>
             </a:fld>
             <a:endParaRPr lang="en-US"/>
           </a:p>
@@ -593,7 +604,7 @@
           <a:lstStyle/>
           <a:p>
             <a:fld id="{DF88F67A-92FA-F745-A6F5-E05B74F10186}" type="datetimeFigureOut">
-              <a:t>5/19/20</a:t>
+              <a:t>5/23/20</a:t>
             </a:fld>
             <a:endParaRPr lang="en-US"/>
           </a:p>
@@ -759,7 +770,7 @@
           <a:lstStyle/>
           <a:p>
             <a:fld id="{DF88F67A-92FA-F745-A6F5-E05B74F10186}" type="datetimeFigureOut">
-              <a:t>5/19/20</a:t>
+              <a:t>5/23/20</a:t>
             </a:fld>
             <a:endParaRPr lang="en-US"/>
           </a:p>
@@ -1002,7 +1013,7 @@
           <a:lstStyle/>
           <a:p>
             <a:fld id="{DF88F67A-92FA-F745-A6F5-E05B74F10186}" type="datetimeFigureOut">
-              <a:t>5/19/20</a:t>
+              <a:t>5/23/20</a:t>
             </a:fld>
             <a:endParaRPr lang="en-US"/>
           </a:p>
@@ -1229,7 +1240,7 @@
           <a:lstStyle/>
           <a:p>
             <a:fld id="{DF88F67A-92FA-F745-A6F5-E05B74F10186}" type="datetimeFigureOut">
-              <a:t>5/19/20</a:t>
+              <a:t>5/23/20</a:t>
             </a:fld>
             <a:endParaRPr lang="en-US"/>
           </a:p>
@@ -1591,7 +1602,7 @@
           <a:lstStyle/>
           <a:p>
             <a:fld id="{DF88F67A-92FA-F745-A6F5-E05B74F10186}" type="datetimeFigureOut">
-              <a:t>5/19/20</a:t>
+              <a:t>5/23/20</a:t>
             </a:fld>
             <a:endParaRPr lang="en-US"/>
           </a:p>
@@ -1706,7 +1717,7 @@
           <a:lstStyle/>
           <a:p>
             <a:fld id="{DF88F67A-92FA-F745-A6F5-E05B74F10186}" type="datetimeFigureOut">
-              <a:t>5/19/20</a:t>
+              <a:t>5/23/20</a:t>
             </a:fld>
             <a:endParaRPr lang="en-US"/>
           </a:p>
@@ -1799,7 +1810,7 @@
           <a:lstStyle/>
           <a:p>
             <a:fld id="{DF88F67A-92FA-F745-A6F5-E05B74F10186}" type="datetimeFigureOut">
-              <a:t>5/19/20</a:t>
+              <a:t>5/23/20</a:t>
             </a:fld>
             <a:endParaRPr lang="en-US"/>
           </a:p>
@@ -2072,7 +2083,7 @@
           <a:lstStyle/>
           <a:p>
             <a:fld id="{DF88F67A-92FA-F745-A6F5-E05B74F10186}" type="datetimeFigureOut">
-              <a:t>5/19/20</a:t>
+              <a:t>5/23/20</a:t>
             </a:fld>
             <a:endParaRPr lang="en-US"/>
           </a:p>
@@ -2322,7 +2333,7 @@
           <a:lstStyle/>
           <a:p>
             <a:fld id="{DF88F67A-92FA-F745-A6F5-E05B74F10186}" type="datetimeFigureOut">
-              <a:t>5/19/20</a:t>
+              <a:t>5/23/20</a:t>
             </a:fld>
             <a:endParaRPr lang="en-US"/>
           </a:p>
@@ -2531,7 +2542,7 @@
           </a:lstStyle>
           <a:p>
             <a:fld id="{DF88F67A-92FA-F745-A6F5-E05B74F10186}" type="datetimeFigureOut">
-              <a:t>5/19/20</a:t>
+              <a:t>5/23/20</a:t>
             </a:fld>
             <a:endParaRPr lang="en-US"/>
           </a:p>
@@ -3025,6 +3036,141 @@
           <a:chExt cx="0" cy="0"/>
         </a:xfrm>
       </p:grpSpPr>
+      <p:pic>
+        <p:nvPicPr>
+          <p:cNvPr id="2" name="Picture 1"/>
+          <p:cNvPicPr>
+            <a:picLocks noChangeAspect="1"/>
+          </p:cNvPicPr>
+          <p:nvPr/>
+        </p:nvPicPr>
+        <p:blipFill>
+          <a:blip r:embed="rId2">
+            <a:extLst>
+              <a:ext uri="{28A0092B-C50C-407E-A947-70E740481C1C}">
+                <a14:useLocalDpi xmlns:a14="http://schemas.microsoft.com/office/drawing/2010/main" val="0"/>
+              </a:ext>
+            </a:extLst>
+          </a:blip>
+          <a:stretch>
+            <a:fillRect/>
+          </a:stretch>
+        </p:blipFill>
+        <p:spPr>
+          <a:xfrm>
+            <a:off x="1275965" y="694872"/>
+            <a:ext cx="9956800" cy="1346200"/>
+          </a:xfrm>
+          <a:prstGeom prst="rect">
+            <a:avLst/>
+          </a:prstGeom>
+        </p:spPr>
+      </p:pic>
+      <p:cxnSp>
+        <p:nvCxnSpPr>
+          <p:cNvPr id="3" name="Straight Arrow Connector 2"/>
+          <p:cNvCxnSpPr/>
+          <p:nvPr/>
+        </p:nvCxnSpPr>
+        <p:spPr>
+          <a:xfrm flipV="1">
+            <a:off x="1985077" y="1806641"/>
+            <a:ext cx="0" cy="655608"/>
+          </a:xfrm>
+          <a:prstGeom prst="straightConnector1">
+            <a:avLst/>
+          </a:prstGeom>
+          <a:ln>
+            <a:solidFill>
+              <a:srgbClr val="C00000"/>
+            </a:solidFill>
+            <a:tailEnd type="triangle"/>
+          </a:ln>
+        </p:spPr>
+        <p:style>
+          <a:lnRef idx="1">
+            <a:schemeClr val="accent1"/>
+          </a:lnRef>
+          <a:fillRef idx="0">
+            <a:schemeClr val="accent1"/>
+          </a:fillRef>
+          <a:effectRef idx="0">
+            <a:schemeClr val="accent1"/>
+          </a:effectRef>
+          <a:fontRef idx="minor">
+            <a:schemeClr val="tx1"/>
+          </a:fontRef>
+        </p:style>
+      </p:cxnSp>
+      <p:sp>
+        <p:nvSpPr>
+          <p:cNvPr id="4" name="TextBox 3"/>
+          <p:cNvSpPr txBox="1"/>
+          <p:nvPr/>
+        </p:nvSpPr>
+        <p:spPr>
+          <a:xfrm>
+            <a:off x="0" y="2500612"/>
+            <a:ext cx="3970153" cy="830997"/>
+          </a:xfrm>
+          <a:prstGeom prst="rect">
+            <a:avLst/>
+          </a:prstGeom>
+          <a:noFill/>
+        </p:spPr>
+        <p:txBody>
+          <a:bodyPr wrap="square" rtlCol="0">
+            <a:spAutoFit/>
+          </a:bodyPr>
+          <a:lstStyle/>
+          <a:p>
+            <a:pPr algn="ctr"/>
+            <a:r>
+              <a:rPr lang="en-US" sz="2400">
+                <a:solidFill>
+                  <a:srgbClr val="C00000"/>
+                </a:solidFill>
+              </a:rPr>
+              <a:t>proportion of un-smoothed unigram model</a:t>
+            </a:r>
+            <a:endParaRPr lang="en-US">
+              <a:solidFill>
+                <a:srgbClr val="C00000"/>
+              </a:solidFill>
+            </a:endParaRPr>
+          </a:p>
+        </p:txBody>
+      </p:sp>
+    </p:spTree>
+    <p:extLst>
+      <p:ext uri="{BB962C8B-B14F-4D97-AF65-F5344CB8AC3E}">
+        <p14:creationId xmlns:p14="http://schemas.microsoft.com/office/powerpoint/2010/main" val="1616797430"/>
+      </p:ext>
+    </p:extLst>
+  </p:cSld>
+  <p:clrMapOvr>
+    <a:masterClrMapping/>
+  </p:clrMapOvr>
+</p:sld>
+</file>
+
+<file path=ppt/slides/slide11.xml><?xml version="1.0" encoding="utf-8"?>
+<p:sld xmlns:a="http://schemas.openxmlformats.org/drawingml/2006/main" xmlns:r="http://schemas.openxmlformats.org/officeDocument/2006/relationships" xmlns:p="http://schemas.openxmlformats.org/presentationml/2006/main">
+  <p:cSld>
+    <p:spTree>
+      <p:nvGrpSpPr>
+        <p:cNvPr id="1" name=""/>
+        <p:cNvGrpSpPr/>
+        <p:nvPr/>
+      </p:nvGrpSpPr>
+      <p:grpSpPr>
+        <a:xfrm>
+          <a:off x="0" y="0"/>
+          <a:ext cx="0" cy="0"/>
+          <a:chOff x="0" y="0"/>
+          <a:chExt cx="0" cy="0"/>
+        </a:xfrm>
+      </p:grpSpPr>
       <p:graphicFrame>
         <p:nvGraphicFramePr>
           <p:cNvPr id="2" name="Table 1"/>
@@ -4075,7 +4221,7 @@
 </p:sld>
 </file>
 
-<file path=ppt/slides/slide11.xml><?xml version="1.0" encoding="utf-8"?>
+<file path=ppt/slides/slide12.xml><?xml version="1.0" encoding="utf-8"?>
 <p:sld xmlns:a="http://schemas.openxmlformats.org/drawingml/2006/main" xmlns:r="http://schemas.openxmlformats.org/officeDocument/2006/relationships" xmlns:p="http://schemas.openxmlformats.org/presentationml/2006/main">
   <p:cSld>
     <p:spTree>
@@ -4386,7 +4532,7 @@
 </p:sld>
 </file>
 
-<file path=ppt/slides/slide12.xml><?xml version="1.0" encoding="utf-8"?>
+<file path=ppt/slides/slide13.xml><?xml version="1.0" encoding="utf-8"?>
 <p:sld xmlns:a="http://schemas.openxmlformats.org/drawingml/2006/main" xmlns:r="http://schemas.openxmlformats.org/officeDocument/2006/relationships" xmlns:p="http://schemas.openxmlformats.org/presentationml/2006/main">
   <p:cSld>
     <p:spTree>
@@ -4625,6 +4771,1658 @@
   <p:clrMapOvr>
     <a:masterClrMapping/>
   </p:clrMapOvr>
+  <p:timing>
+    <p:tnLst>
+      <p:par>
+        <p:cTn id="1" dur="indefinite" restart="never" nodeType="tmRoot"/>
+      </p:par>
+    </p:tnLst>
+  </p:timing>
+</p:sld>
+</file>
+
+<file path=ppt/slides/slide14.xml><?xml version="1.0" encoding="utf-8"?>
+<p:sld xmlns:a="http://schemas.openxmlformats.org/drawingml/2006/main" xmlns:r="http://schemas.openxmlformats.org/officeDocument/2006/relationships" xmlns:p="http://schemas.openxmlformats.org/presentationml/2006/main">
+  <p:cSld>
+    <p:spTree>
+      <p:nvGrpSpPr>
+        <p:cNvPr id="1" name=""/>
+        <p:cNvGrpSpPr/>
+        <p:nvPr/>
+      </p:nvGrpSpPr>
+      <p:grpSpPr>
+        <a:xfrm>
+          <a:off x="0" y="0"/>
+          <a:ext cx="0" cy="0"/>
+          <a:chOff x="0" y="0"/>
+          <a:chExt cx="0" cy="0"/>
+        </a:xfrm>
+      </p:grpSpPr>
+      <p:graphicFrame>
+        <p:nvGraphicFramePr>
+          <p:cNvPr id="3" name="Table 2"/>
+          <p:cNvGraphicFramePr>
+            <a:graphicFrameLocks noGrp="1"/>
+          </p:cNvGraphicFramePr>
+          <p:nvPr>
+            <p:extLst>
+              <p:ext uri="{D42A27DB-BD31-4B8C-83A1-F6EECF244321}">
+                <p14:modId xmlns:p14="http://schemas.microsoft.com/office/powerpoint/2010/main" val="881296649"/>
+              </p:ext>
+            </p:extLst>
+          </p:nvPr>
+        </p:nvGraphicFramePr>
+        <p:xfrm>
+          <a:off x="1445624" y="2145437"/>
+          <a:ext cx="10290436" cy="3300020"/>
+        </p:xfrm>
+        <a:graphic>
+          <a:graphicData uri="http://schemas.openxmlformats.org/drawingml/2006/table">
+            <a:tbl>
+              <a:tblPr firstRow="1" bandRow="1">
+                <a:tableStyleId>{5940675A-B579-460E-94D1-54222C63F5DA}</a:tableStyleId>
+              </a:tblPr>
+              <a:tblGrid>
+                <a:gridCol w="644433"/>
+                <a:gridCol w="844732"/>
+                <a:gridCol w="966651"/>
+                <a:gridCol w="1628503"/>
+                <a:gridCol w="1733006"/>
+                <a:gridCol w="2185851"/>
+                <a:gridCol w="2287260"/>
+              </a:tblGrid>
+              <a:tr h="275059">
+                <a:tc>
+                  <a:txBody>
+                    <a:bodyPr/>
+                    <a:lstStyle/>
+                    <a:p>
+                      <a:endParaRPr lang="en-US" sz="900"/>
+                    </a:p>
+                  </a:txBody>
+                  <a:tcPr marL="84945" marR="84945" marT="42472" marB="42472">
+                    <a:lnL w="12700" cmpd="sng">
+                      <a:noFill/>
+                    </a:lnL>
+                    <a:lnR w="12700" cap="flat" cmpd="sng" algn="ctr">
+                      <a:solidFill>
+                        <a:schemeClr val="tx1"/>
+                      </a:solidFill>
+                      <a:prstDash val="solid"/>
+                      <a:round/>
+                      <a:headEnd type="none" w="med" len="med"/>
+                      <a:tailEnd type="none" w="med" len="med"/>
+                    </a:lnR>
+                    <a:lnT w="12700" cmpd="sng">
+                      <a:noFill/>
+                    </a:lnT>
+                    <a:lnB w="12700" cap="flat" cmpd="sng" algn="ctr">
+                      <a:solidFill>
+                        <a:schemeClr val="tx1"/>
+                      </a:solidFill>
+                      <a:prstDash val="solid"/>
+                      <a:round/>
+                      <a:headEnd type="none" w="med" len="med"/>
+                      <a:tailEnd type="none" w="med" len="med"/>
+                    </a:lnB>
+                    <a:lnTlToBr w="12700" cmpd="sng">
+                      <a:noFill/>
+                      <a:prstDash val="solid"/>
+                    </a:lnTlToBr>
+                    <a:lnBlToTr w="12700" cmpd="sng">
+                      <a:noFill/>
+                      <a:prstDash val="solid"/>
+                    </a:lnBlToTr>
+                  </a:tcPr>
+                </a:tc>
+                <a:tc>
+                  <a:txBody>
+                    <a:bodyPr/>
+                    <a:lstStyle/>
+                    <a:p>
+                      <a:endParaRPr lang="en-US" sz="900"/>
+                    </a:p>
+                  </a:txBody>
+                  <a:tcPr marL="84945" marR="84945" marT="42472" marB="42472">
+                    <a:lnL w="12700" cap="flat" cmpd="sng" algn="ctr">
+                      <a:solidFill>
+                        <a:schemeClr val="tx1"/>
+                      </a:solidFill>
+                      <a:prstDash val="solid"/>
+                      <a:round/>
+                      <a:headEnd type="none" w="med" len="med"/>
+                      <a:tailEnd type="none" w="med" len="med"/>
+                    </a:lnL>
+                    <a:lnR w="12700" cap="flat" cmpd="sng" algn="ctr">
+                      <a:solidFill>
+                        <a:schemeClr val="tx1"/>
+                      </a:solidFill>
+                      <a:prstDash val="solid"/>
+                      <a:round/>
+                      <a:headEnd type="none" w="med" len="med"/>
+                      <a:tailEnd type="none" w="med" len="med"/>
+                    </a:lnR>
+                    <a:lnT w="12700" cap="flat" cmpd="sng" algn="ctr">
+                      <a:solidFill>
+                        <a:schemeClr val="tx1"/>
+                      </a:solidFill>
+                      <a:prstDash val="solid"/>
+                      <a:round/>
+                      <a:headEnd type="none" w="med" len="med"/>
+                      <a:tailEnd type="none" w="med" len="med"/>
+                    </a:lnT>
+                    <a:lnB w="12700" cap="flat" cmpd="sng" algn="ctr">
+                      <a:solidFill>
+                        <a:schemeClr val="tx1"/>
+                      </a:solidFill>
+                      <a:prstDash val="solid"/>
+                      <a:round/>
+                      <a:headEnd type="none" w="med" len="med"/>
+                      <a:tailEnd type="none" w="med" len="med"/>
+                    </a:lnB>
+                    <a:solidFill>
+                      <a:schemeClr val="bg2"/>
+                    </a:solidFill>
+                  </a:tcPr>
+                </a:tc>
+                <a:tc>
+                  <a:txBody>
+                    <a:bodyPr/>
+                    <a:lstStyle/>
+                    <a:p>
+                      <a:endParaRPr lang="en-US" sz="900"/>
+                    </a:p>
+                  </a:txBody>
+                  <a:tcPr marL="84945" marR="84945" marT="42472" marB="42472">
+                    <a:lnL w="12700" cap="flat" cmpd="sng" algn="ctr">
+                      <a:solidFill>
+                        <a:schemeClr val="tx1"/>
+                      </a:solidFill>
+                      <a:prstDash val="solid"/>
+                      <a:round/>
+                      <a:headEnd type="none" w="med" len="med"/>
+                      <a:tailEnd type="none" w="med" len="med"/>
+                    </a:lnL>
+                    <a:solidFill>
+                      <a:schemeClr val="bg2"/>
+                    </a:solidFill>
+                  </a:tcPr>
+                </a:tc>
+                <a:tc>
+                  <a:txBody>
+                    <a:bodyPr/>
+                    <a:lstStyle/>
+                    <a:p>
+                      <a:endParaRPr lang="en-US" sz="900"/>
+                    </a:p>
+                  </a:txBody>
+                  <a:tcPr marL="84945" marR="84945" marT="42472" marB="42472">
+                    <a:solidFill>
+                      <a:schemeClr val="bg2"/>
+                    </a:solidFill>
+                  </a:tcPr>
+                </a:tc>
+                <a:tc>
+                  <a:txBody>
+                    <a:bodyPr/>
+                    <a:lstStyle/>
+                    <a:p>
+                      <a:endParaRPr lang="en-US" sz="900"/>
+                    </a:p>
+                  </a:txBody>
+                  <a:tcPr marL="84945" marR="84945" marT="42472" marB="42472">
+                    <a:solidFill>
+                      <a:schemeClr val="bg2"/>
+                    </a:solidFill>
+                  </a:tcPr>
+                </a:tc>
+                <a:tc>
+                  <a:txBody>
+                    <a:bodyPr/>
+                    <a:lstStyle/>
+                    <a:p>
+                      <a:endParaRPr lang="en-US" sz="900"/>
+                    </a:p>
+                  </a:txBody>
+                  <a:tcPr marL="84945" marR="84945" marT="42472" marB="42472">
+                    <a:solidFill>
+                      <a:schemeClr val="bg2"/>
+                    </a:solidFill>
+                  </a:tcPr>
+                </a:tc>
+                <a:tc>
+                  <a:txBody>
+                    <a:bodyPr/>
+                    <a:lstStyle/>
+                    <a:p>
+                      <a:endParaRPr lang="en-US" sz="900"/>
+                    </a:p>
+                  </a:txBody>
+                  <a:tcPr marL="84945" marR="84945" marT="42472" marB="42472">
+                    <a:solidFill>
+                      <a:schemeClr val="bg2"/>
+                    </a:solidFill>
+                  </a:tcPr>
+                </a:tc>
+              </a:tr>
+              <a:tr h="558208">
+                <a:tc>
+                  <a:txBody>
+                    <a:bodyPr/>
+                    <a:lstStyle/>
+                    <a:p>
+                      <a:endParaRPr lang="en-US" sz="900"/>
+                    </a:p>
+                  </a:txBody>
+                  <a:tcPr marL="84945" marR="84945" marT="42472" marB="42472">
+                    <a:lnL w="12700" cap="flat" cmpd="sng" algn="ctr">
+                      <a:solidFill>
+                        <a:schemeClr val="tx1"/>
+                      </a:solidFill>
+                      <a:prstDash val="solid"/>
+                      <a:round/>
+                      <a:headEnd type="none" w="med" len="med"/>
+                      <a:tailEnd type="none" w="med" len="med"/>
+                    </a:lnL>
+                    <a:lnR w="12700" cap="flat" cmpd="sng" algn="ctr">
+                      <a:solidFill>
+                        <a:schemeClr val="tx1"/>
+                      </a:solidFill>
+                      <a:prstDash val="solid"/>
+                      <a:round/>
+                      <a:headEnd type="none" w="med" len="med"/>
+                      <a:tailEnd type="none" w="med" len="med"/>
+                    </a:lnR>
+                    <a:lnT w="12700" cap="flat" cmpd="sng" algn="ctr">
+                      <a:solidFill>
+                        <a:schemeClr val="tx1"/>
+                      </a:solidFill>
+                      <a:prstDash val="solid"/>
+                      <a:round/>
+                      <a:headEnd type="none" w="med" len="med"/>
+                      <a:tailEnd type="none" w="med" len="med"/>
+                    </a:lnT>
+                    <a:lnB w="12700" cap="flat" cmpd="sng" algn="ctr">
+                      <a:solidFill>
+                        <a:schemeClr val="tx1"/>
+                      </a:solidFill>
+                      <a:prstDash val="solid"/>
+                      <a:round/>
+                      <a:headEnd type="none" w="med" len="med"/>
+                      <a:tailEnd type="none" w="med" len="med"/>
+                    </a:lnB>
+                    <a:solidFill>
+                      <a:schemeClr val="bg2"/>
+                    </a:solidFill>
+                  </a:tcPr>
+                </a:tc>
+                <a:tc>
+                  <a:txBody>
+                    <a:bodyPr/>
+                    <a:lstStyle/>
+                    <a:p>
+                      <a:endParaRPr lang="en-US" sz="900"/>
+                    </a:p>
+                  </a:txBody>
+                  <a:tcPr marL="84945" marR="84945" marT="42472" marB="42472">
+                    <a:lnL w="12700" cap="flat" cmpd="sng" algn="ctr">
+                      <a:solidFill>
+                        <a:schemeClr val="tx1"/>
+                      </a:solidFill>
+                      <a:prstDash val="solid"/>
+                      <a:round/>
+                      <a:headEnd type="none" w="med" len="med"/>
+                      <a:tailEnd type="none" w="med" len="med"/>
+                    </a:lnL>
+                    <a:lnT w="12700" cap="flat" cmpd="sng" algn="ctr">
+                      <a:solidFill>
+                        <a:schemeClr val="tx1"/>
+                      </a:solidFill>
+                      <a:prstDash val="solid"/>
+                      <a:round/>
+                      <a:headEnd type="none" w="med" len="med"/>
+                      <a:tailEnd type="none" w="med" len="med"/>
+                    </a:lnT>
+                  </a:tcPr>
+                </a:tc>
+                <a:tc>
+                  <a:txBody>
+                    <a:bodyPr/>
+                    <a:lstStyle/>
+                    <a:p>
+                      <a:endParaRPr lang="en-US" sz="900"/>
+                    </a:p>
+                  </a:txBody>
+                  <a:tcPr marL="84945" marR="84945" marT="42472" marB="42472"/>
+                </a:tc>
+                <a:tc>
+                  <a:txBody>
+                    <a:bodyPr/>
+                    <a:lstStyle/>
+                    <a:p>
+                      <a:endParaRPr lang="en-US" sz="900"/>
+                    </a:p>
+                  </a:txBody>
+                  <a:tcPr marL="84945" marR="84945" marT="42472" marB="42472"/>
+                </a:tc>
+                <a:tc>
+                  <a:txBody>
+                    <a:bodyPr/>
+                    <a:lstStyle/>
+                    <a:p>
+                      <a:endParaRPr lang="en-US" sz="900"/>
+                    </a:p>
+                  </a:txBody>
+                  <a:tcPr marL="84945" marR="84945" marT="42472" marB="42472"/>
+                </a:tc>
+                <a:tc>
+                  <a:txBody>
+                    <a:bodyPr/>
+                    <a:lstStyle/>
+                    <a:p>
+                      <a:endParaRPr lang="en-US" sz="900"/>
+                    </a:p>
+                  </a:txBody>
+                  <a:tcPr marL="84945" marR="84945" marT="42472" marB="42472"/>
+                </a:tc>
+                <a:tc>
+                  <a:txBody>
+                    <a:bodyPr/>
+                    <a:lstStyle/>
+                    <a:p>
+                      <a:endParaRPr lang="en-US" sz="900"/>
+                    </a:p>
+                  </a:txBody>
+                  <a:tcPr marL="84945" marR="84945" marT="42472" marB="42472"/>
+                </a:tc>
+              </a:tr>
+              <a:tr h="509668">
+                <a:tc>
+                  <a:txBody>
+                    <a:bodyPr/>
+                    <a:lstStyle/>
+                    <a:p>
+                      <a:endParaRPr lang="en-US" sz="900"/>
+                    </a:p>
+                  </a:txBody>
+                  <a:tcPr marL="84945" marR="84945" marT="42472" marB="42472">
+                    <a:lnT w="12700" cap="flat" cmpd="sng" algn="ctr">
+                      <a:solidFill>
+                        <a:schemeClr val="tx1"/>
+                      </a:solidFill>
+                      <a:prstDash val="solid"/>
+                      <a:round/>
+                      <a:headEnd type="none" w="med" len="med"/>
+                      <a:tailEnd type="none" w="med" len="med"/>
+                    </a:lnT>
+                    <a:solidFill>
+                      <a:schemeClr val="bg2"/>
+                    </a:solidFill>
+                  </a:tcPr>
+                </a:tc>
+                <a:tc>
+                  <a:txBody>
+                    <a:bodyPr/>
+                    <a:lstStyle/>
+                    <a:p>
+                      <a:endParaRPr lang="en-US" sz="900"/>
+                    </a:p>
+                  </a:txBody>
+                  <a:tcPr marL="84945" marR="84945" marT="42472" marB="42472"/>
+                </a:tc>
+                <a:tc>
+                  <a:txBody>
+                    <a:bodyPr/>
+                    <a:lstStyle/>
+                    <a:p>
+                      <a:endParaRPr lang="en-US" sz="900"/>
+                    </a:p>
+                  </a:txBody>
+                  <a:tcPr marL="84945" marR="84945" marT="42472" marB="42472"/>
+                </a:tc>
+                <a:tc>
+                  <a:txBody>
+                    <a:bodyPr/>
+                    <a:lstStyle/>
+                    <a:p>
+                      <a:endParaRPr lang="en-US" sz="900"/>
+                    </a:p>
+                  </a:txBody>
+                  <a:tcPr marL="84945" marR="84945" marT="42472" marB="42472"/>
+                </a:tc>
+                <a:tc>
+                  <a:txBody>
+                    <a:bodyPr/>
+                    <a:lstStyle/>
+                    <a:p>
+                      <a:endParaRPr lang="en-US" sz="900"/>
+                    </a:p>
+                  </a:txBody>
+                  <a:tcPr marL="84945" marR="84945" marT="42472" marB="42472"/>
+                </a:tc>
+                <a:tc>
+                  <a:txBody>
+                    <a:bodyPr/>
+                    <a:lstStyle/>
+                    <a:p>
+                      <a:endParaRPr lang="en-US" sz="900"/>
+                    </a:p>
+                  </a:txBody>
+                  <a:tcPr marL="84945" marR="84945" marT="42472" marB="42472"/>
+                </a:tc>
+                <a:tc>
+                  <a:txBody>
+                    <a:bodyPr/>
+                    <a:lstStyle/>
+                    <a:p>
+                      <a:endParaRPr lang="en-US" sz="900"/>
+                    </a:p>
+                  </a:txBody>
+                  <a:tcPr marL="84945" marR="84945" marT="42472" marB="42472"/>
+                </a:tc>
+              </a:tr>
+              <a:tr h="517757">
+                <a:tc>
+                  <a:txBody>
+                    <a:bodyPr/>
+                    <a:lstStyle/>
+                    <a:p>
+                      <a:endParaRPr lang="en-US" sz="900"/>
+                    </a:p>
+                  </a:txBody>
+                  <a:tcPr marL="84945" marR="84945" marT="42472" marB="42472">
+                    <a:solidFill>
+                      <a:schemeClr val="bg2"/>
+                    </a:solidFill>
+                  </a:tcPr>
+                </a:tc>
+                <a:tc>
+                  <a:txBody>
+                    <a:bodyPr/>
+                    <a:lstStyle/>
+                    <a:p>
+                      <a:endParaRPr lang="en-US" sz="900"/>
+                    </a:p>
+                  </a:txBody>
+                  <a:tcPr marL="84945" marR="84945" marT="42472" marB="42472"/>
+                </a:tc>
+                <a:tc>
+                  <a:txBody>
+                    <a:bodyPr/>
+                    <a:lstStyle/>
+                    <a:p>
+                      <a:endParaRPr lang="en-US" sz="900"/>
+                    </a:p>
+                  </a:txBody>
+                  <a:tcPr marL="84945" marR="84945" marT="42472" marB="42472"/>
+                </a:tc>
+                <a:tc>
+                  <a:txBody>
+                    <a:bodyPr/>
+                    <a:lstStyle/>
+                    <a:p>
+                      <a:endParaRPr lang="en-US" sz="900"/>
+                    </a:p>
+                  </a:txBody>
+                  <a:tcPr marL="84945" marR="84945" marT="42472" marB="42472"/>
+                </a:tc>
+                <a:tc>
+                  <a:txBody>
+                    <a:bodyPr/>
+                    <a:lstStyle/>
+                    <a:p>
+                      <a:endParaRPr lang="en-US" sz="900"/>
+                    </a:p>
+                  </a:txBody>
+                  <a:tcPr marL="84945" marR="84945" marT="42472" marB="42472"/>
+                </a:tc>
+                <a:tc>
+                  <a:txBody>
+                    <a:bodyPr/>
+                    <a:lstStyle/>
+                    <a:p>
+                      <a:endParaRPr lang="en-US" sz="900"/>
+                    </a:p>
+                  </a:txBody>
+                  <a:tcPr marL="84945" marR="84945" marT="42472" marB="42472"/>
+                </a:tc>
+                <a:tc>
+                  <a:txBody>
+                    <a:bodyPr/>
+                    <a:lstStyle/>
+                    <a:p>
+                      <a:endParaRPr lang="en-US" sz="900"/>
+                    </a:p>
+                  </a:txBody>
+                  <a:tcPr marL="84945" marR="84945" marT="42472" marB="42472"/>
+                </a:tc>
+              </a:tr>
+              <a:tr h="496202">
+                <a:tc>
+                  <a:txBody>
+                    <a:bodyPr/>
+                    <a:lstStyle/>
+                    <a:p>
+                      <a:endParaRPr lang="en-US" sz="900"/>
+                    </a:p>
+                  </a:txBody>
+                  <a:tcPr marL="84945" marR="84945" marT="42472" marB="42472">
+                    <a:solidFill>
+                      <a:schemeClr val="bg2"/>
+                    </a:solidFill>
+                  </a:tcPr>
+                </a:tc>
+                <a:tc>
+                  <a:txBody>
+                    <a:bodyPr/>
+                    <a:lstStyle/>
+                    <a:p>
+                      <a:endParaRPr lang="en-US" sz="900"/>
+                    </a:p>
+                  </a:txBody>
+                  <a:tcPr marL="84945" marR="84945" marT="42472" marB="42472"/>
+                </a:tc>
+                <a:tc>
+                  <a:txBody>
+                    <a:bodyPr/>
+                    <a:lstStyle/>
+                    <a:p>
+                      <a:endParaRPr lang="en-US" sz="900"/>
+                    </a:p>
+                  </a:txBody>
+                  <a:tcPr marL="84945" marR="84945" marT="42472" marB="42472"/>
+                </a:tc>
+                <a:tc>
+                  <a:txBody>
+                    <a:bodyPr/>
+                    <a:lstStyle/>
+                    <a:p>
+                      <a:endParaRPr lang="en-US" sz="900"/>
+                    </a:p>
+                  </a:txBody>
+                  <a:tcPr marL="84945" marR="84945" marT="42472" marB="42472"/>
+                </a:tc>
+                <a:tc>
+                  <a:txBody>
+                    <a:bodyPr/>
+                    <a:lstStyle/>
+                    <a:p>
+                      <a:endParaRPr lang="en-US" sz="900"/>
+                    </a:p>
+                  </a:txBody>
+                  <a:tcPr marL="84945" marR="84945" marT="42472" marB="42472"/>
+                </a:tc>
+                <a:tc>
+                  <a:txBody>
+                    <a:bodyPr/>
+                    <a:lstStyle/>
+                    <a:p>
+                      <a:endParaRPr lang="en-US" sz="900"/>
+                    </a:p>
+                  </a:txBody>
+                  <a:tcPr marL="84945" marR="84945" marT="42472" marB="42472"/>
+                </a:tc>
+                <a:tc>
+                  <a:txBody>
+                    <a:bodyPr/>
+                    <a:lstStyle/>
+                    <a:p>
+                      <a:endParaRPr lang="en-US" sz="900"/>
+                    </a:p>
+                  </a:txBody>
+                  <a:tcPr marL="84945" marR="84945" marT="42472" marB="42472"/>
+                </a:tc>
+              </a:tr>
+              <a:tr h="531223">
+                <a:tc>
+                  <a:txBody>
+                    <a:bodyPr/>
+                    <a:lstStyle/>
+                    <a:p>
+                      <a:endParaRPr lang="en-US" sz="900"/>
+                    </a:p>
+                  </a:txBody>
+                  <a:tcPr marL="84945" marR="84945" marT="42472" marB="42472">
+                    <a:solidFill>
+                      <a:schemeClr val="bg2"/>
+                    </a:solidFill>
+                  </a:tcPr>
+                </a:tc>
+                <a:tc>
+                  <a:txBody>
+                    <a:bodyPr/>
+                    <a:lstStyle/>
+                    <a:p>
+                      <a:endParaRPr lang="en-US" sz="900"/>
+                    </a:p>
+                  </a:txBody>
+                  <a:tcPr marL="84945" marR="84945" marT="42472" marB="42472"/>
+                </a:tc>
+                <a:tc>
+                  <a:txBody>
+                    <a:bodyPr/>
+                    <a:lstStyle/>
+                    <a:p>
+                      <a:endParaRPr lang="en-US" sz="900"/>
+                    </a:p>
+                  </a:txBody>
+                  <a:tcPr marL="84945" marR="84945" marT="42472" marB="42472"/>
+                </a:tc>
+                <a:tc>
+                  <a:txBody>
+                    <a:bodyPr/>
+                    <a:lstStyle/>
+                    <a:p>
+                      <a:endParaRPr lang="en-US" sz="900"/>
+                    </a:p>
+                  </a:txBody>
+                  <a:tcPr marL="84945" marR="84945" marT="42472" marB="42472"/>
+                </a:tc>
+                <a:tc>
+                  <a:txBody>
+                    <a:bodyPr/>
+                    <a:lstStyle/>
+                    <a:p>
+                      <a:endParaRPr lang="en-US" sz="900"/>
+                    </a:p>
+                  </a:txBody>
+                  <a:tcPr marL="84945" marR="84945" marT="42472" marB="42472"/>
+                </a:tc>
+                <a:tc>
+                  <a:txBody>
+                    <a:bodyPr/>
+                    <a:lstStyle/>
+                    <a:p>
+                      <a:endParaRPr lang="en-US" sz="900"/>
+                    </a:p>
+                  </a:txBody>
+                  <a:tcPr marL="84945" marR="84945" marT="42472" marB="42472"/>
+                </a:tc>
+                <a:tc>
+                  <a:txBody>
+                    <a:bodyPr/>
+                    <a:lstStyle/>
+                    <a:p>
+                      <a:endParaRPr lang="en-US" sz="900"/>
+                    </a:p>
+                  </a:txBody>
+                  <a:tcPr marL="84945" marR="84945" marT="42472" marB="42472"/>
+                </a:tc>
+              </a:tr>
+              <a:tr h="411903">
+                <a:tc>
+                  <a:txBody>
+                    <a:bodyPr/>
+                    <a:lstStyle/>
+                    <a:p>
+                      <a:endParaRPr lang="en-US" sz="900"/>
+                    </a:p>
+                  </a:txBody>
+                  <a:tcPr marL="84945" marR="84945" marT="42472" marB="42472">
+                    <a:solidFill>
+                      <a:schemeClr val="bg2"/>
+                    </a:solidFill>
+                  </a:tcPr>
+                </a:tc>
+                <a:tc>
+                  <a:txBody>
+                    <a:bodyPr/>
+                    <a:lstStyle/>
+                    <a:p>
+                      <a:endParaRPr lang="en-US" sz="900"/>
+                    </a:p>
+                  </a:txBody>
+                  <a:tcPr marL="84945" marR="84945" marT="42472" marB="42472"/>
+                </a:tc>
+                <a:tc>
+                  <a:txBody>
+                    <a:bodyPr/>
+                    <a:lstStyle/>
+                    <a:p>
+                      <a:endParaRPr lang="en-US" sz="900"/>
+                    </a:p>
+                  </a:txBody>
+                  <a:tcPr marL="84945" marR="84945" marT="42472" marB="42472"/>
+                </a:tc>
+                <a:tc>
+                  <a:txBody>
+                    <a:bodyPr/>
+                    <a:lstStyle/>
+                    <a:p>
+                      <a:endParaRPr lang="en-US" sz="900"/>
+                    </a:p>
+                  </a:txBody>
+                  <a:tcPr marL="84945" marR="84945" marT="42472" marB="42472"/>
+                </a:tc>
+                <a:tc>
+                  <a:txBody>
+                    <a:bodyPr/>
+                    <a:lstStyle/>
+                    <a:p>
+                      <a:endParaRPr lang="en-US" sz="900"/>
+                    </a:p>
+                  </a:txBody>
+                  <a:tcPr marL="84945" marR="84945" marT="42472" marB="42472"/>
+                </a:tc>
+                <a:tc>
+                  <a:txBody>
+                    <a:bodyPr/>
+                    <a:lstStyle/>
+                    <a:p>
+                      <a:endParaRPr lang="en-US" sz="900"/>
+                    </a:p>
+                  </a:txBody>
+                  <a:tcPr marL="84945" marR="84945" marT="42472" marB="42472"/>
+                </a:tc>
+                <a:tc>
+                  <a:txBody>
+                    <a:bodyPr/>
+                    <a:lstStyle/>
+                    <a:p>
+                      <a:endParaRPr lang="en-US" sz="900"/>
+                    </a:p>
+                  </a:txBody>
+                  <a:tcPr marL="84945" marR="84945" marT="42472" marB="42472"/>
+                </a:tc>
+              </a:tr>
+            </a:tbl>
+          </a:graphicData>
+        </a:graphic>
+      </p:graphicFrame>
+      <p:pic>
+        <p:nvPicPr>
+          <p:cNvPr id="2" name="Picture 1"/>
+          <p:cNvPicPr>
+            <a:picLocks noChangeAspect="1"/>
+          </p:cNvPicPr>
+          <p:nvPr/>
+        </p:nvPicPr>
+        <p:blipFill>
+          <a:blip r:embed="rId2">
+            <a:extLst>
+              <a:ext uri="{28A0092B-C50C-407E-A947-70E740481C1C}">
+                <a14:useLocalDpi xmlns:a14="http://schemas.microsoft.com/office/drawing/2010/main" val="0"/>
+              </a:ext>
+            </a:extLst>
+          </a:blip>
+          <a:stretch>
+            <a:fillRect/>
+          </a:stretch>
+        </p:blipFill>
+        <p:spPr>
+          <a:xfrm>
+            <a:off x="1156244" y="1835799"/>
+            <a:ext cx="10617745" cy="3180747"/>
+          </a:xfrm>
+          <a:prstGeom prst="rect">
+            <a:avLst/>
+          </a:prstGeom>
+        </p:spPr>
+      </p:pic>
+      <p:sp>
+        <p:nvSpPr>
+          <p:cNvPr id="4" name="TextBox 3"/>
+          <p:cNvSpPr txBox="1"/>
+          <p:nvPr/>
+        </p:nvSpPr>
+        <p:spPr>
+          <a:xfrm rot="16200000">
+            <a:off x="-413085" y="3587932"/>
+            <a:ext cx="2769326" cy="369332"/>
+          </a:xfrm>
+          <a:prstGeom prst="rect">
+            <a:avLst/>
+          </a:prstGeom>
+          <a:noFill/>
+        </p:spPr>
+        <p:txBody>
+          <a:bodyPr wrap="square" rtlCol="0">
+            <a:spAutoFit/>
+          </a:bodyPr>
+          <a:lstStyle/>
+          <a:p>
+            <a:pPr algn="ctr"/>
+            <a:r>
+              <a:rPr lang="en-US" b="1"/>
+              <a:t>Token position in sentence</a:t>
+            </a:r>
+          </a:p>
+        </p:txBody>
+      </p:sp>
+      <p:sp>
+        <p:nvSpPr>
+          <p:cNvPr id="5" name="TextBox 4"/>
+          <p:cNvSpPr txBox="1"/>
+          <p:nvPr/>
+        </p:nvSpPr>
+        <p:spPr>
+          <a:xfrm>
+            <a:off x="5080453" y="1466467"/>
+            <a:ext cx="2769326" cy="369332"/>
+          </a:xfrm>
+          <a:prstGeom prst="rect">
+            <a:avLst/>
+          </a:prstGeom>
+          <a:noFill/>
+        </p:spPr>
+        <p:txBody>
+          <a:bodyPr wrap="square" rtlCol="0">
+            <a:spAutoFit/>
+          </a:bodyPr>
+          <a:lstStyle/>
+          <a:p>
+            <a:pPr algn="ctr"/>
+            <a:r>
+              <a:rPr lang="en-US" b="1"/>
+              <a:t>N-gram length</a:t>
+            </a:r>
+          </a:p>
+        </p:txBody>
+      </p:sp>
+      <p:sp>
+        <p:nvSpPr>
+          <p:cNvPr id="6" name="TextBox 5"/>
+          <p:cNvSpPr txBox="1"/>
+          <p:nvPr/>
+        </p:nvSpPr>
+        <p:spPr>
+          <a:xfrm>
+            <a:off x="5381896" y="2508068"/>
+            <a:ext cx="296092" cy="369332"/>
+          </a:xfrm>
+          <a:prstGeom prst="rect">
+            <a:avLst/>
+          </a:prstGeom>
+          <a:noFill/>
+        </p:spPr>
+        <p:txBody>
+          <a:bodyPr wrap="square" rtlCol="0" anchor="ctr">
+            <a:spAutoFit/>
+          </a:bodyPr>
+          <a:lstStyle/>
+          <a:p>
+            <a:r>
+              <a:rPr lang="en-US">
+                <a:effectLst>
+                  <a:glow rad="139700">
+                    <a:schemeClr val="bg1"/>
+                  </a:glow>
+                </a:effectLst>
+              </a:rPr>
+              <a:t>=</a:t>
+            </a:r>
+          </a:p>
+        </p:txBody>
+      </p:sp>
+      <p:sp>
+        <p:nvSpPr>
+          <p:cNvPr id="10" name="TextBox 9"/>
+          <p:cNvSpPr txBox="1"/>
+          <p:nvPr/>
+        </p:nvSpPr>
+        <p:spPr>
+          <a:xfrm>
+            <a:off x="7114902" y="2508068"/>
+            <a:ext cx="296092" cy="369332"/>
+          </a:xfrm>
+          <a:prstGeom prst="rect">
+            <a:avLst/>
+          </a:prstGeom>
+          <a:noFill/>
+        </p:spPr>
+        <p:txBody>
+          <a:bodyPr wrap="square" rtlCol="0" anchor="ctr">
+            <a:spAutoFit/>
+          </a:bodyPr>
+          <a:lstStyle/>
+          <a:p>
+            <a:r>
+              <a:rPr lang="en-US">
+                <a:effectLst>
+                  <a:glow rad="139700">
+                    <a:schemeClr val="bg1"/>
+                  </a:glow>
+                </a:effectLst>
+              </a:rPr>
+              <a:t>=</a:t>
+            </a:r>
+          </a:p>
+        </p:txBody>
+      </p:sp>
+      <p:sp>
+        <p:nvSpPr>
+          <p:cNvPr id="11" name="TextBox 10"/>
+          <p:cNvSpPr txBox="1"/>
+          <p:nvPr/>
+        </p:nvSpPr>
+        <p:spPr>
+          <a:xfrm>
+            <a:off x="9300750" y="2508068"/>
+            <a:ext cx="296092" cy="369332"/>
+          </a:xfrm>
+          <a:prstGeom prst="rect">
+            <a:avLst/>
+          </a:prstGeom>
+          <a:noFill/>
+        </p:spPr>
+        <p:txBody>
+          <a:bodyPr wrap="square" rtlCol="0" anchor="ctr">
+            <a:spAutoFit/>
+          </a:bodyPr>
+          <a:lstStyle/>
+          <a:p>
+            <a:r>
+              <a:rPr lang="en-US">
+                <a:effectLst>
+                  <a:glow rad="139700">
+                    <a:schemeClr val="bg1"/>
+                  </a:glow>
+                </a:effectLst>
+              </a:rPr>
+              <a:t>=</a:t>
+            </a:r>
+          </a:p>
+        </p:txBody>
+      </p:sp>
+      <p:sp>
+        <p:nvSpPr>
+          <p:cNvPr id="12" name="TextBox 11"/>
+          <p:cNvSpPr txBox="1"/>
+          <p:nvPr/>
+        </p:nvSpPr>
+        <p:spPr>
+          <a:xfrm>
+            <a:off x="7114902" y="3002372"/>
+            <a:ext cx="296092" cy="369332"/>
+          </a:xfrm>
+          <a:prstGeom prst="rect">
+            <a:avLst/>
+          </a:prstGeom>
+          <a:noFill/>
+        </p:spPr>
+        <p:txBody>
+          <a:bodyPr wrap="square" rtlCol="0" anchor="ctr">
+            <a:spAutoFit/>
+          </a:bodyPr>
+          <a:lstStyle/>
+          <a:p>
+            <a:r>
+              <a:rPr lang="en-US">
+                <a:effectLst>
+                  <a:glow rad="139700">
+                    <a:schemeClr val="bg1"/>
+                  </a:glow>
+                </a:effectLst>
+              </a:rPr>
+              <a:t>=</a:t>
+            </a:r>
+          </a:p>
+        </p:txBody>
+      </p:sp>
+      <p:sp>
+        <p:nvSpPr>
+          <p:cNvPr id="13" name="TextBox 12"/>
+          <p:cNvSpPr txBox="1"/>
+          <p:nvPr/>
+        </p:nvSpPr>
+        <p:spPr>
+          <a:xfrm>
+            <a:off x="9300750" y="3002372"/>
+            <a:ext cx="296092" cy="369332"/>
+          </a:xfrm>
+          <a:prstGeom prst="rect">
+            <a:avLst/>
+          </a:prstGeom>
+          <a:noFill/>
+        </p:spPr>
+        <p:txBody>
+          <a:bodyPr wrap="square" rtlCol="0" anchor="ctr">
+            <a:spAutoFit/>
+          </a:bodyPr>
+          <a:lstStyle/>
+          <a:p>
+            <a:r>
+              <a:rPr lang="en-US">
+                <a:effectLst>
+                  <a:glow rad="139700">
+                    <a:schemeClr val="bg1"/>
+                  </a:glow>
+                </a:effectLst>
+              </a:rPr>
+              <a:t>=</a:t>
+            </a:r>
+          </a:p>
+        </p:txBody>
+      </p:sp>
+      <p:sp>
+        <p:nvSpPr>
+          <p:cNvPr id="14" name="TextBox 13"/>
+          <p:cNvSpPr txBox="1"/>
+          <p:nvPr/>
+        </p:nvSpPr>
+        <p:spPr>
+          <a:xfrm>
+            <a:off x="9300750" y="3515155"/>
+            <a:ext cx="296092" cy="369332"/>
+          </a:xfrm>
+          <a:prstGeom prst="rect">
+            <a:avLst/>
+          </a:prstGeom>
+          <a:noFill/>
+        </p:spPr>
+        <p:txBody>
+          <a:bodyPr wrap="square" rtlCol="0" anchor="ctr">
+            <a:spAutoFit/>
+          </a:bodyPr>
+          <a:lstStyle/>
+          <a:p>
+            <a:r>
+              <a:rPr lang="en-US">
+                <a:effectLst>
+                  <a:glow rad="139700">
+                    <a:schemeClr val="bg1"/>
+                  </a:glow>
+                </a:effectLst>
+              </a:rPr>
+              <a:t>=</a:t>
+            </a:r>
+          </a:p>
+        </p:txBody>
+      </p:sp>
+      <p:sp>
+        <p:nvSpPr>
+          <p:cNvPr id="16" name="TextBox 15"/>
+          <p:cNvSpPr txBox="1"/>
+          <p:nvPr/>
+        </p:nvSpPr>
+        <p:spPr>
+          <a:xfrm>
+            <a:off x="6201881" y="5072905"/>
+            <a:ext cx="777922" cy="369332"/>
+          </a:xfrm>
+          <a:prstGeom prst="rect">
+            <a:avLst/>
+          </a:prstGeom>
+          <a:noFill/>
+        </p:spPr>
+        <p:txBody>
+          <a:bodyPr wrap="square" rtlCol="0">
+            <a:spAutoFit/>
+          </a:bodyPr>
+          <a:lstStyle/>
+          <a:p>
+            <a:r>
+              <a:rPr lang="en-US"/>
+              <a:t>...</a:t>
+            </a:r>
+          </a:p>
+        </p:txBody>
+      </p:sp>
+    </p:spTree>
+    <p:extLst>
+      <p:ext uri="{BB962C8B-B14F-4D97-AF65-F5344CB8AC3E}">
+        <p14:creationId xmlns:p14="http://schemas.microsoft.com/office/powerpoint/2010/main" val="1736517106"/>
+      </p:ext>
+    </p:extLst>
+  </p:cSld>
+  <p:clrMapOvr>
+    <a:masterClrMapping/>
+  </p:clrMapOvr>
+  <p:timing>
+    <p:tnLst>
+      <p:par>
+        <p:cTn id="1" dur="indefinite" restart="never" nodeType="tmRoot"/>
+      </p:par>
+    </p:tnLst>
+  </p:timing>
+</p:sld>
+</file>
+
+<file path=ppt/slides/slide15.xml><?xml version="1.0" encoding="utf-8"?>
+<p:sld xmlns:a="http://schemas.openxmlformats.org/drawingml/2006/main" xmlns:r="http://schemas.openxmlformats.org/officeDocument/2006/relationships" xmlns:p="http://schemas.openxmlformats.org/presentationml/2006/main">
+  <p:cSld>
+    <p:spTree>
+      <p:nvGrpSpPr>
+        <p:cNvPr id="1" name=""/>
+        <p:cNvGrpSpPr/>
+        <p:nvPr/>
+      </p:nvGrpSpPr>
+      <p:grpSpPr>
+        <a:xfrm>
+          <a:off x="0" y="0"/>
+          <a:ext cx="0" cy="0"/>
+          <a:chOff x="0" y="0"/>
+          <a:chExt cx="0" cy="0"/>
+        </a:xfrm>
+      </p:grpSpPr>
+      <p:pic>
+        <p:nvPicPr>
+          <p:cNvPr id="3" name="Picture 2"/>
+          <p:cNvPicPr>
+            <a:picLocks noChangeAspect="1"/>
+          </p:cNvPicPr>
+          <p:nvPr/>
+        </p:nvPicPr>
+        <p:blipFill>
+          <a:blip r:embed="rId2">
+            <a:extLst>
+              <a:ext uri="{28A0092B-C50C-407E-A947-70E740481C1C}">
+                <a14:useLocalDpi xmlns:a14="http://schemas.microsoft.com/office/drawing/2010/main" val="0"/>
+              </a:ext>
+            </a:extLst>
+          </a:blip>
+          <a:stretch>
+            <a:fillRect/>
+          </a:stretch>
+        </p:blipFill>
+        <p:spPr>
+          <a:xfrm>
+            <a:off x="967509" y="630382"/>
+            <a:ext cx="7874000" cy="609600"/>
+          </a:xfrm>
+          <a:prstGeom prst="rect">
+            <a:avLst/>
+          </a:prstGeom>
+        </p:spPr>
+      </p:pic>
+      <p:pic>
+        <p:nvPicPr>
+          <p:cNvPr id="4" name="Picture 3"/>
+          <p:cNvPicPr>
+            <a:picLocks noChangeAspect="1"/>
+          </p:cNvPicPr>
+          <p:nvPr/>
+        </p:nvPicPr>
+        <p:blipFill>
+          <a:blip r:embed="rId3">
+            <a:extLst>
+              <a:ext uri="{28A0092B-C50C-407E-A947-70E740481C1C}">
+                <a14:useLocalDpi xmlns:a14="http://schemas.microsoft.com/office/drawing/2010/main" val="0"/>
+              </a:ext>
+            </a:extLst>
+          </a:blip>
+          <a:stretch>
+            <a:fillRect/>
+          </a:stretch>
+        </p:blipFill>
+        <p:spPr>
+          <a:xfrm>
+            <a:off x="967509" y="1239982"/>
+            <a:ext cx="8559800" cy="1270000"/>
+          </a:xfrm>
+          <a:prstGeom prst="rect">
+            <a:avLst/>
+          </a:prstGeom>
+        </p:spPr>
+      </p:pic>
+    </p:spTree>
+    <p:extLst>
+      <p:ext uri="{BB962C8B-B14F-4D97-AF65-F5344CB8AC3E}">
+        <p14:creationId xmlns:p14="http://schemas.microsoft.com/office/powerpoint/2010/main" val="1284351350"/>
+      </p:ext>
+    </p:extLst>
+  </p:cSld>
+  <p:clrMapOvr>
+    <a:masterClrMapping/>
+  </p:clrMapOvr>
+  <p:timing>
+    <p:tnLst>
+      <p:par>
+        <p:cTn id="1" dur="indefinite" restart="never" nodeType="tmRoot"/>
+      </p:par>
+    </p:tnLst>
+  </p:timing>
+</p:sld>
+</file>
+
+<file path=ppt/slides/slide16.xml><?xml version="1.0" encoding="utf-8"?>
+<p:sld xmlns:a="http://schemas.openxmlformats.org/drawingml/2006/main" xmlns:r="http://schemas.openxmlformats.org/officeDocument/2006/relationships" xmlns:p="http://schemas.openxmlformats.org/presentationml/2006/main">
+  <p:cSld>
+    <p:spTree>
+      <p:nvGrpSpPr>
+        <p:cNvPr id="1" name=""/>
+        <p:cNvGrpSpPr/>
+        <p:nvPr/>
+      </p:nvGrpSpPr>
+      <p:grpSpPr>
+        <a:xfrm>
+          <a:off x="0" y="0"/>
+          <a:ext cx="0" cy="0"/>
+          <a:chOff x="0" y="0"/>
+          <a:chExt cx="0" cy="0"/>
+        </a:xfrm>
+      </p:grpSpPr>
+      <p:pic>
+        <p:nvPicPr>
+          <p:cNvPr id="2" name="Picture 1"/>
+          <p:cNvPicPr>
+            <a:picLocks noChangeAspect="1"/>
+          </p:cNvPicPr>
+          <p:nvPr/>
+        </p:nvPicPr>
+        <p:blipFill>
+          <a:blip r:embed="rId2">
+            <a:extLst>
+              <a:ext uri="{28A0092B-C50C-407E-A947-70E740481C1C}">
+                <a14:useLocalDpi xmlns:a14="http://schemas.microsoft.com/office/drawing/2010/main" val="0"/>
+              </a:ext>
+            </a:extLst>
+          </a:blip>
+          <a:stretch>
+            <a:fillRect/>
+          </a:stretch>
+        </p:blipFill>
+        <p:spPr>
+          <a:xfrm>
+            <a:off x="1098550" y="2794000"/>
+            <a:ext cx="7810500" cy="1270000"/>
+          </a:xfrm>
+          <a:prstGeom prst="rect">
+            <a:avLst/>
+          </a:prstGeom>
+        </p:spPr>
+      </p:pic>
+      <p:pic>
+        <p:nvPicPr>
+          <p:cNvPr id="7" name="Picture 6"/>
+          <p:cNvPicPr>
+            <a:picLocks noChangeAspect="1"/>
+          </p:cNvPicPr>
+          <p:nvPr/>
+        </p:nvPicPr>
+        <p:blipFill>
+          <a:blip r:embed="rId3">
+            <a:extLst>
+              <a:ext uri="{28A0092B-C50C-407E-A947-70E740481C1C}">
+                <a14:useLocalDpi xmlns:a14="http://schemas.microsoft.com/office/drawing/2010/main" val="0"/>
+              </a:ext>
+            </a:extLst>
+          </a:blip>
+          <a:stretch>
+            <a:fillRect/>
+          </a:stretch>
+        </p:blipFill>
+        <p:spPr>
+          <a:xfrm>
+            <a:off x="1098550" y="4064000"/>
+            <a:ext cx="10083800" cy="1270000"/>
+          </a:xfrm>
+          <a:prstGeom prst="rect">
+            <a:avLst/>
+          </a:prstGeom>
+        </p:spPr>
+      </p:pic>
+    </p:spTree>
+    <p:extLst>
+      <p:ext uri="{BB962C8B-B14F-4D97-AF65-F5344CB8AC3E}">
+        <p14:creationId xmlns:p14="http://schemas.microsoft.com/office/powerpoint/2010/main" val="1250350790"/>
+      </p:ext>
+    </p:extLst>
+  </p:cSld>
+  <p:clrMapOvr>
+    <a:masterClrMapping/>
+  </p:clrMapOvr>
+</p:sld>
+</file>
+
+<file path=ppt/slides/slide17.xml><?xml version="1.0" encoding="utf-8"?>
+<p:sld xmlns:a="http://schemas.openxmlformats.org/drawingml/2006/main" xmlns:r="http://schemas.openxmlformats.org/officeDocument/2006/relationships" xmlns:p="http://schemas.openxmlformats.org/presentationml/2006/main">
+  <p:cSld>
+    <p:spTree>
+      <p:nvGrpSpPr>
+        <p:cNvPr id="1" name=""/>
+        <p:cNvGrpSpPr/>
+        <p:nvPr/>
+      </p:nvGrpSpPr>
+      <p:grpSpPr>
+        <a:xfrm>
+          <a:off x="0" y="0"/>
+          <a:ext cx="0" cy="0"/>
+          <a:chOff x="0" y="0"/>
+          <a:chExt cx="0" cy="0"/>
+        </a:xfrm>
+      </p:grpSpPr>
+      <p:pic>
+        <p:nvPicPr>
+          <p:cNvPr id="2" name="Picture 1"/>
+          <p:cNvPicPr>
+            <a:picLocks noChangeAspect="1"/>
+          </p:cNvPicPr>
+          <p:nvPr/>
+        </p:nvPicPr>
+        <p:blipFill>
+          <a:blip r:embed="rId2">
+            <a:extLst>
+              <a:ext uri="{28A0092B-C50C-407E-A947-70E740481C1C}">
+                <a14:useLocalDpi xmlns:a14="http://schemas.microsoft.com/office/drawing/2010/main" val="0"/>
+              </a:ext>
+            </a:extLst>
+          </a:blip>
+          <a:stretch>
+            <a:fillRect/>
+          </a:stretch>
+        </p:blipFill>
+        <p:spPr>
+          <a:xfrm>
+            <a:off x="653143" y="2483387"/>
+            <a:ext cx="9633857" cy="1177842"/>
+          </a:xfrm>
+          <a:prstGeom prst="rect">
+            <a:avLst/>
+          </a:prstGeom>
+        </p:spPr>
+      </p:pic>
+      <p:pic>
+        <p:nvPicPr>
+          <p:cNvPr id="3" name="Picture 2"/>
+          <p:cNvPicPr>
+            <a:picLocks noChangeAspect="1"/>
+          </p:cNvPicPr>
+          <p:nvPr/>
+        </p:nvPicPr>
+        <p:blipFill>
+          <a:blip r:embed="rId3">
+            <a:extLst>
+              <a:ext uri="{28A0092B-C50C-407E-A947-70E740481C1C}">
+                <a14:useLocalDpi xmlns:a14="http://schemas.microsoft.com/office/drawing/2010/main" val="0"/>
+              </a:ext>
+            </a:extLst>
+          </a:blip>
+          <a:stretch>
+            <a:fillRect/>
+          </a:stretch>
+        </p:blipFill>
+        <p:spPr>
+          <a:xfrm>
+            <a:off x="653143" y="3661229"/>
+            <a:ext cx="10667247" cy="1037670"/>
+          </a:xfrm>
+          <a:prstGeom prst="rect">
+            <a:avLst/>
+          </a:prstGeom>
+        </p:spPr>
+      </p:pic>
+    </p:spTree>
+    <p:extLst>
+      <p:ext uri="{BB962C8B-B14F-4D97-AF65-F5344CB8AC3E}">
+        <p14:creationId xmlns:p14="http://schemas.microsoft.com/office/powerpoint/2010/main" val="1235280983"/>
+      </p:ext>
+    </p:extLst>
+  </p:cSld>
+  <p:clrMapOvr>
+    <a:masterClrMapping/>
+  </p:clrMapOvr>
+  <p:timing>
+    <p:tnLst>
+      <p:par>
+        <p:cTn id="1" dur="indefinite" restart="never" nodeType="tmRoot"/>
+      </p:par>
+    </p:tnLst>
+  </p:timing>
+</p:sld>
+</file>
+
+<file path=ppt/slides/slide18.xml><?xml version="1.0" encoding="utf-8"?>
+<p:sld xmlns:a="http://schemas.openxmlformats.org/drawingml/2006/main" xmlns:r="http://schemas.openxmlformats.org/officeDocument/2006/relationships" xmlns:p="http://schemas.openxmlformats.org/presentationml/2006/main">
+  <p:cSld>
+    <p:spTree>
+      <p:nvGrpSpPr>
+        <p:cNvPr id="1" name=""/>
+        <p:cNvGrpSpPr/>
+        <p:nvPr/>
+      </p:nvGrpSpPr>
+      <p:grpSpPr>
+        <a:xfrm>
+          <a:off x="0" y="0"/>
+          <a:ext cx="0" cy="0"/>
+          <a:chOff x="0" y="0"/>
+          <a:chExt cx="0" cy="0"/>
+        </a:xfrm>
+      </p:grpSpPr>
+      <p:graphicFrame>
+        <p:nvGraphicFramePr>
+          <p:cNvPr id="3" name="Table 2"/>
+          <p:cNvGraphicFramePr>
+            <a:graphicFrameLocks noGrp="1"/>
+          </p:cNvGraphicFramePr>
+          <p:nvPr>
+            <p:extLst>
+              <p:ext uri="{D42A27DB-BD31-4B8C-83A1-F6EECF244321}">
+                <p14:modId xmlns:p14="http://schemas.microsoft.com/office/powerpoint/2010/main" val="683783039"/>
+              </p:ext>
+            </p:extLst>
+          </p:nvPr>
+        </p:nvGraphicFramePr>
+        <p:xfrm>
+          <a:off x="1612900" y="2451100"/>
+          <a:ext cx="8837386" cy="1943979"/>
+        </p:xfrm>
+        <a:graphic>
+          <a:graphicData uri="http://schemas.openxmlformats.org/drawingml/2006/table">
+            <a:tbl>
+              <a:tblPr firstRow="1" bandRow="1">
+                <a:tableStyleId>{5940675A-B579-460E-94D1-54222C63F5DA}</a:tableStyleId>
+              </a:tblPr>
+              <a:tblGrid>
+                <a:gridCol w="8837386"/>
+              </a:tblGrid>
+              <a:tr h="732971">
+                <a:tc>
+                  <a:txBody>
+                    <a:bodyPr/>
+                    <a:lstStyle/>
+                    <a:p>
+                      <a:endParaRPr lang="en-US"/>
+                    </a:p>
+                  </a:txBody>
+                  <a:tcPr>
+                    <a:solidFill>
+                      <a:schemeClr val="bg2"/>
+                    </a:solidFill>
+                  </a:tcPr>
+                </a:tc>
+              </a:tr>
+              <a:tr h="1211008">
+                <a:tc>
+                  <a:txBody>
+                    <a:bodyPr/>
+                    <a:lstStyle/>
+                    <a:p>
+                      <a:endParaRPr lang="en-US"/>
+                    </a:p>
+                  </a:txBody>
+                  <a:tcPr/>
+                </a:tc>
+              </a:tr>
+            </a:tbl>
+          </a:graphicData>
+        </a:graphic>
+      </p:graphicFrame>
+      <p:pic>
+        <p:nvPicPr>
+          <p:cNvPr id="6" name="Picture 5"/>
+          <p:cNvPicPr>
+            <a:picLocks noChangeAspect="1"/>
+          </p:cNvPicPr>
+          <p:nvPr/>
+        </p:nvPicPr>
+        <p:blipFill>
+          <a:blip r:embed="rId2">
+            <a:extLst>
+              <a:ext uri="{28A0092B-C50C-407E-A947-70E740481C1C}">
+                <a14:useLocalDpi xmlns:a14="http://schemas.microsoft.com/office/drawing/2010/main" val="0"/>
+              </a:ext>
+            </a:extLst>
+          </a:blip>
+          <a:stretch>
+            <a:fillRect/>
+          </a:stretch>
+        </p:blipFill>
+        <p:spPr>
+          <a:xfrm>
+            <a:off x="1563913" y="2543875"/>
+            <a:ext cx="8966200" cy="1770249"/>
+          </a:xfrm>
+          <a:prstGeom prst="rect">
+            <a:avLst/>
+          </a:prstGeom>
+        </p:spPr>
+      </p:pic>
+    </p:spTree>
+    <p:extLst>
+      <p:ext uri="{BB962C8B-B14F-4D97-AF65-F5344CB8AC3E}">
+        <p14:creationId xmlns:p14="http://schemas.microsoft.com/office/powerpoint/2010/main" val="468234328"/>
+      </p:ext>
+    </p:extLst>
+  </p:cSld>
+  <p:clrMapOvr>
+    <a:masterClrMapping/>
+  </p:clrMapOvr>
+  <p:timing>
+    <p:tnLst>
+      <p:par>
+        <p:cTn id="1" dur="indefinite" restart="never" nodeType="tmRoot"/>
+      </p:par>
+    </p:tnLst>
+  </p:timing>
+</p:sld>
+</file>
+
+<file path=ppt/slides/slide19.xml><?xml version="1.0" encoding="utf-8"?>
+<p:sld xmlns:a="http://schemas.openxmlformats.org/drawingml/2006/main" xmlns:r="http://schemas.openxmlformats.org/officeDocument/2006/relationships" xmlns:p="http://schemas.openxmlformats.org/presentationml/2006/main">
+  <p:cSld>
+    <p:spTree>
+      <p:nvGrpSpPr>
+        <p:cNvPr id="1" name=""/>
+        <p:cNvGrpSpPr/>
+        <p:nvPr/>
+      </p:nvGrpSpPr>
+      <p:grpSpPr>
+        <a:xfrm>
+          <a:off x="0" y="0"/>
+          <a:ext cx="0" cy="0"/>
+          <a:chOff x="0" y="0"/>
+          <a:chExt cx="0" cy="0"/>
+        </a:xfrm>
+      </p:grpSpPr>
+      <p:graphicFrame>
+        <p:nvGraphicFramePr>
+          <p:cNvPr id="4" name="Table 3"/>
+          <p:cNvGraphicFramePr>
+            <a:graphicFrameLocks noGrp="1"/>
+          </p:cNvGraphicFramePr>
+          <p:nvPr>
+            <p:extLst>
+              <p:ext uri="{D42A27DB-BD31-4B8C-83A1-F6EECF244321}">
+                <p14:modId xmlns:p14="http://schemas.microsoft.com/office/powerpoint/2010/main" val="2047987975"/>
+              </p:ext>
+            </p:extLst>
+          </p:nvPr>
+        </p:nvGraphicFramePr>
+        <p:xfrm>
+          <a:off x="121556" y="2767381"/>
+          <a:ext cx="11732987" cy="2113555"/>
+        </p:xfrm>
+        <a:graphic>
+          <a:graphicData uri="http://schemas.openxmlformats.org/drawingml/2006/table">
+            <a:tbl>
+              <a:tblPr firstRow="1" bandRow="1">
+                <a:tableStyleId>{5940675A-B579-460E-94D1-54222C63F5DA}</a:tableStyleId>
+              </a:tblPr>
+              <a:tblGrid>
+                <a:gridCol w="11732987"/>
+              </a:tblGrid>
+              <a:tr h="449348">
+                <a:tc>
+                  <a:txBody>
+                    <a:bodyPr/>
+                    <a:lstStyle/>
+                    <a:p>
+                      <a:endParaRPr lang="en-US" sz="1700"/>
+                    </a:p>
+                  </a:txBody>
+                  <a:tcPr marL="87997" marR="87997" marT="43999" marB="43999">
+                    <a:solidFill>
+                      <a:schemeClr val="bg2"/>
+                    </a:solidFill>
+                  </a:tcPr>
+                </a:tc>
+              </a:tr>
+              <a:tr h="839296">
+                <a:tc>
+                  <a:txBody>
+                    <a:bodyPr/>
+                    <a:lstStyle/>
+                    <a:p>
+                      <a:endParaRPr lang="en-US" sz="1700"/>
+                    </a:p>
+                  </a:txBody>
+                  <a:tcPr marL="87997" marR="87997" marT="43999" marB="43999"/>
+                </a:tc>
+              </a:tr>
+              <a:tr h="824911">
+                <a:tc>
+                  <a:txBody>
+                    <a:bodyPr/>
+                    <a:lstStyle/>
+                    <a:p>
+                      <a:endParaRPr lang="en-US" sz="1700"/>
+                    </a:p>
+                  </a:txBody>
+                  <a:tcPr marL="87997" marR="87997" marT="43999" marB="43999"/>
+                </a:tc>
+              </a:tr>
+            </a:tbl>
+          </a:graphicData>
+        </a:graphic>
+      </p:graphicFrame>
+      <p:pic>
+        <p:nvPicPr>
+          <p:cNvPr id="9" name="Picture 8"/>
+          <p:cNvPicPr>
+            <a:picLocks noChangeAspect="1"/>
+          </p:cNvPicPr>
+          <p:nvPr/>
+        </p:nvPicPr>
+        <p:blipFill>
+          <a:blip r:embed="rId2">
+            <a:extLst>
+              <a:ext uri="{28A0092B-C50C-407E-A947-70E740481C1C}">
+                <a14:useLocalDpi xmlns:a14="http://schemas.microsoft.com/office/drawing/2010/main" val="0"/>
+              </a:ext>
+            </a:extLst>
+          </a:blip>
+          <a:stretch>
+            <a:fillRect/>
+          </a:stretch>
+        </p:blipFill>
+        <p:spPr>
+          <a:xfrm>
+            <a:off x="121556" y="2767380"/>
+            <a:ext cx="11732987" cy="2093989"/>
+          </a:xfrm>
+          <a:prstGeom prst="rect">
+            <a:avLst/>
+          </a:prstGeom>
+        </p:spPr>
+      </p:pic>
+    </p:spTree>
+    <p:extLst>
+      <p:ext uri="{BB962C8B-B14F-4D97-AF65-F5344CB8AC3E}">
+        <p14:creationId xmlns:p14="http://schemas.microsoft.com/office/powerpoint/2010/main" val="721299491"/>
+      </p:ext>
+    </p:extLst>
+  </p:cSld>
+  <p:clrMapOvr>
+    <a:masterClrMapping/>
+  </p:clrMapOvr>
+  <p:timing>
+    <p:tnLst>
+      <p:par>
+        <p:cTn id="1" dur="indefinite" restart="never" nodeType="tmRoot"/>
+      </p:par>
+    </p:tnLst>
+  </p:timing>
 </p:sld>
 </file>
 
@@ -4830,6 +6628,1105 @@
   <p:clrMapOvr>
     <a:masterClrMapping/>
   </p:clrMapOvr>
+</p:sld>
+</file>
+
+<file path=ppt/slides/slide20.xml><?xml version="1.0" encoding="utf-8"?>
+<p:sld xmlns:a="http://schemas.openxmlformats.org/drawingml/2006/main" xmlns:r="http://schemas.openxmlformats.org/officeDocument/2006/relationships" xmlns:p="http://schemas.openxmlformats.org/presentationml/2006/main">
+  <p:cSld>
+    <p:spTree>
+      <p:nvGrpSpPr>
+        <p:cNvPr id="1" name=""/>
+        <p:cNvGrpSpPr/>
+        <p:nvPr/>
+      </p:nvGrpSpPr>
+      <p:grpSpPr>
+        <a:xfrm>
+          <a:off x="0" y="0"/>
+          <a:ext cx="0" cy="0"/>
+          <a:chOff x="0" y="0"/>
+          <a:chExt cx="0" cy="0"/>
+        </a:xfrm>
+      </p:grpSpPr>
+      <p:graphicFrame>
+        <p:nvGraphicFramePr>
+          <p:cNvPr id="6" name="Table 5"/>
+          <p:cNvGraphicFramePr>
+            <a:graphicFrameLocks noGrp="1"/>
+          </p:cNvGraphicFramePr>
+          <p:nvPr>
+            <p:extLst>
+              <p:ext uri="{D42A27DB-BD31-4B8C-83A1-F6EECF244321}">
+                <p14:modId xmlns:p14="http://schemas.microsoft.com/office/powerpoint/2010/main" val="704444312"/>
+              </p:ext>
+            </p:extLst>
+          </p:nvPr>
+        </p:nvGraphicFramePr>
+        <p:xfrm>
+          <a:off x="232013" y="2361766"/>
+          <a:ext cx="11682485" cy="1988862"/>
+        </p:xfrm>
+        <a:graphic>
+          <a:graphicData uri="http://schemas.openxmlformats.org/drawingml/2006/table">
+            <a:tbl>
+              <a:tblPr firstRow="1" bandRow="1">
+                <a:tableStyleId>{5940675A-B579-460E-94D1-54222C63F5DA}</a:tableStyleId>
+              </a:tblPr>
+              <a:tblGrid>
+                <a:gridCol w="975738"/>
+                <a:gridCol w="3589049"/>
+                <a:gridCol w="997808"/>
+                <a:gridCol w="1130850"/>
+                <a:gridCol w="1534401"/>
+                <a:gridCol w="3454639"/>
+              </a:tblGrid>
+              <a:tr h="331477">
+                <a:tc>
+                  <a:txBody>
+                    <a:bodyPr/>
+                    <a:lstStyle/>
+                    <a:p>
+                      <a:endParaRPr lang="en-US" sz="1000"/>
+                    </a:p>
+                  </a:txBody>
+                  <a:tcPr marL="88344" marR="88344" marT="44172" marB="44172">
+                    <a:solidFill>
+                      <a:schemeClr val="bg2"/>
+                    </a:solidFill>
+                  </a:tcPr>
+                </a:tc>
+                <a:tc>
+                  <a:txBody>
+                    <a:bodyPr/>
+                    <a:lstStyle/>
+                    <a:p>
+                      <a:endParaRPr lang="en-US" sz="1000"/>
+                    </a:p>
+                  </a:txBody>
+                  <a:tcPr marL="88344" marR="88344" marT="44172" marB="44172">
+                    <a:solidFill>
+                      <a:schemeClr val="bg2"/>
+                    </a:solidFill>
+                  </a:tcPr>
+                </a:tc>
+                <a:tc>
+                  <a:txBody>
+                    <a:bodyPr/>
+                    <a:lstStyle/>
+                    <a:p>
+                      <a:endParaRPr lang="en-US" sz="1000"/>
+                    </a:p>
+                  </a:txBody>
+                  <a:tcPr marL="88344" marR="88344" marT="44172" marB="44172">
+                    <a:solidFill>
+                      <a:schemeClr val="bg2"/>
+                    </a:solidFill>
+                  </a:tcPr>
+                </a:tc>
+                <a:tc>
+                  <a:txBody>
+                    <a:bodyPr/>
+                    <a:lstStyle/>
+                    <a:p>
+                      <a:endParaRPr lang="en-US" sz="1000"/>
+                    </a:p>
+                  </a:txBody>
+                  <a:tcPr marL="88344" marR="88344" marT="44172" marB="44172">
+                    <a:solidFill>
+                      <a:schemeClr val="bg2"/>
+                    </a:solidFill>
+                  </a:tcPr>
+                </a:tc>
+                <a:tc>
+                  <a:txBody>
+                    <a:bodyPr/>
+                    <a:lstStyle/>
+                    <a:p>
+                      <a:endParaRPr lang="en-US" sz="1000"/>
+                    </a:p>
+                  </a:txBody>
+                  <a:tcPr marL="88344" marR="88344" marT="44172" marB="44172">
+                    <a:solidFill>
+                      <a:schemeClr val="bg2"/>
+                    </a:solidFill>
+                  </a:tcPr>
+                </a:tc>
+                <a:tc>
+                  <a:txBody>
+                    <a:bodyPr/>
+                    <a:lstStyle/>
+                    <a:p>
+                      <a:endParaRPr lang="en-US" sz="1000"/>
+                    </a:p>
+                  </a:txBody>
+                  <a:tcPr marL="88344" marR="88344" marT="44172" marB="44172">
+                    <a:solidFill>
+                      <a:schemeClr val="bg2"/>
+                    </a:solidFill>
+                  </a:tcPr>
+                </a:tc>
+              </a:tr>
+              <a:tr h="331477">
+                <a:tc>
+                  <a:txBody>
+                    <a:bodyPr/>
+                    <a:lstStyle/>
+                    <a:p>
+                      <a:endParaRPr lang="en-US" sz="1000"/>
+                    </a:p>
+                  </a:txBody>
+                  <a:tcPr marL="88344" marR="88344" marT="44172" marB="44172"/>
+                </a:tc>
+                <a:tc>
+                  <a:txBody>
+                    <a:bodyPr/>
+                    <a:lstStyle/>
+                    <a:p>
+                      <a:endParaRPr lang="en-US" sz="1000"/>
+                    </a:p>
+                  </a:txBody>
+                  <a:tcPr marL="88344" marR="88344" marT="44172" marB="44172"/>
+                </a:tc>
+                <a:tc>
+                  <a:txBody>
+                    <a:bodyPr/>
+                    <a:lstStyle/>
+                    <a:p>
+                      <a:endParaRPr lang="en-US" sz="1000"/>
+                    </a:p>
+                  </a:txBody>
+                  <a:tcPr marL="88344" marR="88344" marT="44172" marB="44172"/>
+                </a:tc>
+                <a:tc>
+                  <a:txBody>
+                    <a:bodyPr/>
+                    <a:lstStyle/>
+                    <a:p>
+                      <a:endParaRPr lang="en-US" sz="1000"/>
+                    </a:p>
+                  </a:txBody>
+                  <a:tcPr marL="88344" marR="88344" marT="44172" marB="44172"/>
+                </a:tc>
+                <a:tc>
+                  <a:txBody>
+                    <a:bodyPr/>
+                    <a:lstStyle/>
+                    <a:p>
+                      <a:endParaRPr lang="en-US" sz="1000"/>
+                    </a:p>
+                  </a:txBody>
+                  <a:tcPr marL="88344" marR="88344" marT="44172" marB="44172"/>
+                </a:tc>
+                <a:tc>
+                  <a:txBody>
+                    <a:bodyPr/>
+                    <a:lstStyle/>
+                    <a:p>
+                      <a:endParaRPr lang="en-US" sz="1000"/>
+                    </a:p>
+                  </a:txBody>
+                  <a:tcPr marL="88344" marR="88344" marT="44172" marB="44172"/>
+                </a:tc>
+              </a:tr>
+              <a:tr h="331477">
+                <a:tc>
+                  <a:txBody>
+                    <a:bodyPr/>
+                    <a:lstStyle/>
+                    <a:p>
+                      <a:endParaRPr lang="en-US" sz="1000"/>
+                    </a:p>
+                  </a:txBody>
+                  <a:tcPr marL="88344" marR="88344" marT="44172" marB="44172"/>
+                </a:tc>
+                <a:tc>
+                  <a:txBody>
+                    <a:bodyPr/>
+                    <a:lstStyle/>
+                    <a:p>
+                      <a:endParaRPr lang="en-US" sz="1000"/>
+                    </a:p>
+                  </a:txBody>
+                  <a:tcPr marL="88344" marR="88344" marT="44172" marB="44172"/>
+                </a:tc>
+                <a:tc>
+                  <a:txBody>
+                    <a:bodyPr/>
+                    <a:lstStyle/>
+                    <a:p>
+                      <a:endParaRPr lang="en-US" sz="1000"/>
+                    </a:p>
+                  </a:txBody>
+                  <a:tcPr marL="88344" marR="88344" marT="44172" marB="44172"/>
+                </a:tc>
+                <a:tc>
+                  <a:txBody>
+                    <a:bodyPr/>
+                    <a:lstStyle/>
+                    <a:p>
+                      <a:endParaRPr lang="en-US" sz="1000"/>
+                    </a:p>
+                  </a:txBody>
+                  <a:tcPr marL="88344" marR="88344" marT="44172" marB="44172"/>
+                </a:tc>
+                <a:tc>
+                  <a:txBody>
+                    <a:bodyPr/>
+                    <a:lstStyle/>
+                    <a:p>
+                      <a:endParaRPr lang="en-US" sz="1000"/>
+                    </a:p>
+                  </a:txBody>
+                  <a:tcPr marL="88344" marR="88344" marT="44172" marB="44172"/>
+                </a:tc>
+                <a:tc>
+                  <a:txBody>
+                    <a:bodyPr/>
+                    <a:lstStyle/>
+                    <a:p>
+                      <a:endParaRPr lang="en-US" sz="1000"/>
+                    </a:p>
+                  </a:txBody>
+                  <a:tcPr marL="88344" marR="88344" marT="44172" marB="44172"/>
+                </a:tc>
+              </a:tr>
+              <a:tr h="331477">
+                <a:tc>
+                  <a:txBody>
+                    <a:bodyPr/>
+                    <a:lstStyle/>
+                    <a:p>
+                      <a:endParaRPr lang="en-US" sz="1000"/>
+                    </a:p>
+                  </a:txBody>
+                  <a:tcPr marL="88344" marR="88344" marT="44172" marB="44172"/>
+                </a:tc>
+                <a:tc>
+                  <a:txBody>
+                    <a:bodyPr/>
+                    <a:lstStyle/>
+                    <a:p>
+                      <a:endParaRPr lang="en-US" sz="1000"/>
+                    </a:p>
+                  </a:txBody>
+                  <a:tcPr marL="88344" marR="88344" marT="44172" marB="44172"/>
+                </a:tc>
+                <a:tc>
+                  <a:txBody>
+                    <a:bodyPr/>
+                    <a:lstStyle/>
+                    <a:p>
+                      <a:endParaRPr lang="en-US" sz="1000"/>
+                    </a:p>
+                  </a:txBody>
+                  <a:tcPr marL="88344" marR="88344" marT="44172" marB="44172"/>
+                </a:tc>
+                <a:tc>
+                  <a:txBody>
+                    <a:bodyPr/>
+                    <a:lstStyle/>
+                    <a:p>
+                      <a:endParaRPr lang="en-US" sz="1000"/>
+                    </a:p>
+                  </a:txBody>
+                  <a:tcPr marL="88344" marR="88344" marT="44172" marB="44172"/>
+                </a:tc>
+                <a:tc>
+                  <a:txBody>
+                    <a:bodyPr/>
+                    <a:lstStyle/>
+                    <a:p>
+                      <a:endParaRPr lang="en-US" sz="1000"/>
+                    </a:p>
+                  </a:txBody>
+                  <a:tcPr marL="88344" marR="88344" marT="44172" marB="44172"/>
+                </a:tc>
+                <a:tc>
+                  <a:txBody>
+                    <a:bodyPr/>
+                    <a:lstStyle/>
+                    <a:p>
+                      <a:endParaRPr lang="en-US" sz="1000"/>
+                    </a:p>
+                  </a:txBody>
+                  <a:tcPr marL="88344" marR="88344" marT="44172" marB="44172"/>
+                </a:tc>
+              </a:tr>
+              <a:tr h="331477">
+                <a:tc>
+                  <a:txBody>
+                    <a:bodyPr/>
+                    <a:lstStyle/>
+                    <a:p>
+                      <a:endParaRPr lang="en-US" sz="1000"/>
+                    </a:p>
+                  </a:txBody>
+                  <a:tcPr marL="88344" marR="88344" marT="44172" marB="44172"/>
+                </a:tc>
+                <a:tc>
+                  <a:txBody>
+                    <a:bodyPr/>
+                    <a:lstStyle/>
+                    <a:p>
+                      <a:endParaRPr lang="en-US" sz="1000"/>
+                    </a:p>
+                  </a:txBody>
+                  <a:tcPr marL="88344" marR="88344" marT="44172" marB="44172"/>
+                </a:tc>
+                <a:tc>
+                  <a:txBody>
+                    <a:bodyPr/>
+                    <a:lstStyle/>
+                    <a:p>
+                      <a:endParaRPr lang="en-US" sz="1000"/>
+                    </a:p>
+                  </a:txBody>
+                  <a:tcPr marL="88344" marR="88344" marT="44172" marB="44172"/>
+                </a:tc>
+                <a:tc>
+                  <a:txBody>
+                    <a:bodyPr/>
+                    <a:lstStyle/>
+                    <a:p>
+                      <a:endParaRPr lang="en-US" sz="1000"/>
+                    </a:p>
+                  </a:txBody>
+                  <a:tcPr marL="88344" marR="88344" marT="44172" marB="44172"/>
+                </a:tc>
+                <a:tc>
+                  <a:txBody>
+                    <a:bodyPr/>
+                    <a:lstStyle/>
+                    <a:p>
+                      <a:endParaRPr lang="en-US" sz="1000"/>
+                    </a:p>
+                  </a:txBody>
+                  <a:tcPr marL="88344" marR="88344" marT="44172" marB="44172"/>
+                </a:tc>
+                <a:tc>
+                  <a:txBody>
+                    <a:bodyPr/>
+                    <a:lstStyle/>
+                    <a:p>
+                      <a:endParaRPr lang="en-US" sz="1000"/>
+                    </a:p>
+                  </a:txBody>
+                  <a:tcPr marL="88344" marR="88344" marT="44172" marB="44172"/>
+                </a:tc>
+              </a:tr>
+              <a:tr h="331477">
+                <a:tc>
+                  <a:txBody>
+                    <a:bodyPr/>
+                    <a:lstStyle/>
+                    <a:p>
+                      <a:endParaRPr lang="en-US" sz="1000"/>
+                    </a:p>
+                  </a:txBody>
+                  <a:tcPr marL="88344" marR="88344" marT="44172" marB="44172"/>
+                </a:tc>
+                <a:tc>
+                  <a:txBody>
+                    <a:bodyPr/>
+                    <a:lstStyle/>
+                    <a:p>
+                      <a:endParaRPr lang="en-US" sz="1000"/>
+                    </a:p>
+                  </a:txBody>
+                  <a:tcPr marL="88344" marR="88344" marT="44172" marB="44172"/>
+                </a:tc>
+                <a:tc>
+                  <a:txBody>
+                    <a:bodyPr/>
+                    <a:lstStyle/>
+                    <a:p>
+                      <a:endParaRPr lang="en-US" sz="1000"/>
+                    </a:p>
+                  </a:txBody>
+                  <a:tcPr marL="88344" marR="88344" marT="44172" marB="44172"/>
+                </a:tc>
+                <a:tc>
+                  <a:txBody>
+                    <a:bodyPr/>
+                    <a:lstStyle/>
+                    <a:p>
+                      <a:endParaRPr lang="en-US" sz="1000"/>
+                    </a:p>
+                  </a:txBody>
+                  <a:tcPr marL="88344" marR="88344" marT="44172" marB="44172"/>
+                </a:tc>
+                <a:tc>
+                  <a:txBody>
+                    <a:bodyPr/>
+                    <a:lstStyle/>
+                    <a:p>
+                      <a:endParaRPr lang="en-US" sz="1000"/>
+                    </a:p>
+                  </a:txBody>
+                  <a:tcPr marL="88344" marR="88344" marT="44172" marB="44172"/>
+                </a:tc>
+                <a:tc>
+                  <a:txBody>
+                    <a:bodyPr/>
+                    <a:lstStyle/>
+                    <a:p>
+                      <a:endParaRPr lang="en-US" sz="1000"/>
+                    </a:p>
+                  </a:txBody>
+                  <a:tcPr marL="88344" marR="88344" marT="44172" marB="44172"/>
+                </a:tc>
+              </a:tr>
+            </a:tbl>
+          </a:graphicData>
+        </a:graphic>
+      </p:graphicFrame>
+      <p:pic>
+        <p:nvPicPr>
+          <p:cNvPr id="5" name="Picture 4"/>
+          <p:cNvPicPr>
+            <a:picLocks noChangeAspect="1"/>
+          </p:cNvPicPr>
+          <p:nvPr/>
+        </p:nvPicPr>
+        <p:blipFill>
+          <a:blip r:embed="rId2">
+            <a:extLst>
+              <a:ext uri="{28A0092B-C50C-407E-A947-70E740481C1C}">
+                <a14:useLocalDpi xmlns:a14="http://schemas.microsoft.com/office/drawing/2010/main" val="0"/>
+              </a:ext>
+            </a:extLst>
+          </a:blip>
+          <a:stretch>
+            <a:fillRect/>
+          </a:stretch>
+        </p:blipFill>
+        <p:spPr>
+          <a:xfrm>
+            <a:off x="163772" y="2361767"/>
+            <a:ext cx="11779180" cy="1988859"/>
+          </a:xfrm>
+          <a:prstGeom prst="rect">
+            <a:avLst/>
+          </a:prstGeom>
+        </p:spPr>
+      </p:pic>
+    </p:spTree>
+    <p:extLst>
+      <p:ext uri="{BB962C8B-B14F-4D97-AF65-F5344CB8AC3E}">
+        <p14:creationId xmlns:p14="http://schemas.microsoft.com/office/powerpoint/2010/main" val="2106658581"/>
+      </p:ext>
+    </p:extLst>
+  </p:cSld>
+  <p:clrMapOvr>
+    <a:masterClrMapping/>
+  </p:clrMapOvr>
+  <p:timing>
+    <p:tnLst>
+      <p:par>
+        <p:cTn id="1" dur="indefinite" restart="never" nodeType="tmRoot"/>
+      </p:par>
+    </p:tnLst>
+  </p:timing>
+</p:sld>
+</file>
+
+<file path=ppt/slides/slide21.xml><?xml version="1.0" encoding="utf-8"?>
+<p:sld xmlns:a="http://schemas.openxmlformats.org/drawingml/2006/main" xmlns:r="http://schemas.openxmlformats.org/officeDocument/2006/relationships" xmlns:p="http://schemas.openxmlformats.org/presentationml/2006/main">
+  <p:cSld>
+    <p:spTree>
+      <p:nvGrpSpPr>
+        <p:cNvPr id="1" name=""/>
+        <p:cNvGrpSpPr/>
+        <p:nvPr/>
+      </p:nvGrpSpPr>
+      <p:grpSpPr>
+        <a:xfrm>
+          <a:off x="0" y="0"/>
+          <a:ext cx="0" cy="0"/>
+          <a:chOff x="0" y="0"/>
+          <a:chExt cx="0" cy="0"/>
+        </a:xfrm>
+      </p:grpSpPr>
+      <p:pic>
+        <p:nvPicPr>
+          <p:cNvPr id="2" name="Picture 1"/>
+          <p:cNvPicPr>
+            <a:picLocks noChangeAspect="1"/>
+          </p:cNvPicPr>
+          <p:nvPr/>
+        </p:nvPicPr>
+        <p:blipFill>
+          <a:blip r:embed="rId2">
+            <a:extLst>
+              <a:ext uri="{28A0092B-C50C-407E-A947-70E740481C1C}">
+                <a14:useLocalDpi xmlns:a14="http://schemas.microsoft.com/office/drawing/2010/main" val="0"/>
+              </a:ext>
+            </a:extLst>
+          </a:blip>
+          <a:stretch>
+            <a:fillRect/>
+          </a:stretch>
+        </p:blipFill>
+        <p:spPr>
+          <a:xfrm>
+            <a:off x="2814851" y="977711"/>
+            <a:ext cx="3439236" cy="859809"/>
+          </a:xfrm>
+          <a:prstGeom prst="rect">
+            <a:avLst/>
+          </a:prstGeom>
+        </p:spPr>
+      </p:pic>
+      <p:pic>
+        <p:nvPicPr>
+          <p:cNvPr id="3" name="Picture 2"/>
+          <p:cNvPicPr>
+            <a:picLocks noChangeAspect="1"/>
+          </p:cNvPicPr>
+          <p:nvPr/>
+        </p:nvPicPr>
+        <p:blipFill>
+          <a:blip r:embed="rId3">
+            <a:extLst>
+              <a:ext uri="{28A0092B-C50C-407E-A947-70E740481C1C}">
+                <a14:useLocalDpi xmlns:a14="http://schemas.microsoft.com/office/drawing/2010/main" val="0"/>
+              </a:ext>
+            </a:extLst>
+          </a:blip>
+          <a:stretch>
+            <a:fillRect/>
+          </a:stretch>
+        </p:blipFill>
+        <p:spPr>
+          <a:xfrm>
+            <a:off x="2814851" y="1837520"/>
+            <a:ext cx="3492500" cy="2324100"/>
+          </a:xfrm>
+          <a:prstGeom prst="rect">
+            <a:avLst/>
+          </a:prstGeom>
+        </p:spPr>
+      </p:pic>
+    </p:spTree>
+    <p:extLst>
+      <p:ext uri="{BB962C8B-B14F-4D97-AF65-F5344CB8AC3E}">
+        <p14:creationId xmlns:p14="http://schemas.microsoft.com/office/powerpoint/2010/main" val="1523822959"/>
+      </p:ext>
+    </p:extLst>
+  </p:cSld>
+  <p:clrMapOvr>
+    <a:masterClrMapping/>
+  </p:clrMapOvr>
+  <p:timing>
+    <p:tnLst>
+      <p:par>
+        <p:cTn id="1" dur="indefinite" restart="never" nodeType="tmRoot"/>
+      </p:par>
+    </p:tnLst>
+  </p:timing>
+</p:sld>
+</file>
+
+<file path=ppt/slides/slide22.xml><?xml version="1.0" encoding="utf-8"?>
+<p:sld xmlns:a="http://schemas.openxmlformats.org/drawingml/2006/main" xmlns:r="http://schemas.openxmlformats.org/officeDocument/2006/relationships" xmlns:p="http://schemas.openxmlformats.org/presentationml/2006/main">
+  <p:cSld>
+    <p:spTree>
+      <p:nvGrpSpPr>
+        <p:cNvPr id="1" name=""/>
+        <p:cNvGrpSpPr/>
+        <p:nvPr/>
+      </p:nvGrpSpPr>
+      <p:grpSpPr>
+        <a:xfrm>
+          <a:off x="0" y="0"/>
+          <a:ext cx="0" cy="0"/>
+          <a:chOff x="0" y="0"/>
+          <a:chExt cx="0" cy="0"/>
+        </a:xfrm>
+      </p:grpSpPr>
+      <p:graphicFrame>
+        <p:nvGraphicFramePr>
+          <p:cNvPr id="2" name="Table 1"/>
+          <p:cNvGraphicFramePr>
+            <a:graphicFrameLocks noGrp="1"/>
+          </p:cNvGraphicFramePr>
+          <p:nvPr>
+            <p:extLst>
+              <p:ext uri="{D42A27DB-BD31-4B8C-83A1-F6EECF244321}">
+                <p14:modId xmlns:p14="http://schemas.microsoft.com/office/powerpoint/2010/main" val="1317893713"/>
+              </p:ext>
+            </p:extLst>
+          </p:nvPr>
+        </p:nvGraphicFramePr>
+        <p:xfrm>
+          <a:off x="1310186" y="719666"/>
+          <a:ext cx="9444250" cy="2743200"/>
+        </p:xfrm>
+        <a:graphic>
+          <a:graphicData uri="http://schemas.openxmlformats.org/drawingml/2006/table">
+            <a:tbl>
+              <a:tblPr firstRow="1" bandRow="1">
+                <a:tableStyleId>{5940675A-B579-460E-94D1-54222C63F5DA}</a:tableStyleId>
+              </a:tblPr>
+              <a:tblGrid>
+                <a:gridCol w="1428972"/>
+                <a:gridCol w="4007639"/>
+                <a:gridCol w="4007639"/>
+              </a:tblGrid>
+              <a:tr h="457200">
+                <a:tc>
+                  <a:txBody>
+                    <a:bodyPr/>
+                    <a:lstStyle/>
+                    <a:p>
+                      <a:pPr algn="ctr"/>
+                      <a:r>
+                        <a:rPr lang="en-US" sz="2400" b="1"/>
+                        <a:t>Model</a:t>
+                      </a:r>
+                    </a:p>
+                  </a:txBody>
+                  <a:tcPr>
+                    <a:solidFill>
+                      <a:schemeClr val="bg2"/>
+                    </a:solidFill>
+                  </a:tcPr>
+                </a:tc>
+                <a:tc>
+                  <a:txBody>
+                    <a:bodyPr/>
+                    <a:lstStyle/>
+                    <a:p>
+                      <a:pPr algn="ctr"/>
+                      <a:r>
+                        <a:rPr lang="en-US" sz="2400" b="1"/>
+                        <a:t>Number of unknown</a:t>
+                      </a:r>
+                      <a:r>
+                        <a:rPr lang="en-US" sz="2400" b="1" baseline="0"/>
+                        <a:t> n-grams</a:t>
+                      </a:r>
+                      <a:endParaRPr lang="en-US" sz="2400" b="1"/>
+                    </a:p>
+                  </a:txBody>
+                  <a:tcPr>
+                    <a:solidFill>
+                      <a:schemeClr val="bg2"/>
+                    </a:solidFill>
+                  </a:tcPr>
+                </a:tc>
+                <a:tc>
+                  <a:txBody>
+                    <a:bodyPr/>
+                    <a:lstStyle/>
+                    <a:p>
+                      <a:pPr algn="ctr"/>
+                      <a:r>
+                        <a:rPr lang="en-US" sz="2400" b="1"/>
+                        <a:t>Percent</a:t>
+                      </a:r>
+                      <a:r>
+                        <a:rPr lang="en-US" sz="2400" b="1" baseline="0"/>
+                        <a:t> </a:t>
+                      </a:r>
+                      <a:r>
+                        <a:rPr lang="en-US" sz="2400" b="1"/>
+                        <a:t>of unknown</a:t>
+                      </a:r>
+                      <a:r>
+                        <a:rPr lang="en-US" sz="2400" b="1" baseline="0"/>
+                        <a:t> n-grams</a:t>
+                      </a:r>
+                      <a:endParaRPr lang="en-US" sz="2400" b="1"/>
+                    </a:p>
+                  </a:txBody>
+                  <a:tcPr>
+                    <a:solidFill>
+                      <a:schemeClr val="bg2"/>
+                    </a:solidFill>
+                  </a:tcPr>
+                </a:tc>
+              </a:tr>
+              <a:tr h="370840">
+                <a:tc>
+                  <a:txBody>
+                    <a:bodyPr/>
+                    <a:lstStyle/>
+                    <a:p>
+                      <a:pPr algn="ctr"/>
+                      <a:r>
+                        <a:rPr lang="en-US" sz="2400"/>
+                        <a:t>Unigram</a:t>
+                      </a:r>
+                    </a:p>
+                  </a:txBody>
+                  <a:tcPr/>
+                </a:tc>
+                <a:tc>
+                  <a:txBody>
+                    <a:bodyPr/>
+                    <a:lstStyle/>
+                    <a:p>
+                      <a:pPr algn="ctr"/>
+                      <a:r>
+                        <a:rPr lang="en-US" sz="2400"/>
+                        <a:t>11500</a:t>
+                      </a:r>
+                    </a:p>
+                  </a:txBody>
+                  <a:tcPr/>
+                </a:tc>
+                <a:tc>
+                  <a:txBody>
+                    <a:bodyPr/>
+                    <a:lstStyle/>
+                    <a:p>
+                      <a:pPr algn="ctr"/>
+                      <a:r>
+                        <a:rPr lang="en-US" sz="2400"/>
+                        <a:t>3.2</a:t>
+                      </a:r>
+                    </a:p>
+                  </a:txBody>
+                  <a:tcPr/>
+                </a:tc>
+              </a:tr>
+              <a:tr h="370840">
+                <a:tc>
+                  <a:txBody>
+                    <a:bodyPr/>
+                    <a:lstStyle/>
+                    <a:p>
+                      <a:pPr algn="ctr"/>
+                      <a:r>
+                        <a:rPr lang="en-US" sz="2400"/>
+                        <a:t>Bigram</a:t>
+                      </a:r>
+                    </a:p>
+                  </a:txBody>
+                  <a:tcPr/>
+                </a:tc>
+                <a:tc>
+                  <a:txBody>
+                    <a:bodyPr/>
+                    <a:lstStyle/>
+                    <a:p>
+                      <a:pPr algn="ctr"/>
+                      <a:r>
+                        <a:rPr lang="en-US" sz="2400"/>
+                        <a:t>108509</a:t>
+                      </a:r>
+                    </a:p>
+                  </a:txBody>
+                  <a:tcPr/>
+                </a:tc>
+                <a:tc>
+                  <a:txBody>
+                    <a:bodyPr/>
+                    <a:lstStyle/>
+                    <a:p>
+                      <a:pPr algn="ctr"/>
+                      <a:r>
+                        <a:rPr lang="en-US" sz="2400"/>
+                        <a:t>30.7</a:t>
+                      </a:r>
+                    </a:p>
+                  </a:txBody>
+                  <a:tcPr/>
+                </a:tc>
+              </a:tr>
+              <a:tr h="370840">
+                <a:tc>
+                  <a:txBody>
+                    <a:bodyPr/>
+                    <a:lstStyle/>
+                    <a:p>
+                      <a:pPr algn="ctr"/>
+                      <a:r>
+                        <a:rPr lang="en-US" sz="2400"/>
+                        <a:t>Trigram</a:t>
+                      </a:r>
+                    </a:p>
+                  </a:txBody>
+                  <a:tcPr/>
+                </a:tc>
+                <a:tc>
+                  <a:txBody>
+                    <a:bodyPr/>
+                    <a:lstStyle/>
+                    <a:p>
+                      <a:pPr algn="ctr"/>
+                      <a:r>
+                        <a:rPr lang="is-IS" sz="2400"/>
+                        <a:t>233681</a:t>
+                      </a:r>
+                      <a:endParaRPr lang="en-US" sz="2400"/>
+                    </a:p>
+                  </a:txBody>
+                  <a:tcPr/>
+                </a:tc>
+                <a:tc>
+                  <a:txBody>
+                    <a:bodyPr/>
+                    <a:lstStyle/>
+                    <a:p>
+                      <a:pPr algn="ctr"/>
+                      <a:r>
+                        <a:rPr lang="en-US" sz="2400"/>
+                        <a:t>66.2</a:t>
+                      </a:r>
+                    </a:p>
+                  </a:txBody>
+                  <a:tcPr/>
+                </a:tc>
+              </a:tr>
+              <a:tr h="370840">
+                <a:tc>
+                  <a:txBody>
+                    <a:bodyPr/>
+                    <a:lstStyle/>
+                    <a:p>
+                      <a:pPr algn="ctr"/>
+                      <a:r>
+                        <a:rPr lang="en-US" sz="2400"/>
+                        <a:t>4-gram</a:t>
+                      </a:r>
+                    </a:p>
+                  </a:txBody>
+                  <a:tcPr/>
+                </a:tc>
+                <a:tc>
+                  <a:txBody>
+                    <a:bodyPr/>
+                    <a:lstStyle/>
+                    <a:p>
+                      <a:pPr algn="ctr"/>
+                      <a:r>
+                        <a:rPr lang="is-IS" sz="2400"/>
+                        <a:t>284413</a:t>
+                      </a:r>
+                      <a:endParaRPr lang="en-US" sz="2400"/>
+                    </a:p>
+                  </a:txBody>
+                  <a:tcPr/>
+                </a:tc>
+                <a:tc>
+                  <a:txBody>
+                    <a:bodyPr/>
+                    <a:lstStyle/>
+                    <a:p>
+                      <a:pPr algn="ctr"/>
+                      <a:r>
+                        <a:rPr lang="en-US" sz="2400"/>
+                        <a:t>80.5</a:t>
+                      </a:r>
+                    </a:p>
+                  </a:txBody>
+                  <a:tcPr/>
+                </a:tc>
+              </a:tr>
+              <a:tr h="370840">
+                <a:tc>
+                  <a:txBody>
+                    <a:bodyPr/>
+                    <a:lstStyle/>
+                    <a:p>
+                      <a:pPr algn="ctr"/>
+                      <a:r>
+                        <a:rPr lang="en-US" sz="2400"/>
+                        <a:t>5-gram</a:t>
+                      </a:r>
+                    </a:p>
+                  </a:txBody>
+                  <a:tcPr/>
+                </a:tc>
+                <a:tc>
+                  <a:txBody>
+                    <a:bodyPr/>
+                    <a:lstStyle/>
+                    <a:p>
+                      <a:pPr algn="ctr"/>
+                      <a:r>
+                        <a:rPr lang="is-IS" sz="2400"/>
+                        <a:t>296048</a:t>
+                      </a:r>
+                      <a:endParaRPr lang="en-US" sz="2400"/>
+                    </a:p>
+                  </a:txBody>
+                  <a:tcPr/>
+                </a:tc>
+                <a:tc>
+                  <a:txBody>
+                    <a:bodyPr/>
+                    <a:lstStyle/>
+                    <a:p>
+                      <a:pPr algn="ctr"/>
+                      <a:r>
+                        <a:rPr lang="en-US" sz="2400"/>
+                        <a:t>83.8</a:t>
+                      </a:r>
+                    </a:p>
+                  </a:txBody>
+                  <a:tcPr/>
+                </a:tc>
+              </a:tr>
+            </a:tbl>
+          </a:graphicData>
+        </a:graphic>
+      </p:graphicFrame>
+    </p:spTree>
+    <p:extLst>
+      <p:ext uri="{BB962C8B-B14F-4D97-AF65-F5344CB8AC3E}">
+        <p14:creationId xmlns:p14="http://schemas.microsoft.com/office/powerpoint/2010/main" val="432570341"/>
+      </p:ext>
+    </p:extLst>
+  </p:cSld>
+  <p:clrMapOvr>
+    <a:masterClrMapping/>
+  </p:clrMapOvr>
+  <p:timing>
+    <p:tnLst>
+      <p:par>
+        <p:cTn id="1" dur="indefinite" restart="never" nodeType="tmRoot"/>
+      </p:par>
+    </p:tnLst>
+  </p:timing>
+</p:sld>
+</file>
+
+<file path=ppt/slides/slide23.xml><?xml version="1.0" encoding="utf-8"?>
+<p:sld xmlns:a="http://schemas.openxmlformats.org/drawingml/2006/main" xmlns:r="http://schemas.openxmlformats.org/officeDocument/2006/relationships" xmlns:p="http://schemas.openxmlformats.org/presentationml/2006/main">
+  <p:cSld>
+    <p:spTree>
+      <p:nvGrpSpPr>
+        <p:cNvPr id="1" name=""/>
+        <p:cNvGrpSpPr/>
+        <p:nvPr/>
+      </p:nvGrpSpPr>
+      <p:grpSpPr>
+        <a:xfrm>
+          <a:off x="0" y="0"/>
+          <a:ext cx="0" cy="0"/>
+          <a:chOff x="0" y="0"/>
+          <a:chExt cx="0" cy="0"/>
+        </a:xfrm>
+      </p:grpSpPr>
+      <p:pic>
+        <p:nvPicPr>
+          <p:cNvPr id="2" name="Picture 1"/>
+          <p:cNvPicPr>
+            <a:picLocks noChangeAspect="1"/>
+          </p:cNvPicPr>
+          <p:nvPr/>
+        </p:nvPicPr>
+        <p:blipFill>
+          <a:blip r:embed="rId2"/>
+          <a:stretch>
+            <a:fillRect/>
+          </a:stretch>
+        </p:blipFill>
+        <p:spPr>
+          <a:xfrm>
+            <a:off x="0" y="0"/>
+            <a:ext cx="12192000" cy="6858000"/>
+          </a:xfrm>
+          <a:prstGeom prst="rect">
+            <a:avLst/>
+          </a:prstGeom>
+        </p:spPr>
+      </p:pic>
+      <p:pic>
+        <p:nvPicPr>
+          <p:cNvPr id="4" name="Picture 3"/>
+          <p:cNvPicPr>
+            <a:picLocks noChangeAspect="1"/>
+          </p:cNvPicPr>
+          <p:nvPr/>
+        </p:nvPicPr>
+        <p:blipFill>
+          <a:blip r:embed="rId3">
+            <a:extLst>
+              <a:ext uri="{28A0092B-C50C-407E-A947-70E740481C1C}">
+                <a14:useLocalDpi xmlns:a14="http://schemas.microsoft.com/office/drawing/2010/main" val="0"/>
+              </a:ext>
+            </a:extLst>
+          </a:blip>
+          <a:stretch>
+            <a:fillRect/>
+          </a:stretch>
+        </p:blipFill>
+        <p:spPr>
+          <a:xfrm>
+            <a:off x="406400" y="958755"/>
+            <a:ext cx="11785600" cy="4254500"/>
+          </a:xfrm>
+          <a:prstGeom prst="rect">
+            <a:avLst/>
+          </a:prstGeom>
+        </p:spPr>
+      </p:pic>
+      <p:pic>
+        <p:nvPicPr>
+          <p:cNvPr id="3" name="Picture 2"/>
+          <p:cNvPicPr>
+            <a:picLocks noChangeAspect="1"/>
+          </p:cNvPicPr>
+          <p:nvPr/>
+        </p:nvPicPr>
+        <p:blipFill rotWithShape="1">
+          <a:blip r:embed="rId4">
+            <a:duotone>
+              <a:prstClr val="black"/>
+              <a:srgbClr val="D83737">
+                <a:tint val="45000"/>
+                <a:satMod val="400000"/>
+              </a:srgbClr>
+            </a:duotone>
+            <a:extLst>
+              <a:ext uri="{BEBA8EAE-BF5A-486C-A8C5-ECC9F3942E4B}">
+                <a14:imgProps xmlns:a14="http://schemas.microsoft.com/office/drawing/2010/main">
+                  <a14:imgLayer r:embed="rId5">
+                    <a14:imgEffect>
+                      <a14:brightnessContrast bright="40000"/>
+                    </a14:imgEffect>
+                  </a14:imgLayer>
+                </a14:imgProps>
+              </a:ext>
+              <a:ext uri="{28A0092B-C50C-407E-A947-70E740481C1C}">
+                <a14:useLocalDpi xmlns:a14="http://schemas.microsoft.com/office/drawing/2010/main" val="0"/>
+              </a:ext>
+            </a:extLst>
+          </a:blip>
+          <a:srcRect l="11609" r="12406"/>
+          <a:stretch/>
+        </p:blipFill>
+        <p:spPr>
+          <a:xfrm>
+            <a:off x="1241946" y="614243"/>
+            <a:ext cx="668740" cy="880092"/>
+          </a:xfrm>
+          <a:prstGeom prst="rect">
+            <a:avLst/>
+          </a:prstGeom>
+        </p:spPr>
+      </p:pic>
+    </p:spTree>
+    <p:extLst>
+      <p:ext uri="{BB962C8B-B14F-4D97-AF65-F5344CB8AC3E}">
+        <p14:creationId xmlns:p14="http://schemas.microsoft.com/office/powerpoint/2010/main" val="1196796513"/>
+      </p:ext>
+    </p:extLst>
+  </p:cSld>
+  <p:clrMapOvr>
+    <a:masterClrMapping/>
+  </p:clrMapOvr>
+  <p:timing>
+    <p:tnLst>
+      <p:par>
+        <p:cTn id="1" dur="indefinite" restart="never" nodeType="tmRoot"/>
+      </p:par>
+    </p:tnLst>
+  </p:timing>
 </p:sld>
 </file>
 
@@ -5326,7 +8223,7 @@
           <a:graphicData uri="http://schemas.openxmlformats.org/presentationml/2006/ole">
             <mc:AlternateContent xmlns:mc="http://schemas.openxmlformats.org/markup-compatibility/2006">
               <mc:Choice xmlns:v="urn:schemas-microsoft-com:vml" Requires="v">
-                <p:oleObj spid="_x0000_s1044" name="Worksheet" r:id="rId5" imgW="1892300" imgH="1193800" progId="Excel.Sheet.12">
+                <p:oleObj spid="_x0000_s1059" name="Worksheet" r:id="rId5" imgW="1892300" imgH="1193800" progId="Excel.Sheet.12">
                   <p:embed/>
                 </p:oleObj>
               </mc:Choice>
@@ -5383,7 +8280,7 @@
           <a:graphicData uri="http://schemas.openxmlformats.org/presentationml/2006/ole">
             <mc:AlternateContent xmlns:mc="http://schemas.openxmlformats.org/markup-compatibility/2006">
               <mc:Choice xmlns:v="urn:schemas-microsoft-com:vml" Requires="v">
-                <p:oleObj spid="_x0000_s1045" name="Worksheet" r:id="rId7" imgW="1892300" imgH="1193800" progId="Excel.Sheet.12">
+                <p:oleObj spid="_x0000_s1060" name="Worksheet" r:id="rId7" imgW="1892300" imgH="1193800" progId="Excel.Sheet.12">
                   <p:embed/>
                 </p:oleObj>
               </mc:Choice>
@@ -5470,6 +8367,98 @@
         </p:blipFill>
         <p:spPr>
           <a:xfrm>
+            <a:off x="266700" y="1295400"/>
+            <a:ext cx="11658600" cy="4254500"/>
+          </a:xfrm>
+          <a:prstGeom prst="rect">
+            <a:avLst/>
+          </a:prstGeom>
+        </p:spPr>
+      </p:pic>
+      <p:pic>
+        <p:nvPicPr>
+          <p:cNvPr id="4" name="Picture 3"/>
+          <p:cNvPicPr>
+            <a:picLocks noChangeAspect="1"/>
+          </p:cNvPicPr>
+          <p:nvPr/>
+        </p:nvPicPr>
+        <p:blipFill>
+          <a:blip r:embed="rId3">
+            <a:duotone>
+              <a:prstClr val="black"/>
+              <a:srgbClr val="3985BB">
+                <a:tint val="45000"/>
+                <a:satMod val="400000"/>
+              </a:srgbClr>
+            </a:duotone>
+          </a:blip>
+          <a:stretch>
+            <a:fillRect/>
+          </a:stretch>
+        </p:blipFill>
+        <p:spPr>
+          <a:xfrm>
+            <a:off x="5321222" y="3422650"/>
+            <a:ext cx="1906893" cy="1067860"/>
+          </a:xfrm>
+          <a:prstGeom prst="rect">
+            <a:avLst/>
+          </a:prstGeom>
+        </p:spPr>
+      </p:pic>
+    </p:spTree>
+    <p:extLst>
+      <p:ext uri="{BB962C8B-B14F-4D97-AF65-F5344CB8AC3E}">
+        <p14:creationId xmlns:p14="http://schemas.microsoft.com/office/powerpoint/2010/main" val="1722333019"/>
+      </p:ext>
+    </p:extLst>
+  </p:cSld>
+  <p:clrMapOvr>
+    <a:masterClrMapping/>
+  </p:clrMapOvr>
+</p:sld>
+</file>
+
+<file path=ppt/slides/slide8.xml><?xml version="1.0" encoding="utf-8"?>
+<p:sld xmlns:a="http://schemas.openxmlformats.org/drawingml/2006/main" xmlns:r="http://schemas.openxmlformats.org/officeDocument/2006/relationships" xmlns:p="http://schemas.openxmlformats.org/presentationml/2006/main">
+  <p:cSld>
+    <p:spTree>
+      <p:nvGrpSpPr>
+        <p:cNvPr id="1" name=""/>
+        <p:cNvGrpSpPr/>
+        <p:nvPr/>
+      </p:nvGrpSpPr>
+      <p:grpSpPr>
+        <a:xfrm>
+          <a:off x="0" y="0"/>
+          <a:ext cx="0" cy="0"/>
+          <a:chOff x="0" y="0"/>
+          <a:chExt cx="0" cy="0"/>
+        </a:xfrm>
+      </p:grpSpPr>
+      <p:pic>
+        <p:nvPicPr>
+          <p:cNvPr id="2" name="Picture 1"/>
+          <p:cNvPicPr>
+            <a:picLocks noChangeAspect="1"/>
+          </p:cNvPicPr>
+          <p:nvPr/>
+        </p:nvPicPr>
+        <p:blipFill>
+          <a:blip r:embed="rId2">
+            <a:extLst>
+              <a:ext uri="{28A0092B-C50C-407E-A947-70E740481C1C}">
+                <a14:useLocalDpi xmlns:a14="http://schemas.microsoft.com/office/drawing/2010/main" val="0"/>
+              </a:ext>
+            </a:extLst>
+          </a:blip>
+          <a:stretch>
+            <a:fillRect/>
+          </a:stretch>
+        </p:blipFill>
+        <p:spPr>
+          <a:xfrm>
             <a:off x="434359" y="1358900"/>
             <a:ext cx="11310582" cy="4127500"/>
           </a:xfrm>
@@ -5580,6 +8569,42 @@
           </a:p>
         </p:txBody>
       </p:sp>
+      <p:pic>
+        <p:nvPicPr>
+          <p:cNvPr id="7" name="Picture 6"/>
+          <p:cNvPicPr>
+            <a:picLocks noChangeAspect="1"/>
+          </p:cNvPicPr>
+          <p:nvPr/>
+        </p:nvPicPr>
+        <p:blipFill rotWithShape="1">
+          <a:blip r:embed="rId3">
+            <a:duotone>
+              <a:prstClr val="black"/>
+              <a:srgbClr val="2CA02C">
+                <a:tint val="45000"/>
+                <a:satMod val="400000"/>
+              </a:srgbClr>
+            </a:duotone>
+            <a:extLst>
+              <a:ext uri="{28A0092B-C50C-407E-A947-70E740481C1C}">
+                <a14:useLocalDpi xmlns:a14="http://schemas.microsoft.com/office/drawing/2010/main" val="0"/>
+              </a:ext>
+            </a:extLst>
+          </a:blip>
+          <a:srcRect l="25136" r="23043"/>
+          <a:stretch/>
+        </p:blipFill>
+        <p:spPr>
+          <a:xfrm>
+            <a:off x="1865809" y="2640188"/>
+            <a:ext cx="836023" cy="1182255"/>
+          </a:xfrm>
+          <a:prstGeom prst="rect">
+            <a:avLst/>
+          </a:prstGeom>
+        </p:spPr>
+      </p:pic>
     </p:spTree>
     <p:extLst>
       <p:ext uri="{BB962C8B-B14F-4D97-AF65-F5344CB8AC3E}">
@@ -5593,7 +8618,7 @@
 </p:sld>
 </file>
 
-<file path=ppt/slides/slide8.xml><?xml version="1.0" encoding="utf-8"?>
+<file path=ppt/slides/slide9.xml><?xml version="1.0" encoding="utf-8"?>
 <p:sld xmlns:a="http://schemas.openxmlformats.org/drawingml/2006/main" xmlns:r="http://schemas.openxmlformats.org/officeDocument/2006/relationships" xmlns:p="http://schemas.openxmlformats.org/presentationml/2006/main">
   <p:cSld>
     <p:spTree>
@@ -5794,141 +8819,6 @@
     <p:extLst>
       <p:ext uri="{BB962C8B-B14F-4D97-AF65-F5344CB8AC3E}">
         <p14:creationId xmlns:p14="http://schemas.microsoft.com/office/powerpoint/2010/main" val="778292815"/>
-      </p:ext>
-    </p:extLst>
-  </p:cSld>
-  <p:clrMapOvr>
-    <a:masterClrMapping/>
-  </p:clrMapOvr>
-</p:sld>
-</file>
-
-<file path=ppt/slides/slide9.xml><?xml version="1.0" encoding="utf-8"?>
-<p:sld xmlns:a="http://schemas.openxmlformats.org/drawingml/2006/main" xmlns:r="http://schemas.openxmlformats.org/officeDocument/2006/relationships" xmlns:p="http://schemas.openxmlformats.org/presentationml/2006/main">
-  <p:cSld>
-    <p:spTree>
-      <p:nvGrpSpPr>
-        <p:cNvPr id="1" name=""/>
-        <p:cNvGrpSpPr/>
-        <p:nvPr/>
-      </p:nvGrpSpPr>
-      <p:grpSpPr>
-        <a:xfrm>
-          <a:off x="0" y="0"/>
-          <a:ext cx="0" cy="0"/>
-          <a:chOff x="0" y="0"/>
-          <a:chExt cx="0" cy="0"/>
-        </a:xfrm>
-      </p:grpSpPr>
-      <p:pic>
-        <p:nvPicPr>
-          <p:cNvPr id="2" name="Picture 1"/>
-          <p:cNvPicPr>
-            <a:picLocks noChangeAspect="1"/>
-          </p:cNvPicPr>
-          <p:nvPr/>
-        </p:nvPicPr>
-        <p:blipFill>
-          <a:blip r:embed="rId2">
-            <a:extLst>
-              <a:ext uri="{28A0092B-C50C-407E-A947-70E740481C1C}">
-                <a14:useLocalDpi xmlns:a14="http://schemas.microsoft.com/office/drawing/2010/main" val="0"/>
-              </a:ext>
-            </a:extLst>
-          </a:blip>
-          <a:stretch>
-            <a:fillRect/>
-          </a:stretch>
-        </p:blipFill>
-        <p:spPr>
-          <a:xfrm>
-            <a:off x="1275965" y="694872"/>
-            <a:ext cx="9956800" cy="1346200"/>
-          </a:xfrm>
-          <a:prstGeom prst="rect">
-            <a:avLst/>
-          </a:prstGeom>
-        </p:spPr>
-      </p:pic>
-      <p:cxnSp>
-        <p:nvCxnSpPr>
-          <p:cNvPr id="3" name="Straight Arrow Connector 2"/>
-          <p:cNvCxnSpPr/>
-          <p:nvPr/>
-        </p:nvCxnSpPr>
-        <p:spPr>
-          <a:xfrm flipV="1">
-            <a:off x="1985077" y="1806641"/>
-            <a:ext cx="0" cy="655608"/>
-          </a:xfrm>
-          <a:prstGeom prst="straightConnector1">
-            <a:avLst/>
-          </a:prstGeom>
-          <a:ln>
-            <a:solidFill>
-              <a:srgbClr val="C00000"/>
-            </a:solidFill>
-            <a:tailEnd type="triangle"/>
-          </a:ln>
-        </p:spPr>
-        <p:style>
-          <a:lnRef idx="1">
-            <a:schemeClr val="accent1"/>
-          </a:lnRef>
-          <a:fillRef idx="0">
-            <a:schemeClr val="accent1"/>
-          </a:fillRef>
-          <a:effectRef idx="0">
-            <a:schemeClr val="accent1"/>
-          </a:effectRef>
-          <a:fontRef idx="minor">
-            <a:schemeClr val="tx1"/>
-          </a:fontRef>
-        </p:style>
-      </p:cxnSp>
-      <p:sp>
-        <p:nvSpPr>
-          <p:cNvPr id="4" name="TextBox 3"/>
-          <p:cNvSpPr txBox="1"/>
-          <p:nvPr/>
-        </p:nvSpPr>
-        <p:spPr>
-          <a:xfrm>
-            <a:off x="0" y="2500612"/>
-            <a:ext cx="3970153" cy="830997"/>
-          </a:xfrm>
-          <a:prstGeom prst="rect">
-            <a:avLst/>
-          </a:prstGeom>
-          <a:noFill/>
-        </p:spPr>
-        <p:txBody>
-          <a:bodyPr wrap="square" rtlCol="0">
-            <a:spAutoFit/>
-          </a:bodyPr>
-          <a:lstStyle/>
-          <a:p>
-            <a:pPr algn="ctr"/>
-            <a:r>
-              <a:rPr lang="en-US" sz="2400">
-                <a:solidFill>
-                  <a:srgbClr val="C00000"/>
-                </a:solidFill>
-              </a:rPr>
-              <a:t>proportion of un-smoothed unigram model</a:t>
-            </a:r>
-            <a:endParaRPr lang="en-US">
-              <a:solidFill>
-                <a:srgbClr val="C00000"/>
-              </a:solidFill>
-            </a:endParaRPr>
-          </a:p>
-        </p:txBody>
-      </p:sp>
-    </p:spTree>
-    <p:extLst>
-      <p:ext uri="{BB962C8B-B14F-4D97-AF65-F5344CB8AC3E}">
-        <p14:creationId xmlns:p14="http://schemas.microsoft.com/office/powerpoint/2010/main" val="1616797430"/>
       </p:ext>
     </p:extLst>
   </p:cSld>

</xml_diff>

<commit_message>
Small graph fix, and save concatenated probability matrix for part 3
</commit_message>
<xml_diff>
--- a/ppt/medium.pptx
+++ b/ppt/medium.pptx
@@ -6648,441 +6648,9 @@
           <a:chExt cx="0" cy="0"/>
         </a:xfrm>
       </p:grpSpPr>
-      <p:graphicFrame>
-        <p:nvGraphicFramePr>
-          <p:cNvPr id="6" name="Table 5"/>
-          <p:cNvGraphicFramePr>
-            <a:graphicFrameLocks noGrp="1"/>
-          </p:cNvGraphicFramePr>
-          <p:nvPr>
-            <p:extLst>
-              <p:ext uri="{D42A27DB-BD31-4B8C-83A1-F6EECF244321}">
-                <p14:modId xmlns:p14="http://schemas.microsoft.com/office/powerpoint/2010/main" val="704444312"/>
-              </p:ext>
-            </p:extLst>
-          </p:nvPr>
-        </p:nvGraphicFramePr>
-        <p:xfrm>
-          <a:off x="232013" y="2361766"/>
-          <a:ext cx="11682485" cy="1988862"/>
-        </p:xfrm>
-        <a:graphic>
-          <a:graphicData uri="http://schemas.openxmlformats.org/drawingml/2006/table">
-            <a:tbl>
-              <a:tblPr firstRow="1" bandRow="1">
-                <a:tableStyleId>{5940675A-B579-460E-94D1-54222C63F5DA}</a:tableStyleId>
-              </a:tblPr>
-              <a:tblGrid>
-                <a:gridCol w="975738"/>
-                <a:gridCol w="3589049"/>
-                <a:gridCol w="997808"/>
-                <a:gridCol w="1130850"/>
-                <a:gridCol w="1534401"/>
-                <a:gridCol w="3454639"/>
-              </a:tblGrid>
-              <a:tr h="331477">
-                <a:tc>
-                  <a:txBody>
-                    <a:bodyPr/>
-                    <a:lstStyle/>
-                    <a:p>
-                      <a:endParaRPr lang="en-US" sz="1000"/>
-                    </a:p>
-                  </a:txBody>
-                  <a:tcPr marL="88344" marR="88344" marT="44172" marB="44172">
-                    <a:solidFill>
-                      <a:schemeClr val="bg2"/>
-                    </a:solidFill>
-                  </a:tcPr>
-                </a:tc>
-                <a:tc>
-                  <a:txBody>
-                    <a:bodyPr/>
-                    <a:lstStyle/>
-                    <a:p>
-                      <a:endParaRPr lang="en-US" sz="1000"/>
-                    </a:p>
-                  </a:txBody>
-                  <a:tcPr marL="88344" marR="88344" marT="44172" marB="44172">
-                    <a:solidFill>
-                      <a:schemeClr val="bg2"/>
-                    </a:solidFill>
-                  </a:tcPr>
-                </a:tc>
-                <a:tc>
-                  <a:txBody>
-                    <a:bodyPr/>
-                    <a:lstStyle/>
-                    <a:p>
-                      <a:endParaRPr lang="en-US" sz="1000"/>
-                    </a:p>
-                  </a:txBody>
-                  <a:tcPr marL="88344" marR="88344" marT="44172" marB="44172">
-                    <a:solidFill>
-                      <a:schemeClr val="bg2"/>
-                    </a:solidFill>
-                  </a:tcPr>
-                </a:tc>
-                <a:tc>
-                  <a:txBody>
-                    <a:bodyPr/>
-                    <a:lstStyle/>
-                    <a:p>
-                      <a:endParaRPr lang="en-US" sz="1000"/>
-                    </a:p>
-                  </a:txBody>
-                  <a:tcPr marL="88344" marR="88344" marT="44172" marB="44172">
-                    <a:solidFill>
-                      <a:schemeClr val="bg2"/>
-                    </a:solidFill>
-                  </a:tcPr>
-                </a:tc>
-                <a:tc>
-                  <a:txBody>
-                    <a:bodyPr/>
-                    <a:lstStyle/>
-                    <a:p>
-                      <a:endParaRPr lang="en-US" sz="1000"/>
-                    </a:p>
-                  </a:txBody>
-                  <a:tcPr marL="88344" marR="88344" marT="44172" marB="44172">
-                    <a:solidFill>
-                      <a:schemeClr val="bg2"/>
-                    </a:solidFill>
-                  </a:tcPr>
-                </a:tc>
-                <a:tc>
-                  <a:txBody>
-                    <a:bodyPr/>
-                    <a:lstStyle/>
-                    <a:p>
-                      <a:endParaRPr lang="en-US" sz="1000"/>
-                    </a:p>
-                  </a:txBody>
-                  <a:tcPr marL="88344" marR="88344" marT="44172" marB="44172">
-                    <a:solidFill>
-                      <a:schemeClr val="bg2"/>
-                    </a:solidFill>
-                  </a:tcPr>
-                </a:tc>
-              </a:tr>
-              <a:tr h="331477">
-                <a:tc>
-                  <a:txBody>
-                    <a:bodyPr/>
-                    <a:lstStyle/>
-                    <a:p>
-                      <a:endParaRPr lang="en-US" sz="1000"/>
-                    </a:p>
-                  </a:txBody>
-                  <a:tcPr marL="88344" marR="88344" marT="44172" marB="44172"/>
-                </a:tc>
-                <a:tc>
-                  <a:txBody>
-                    <a:bodyPr/>
-                    <a:lstStyle/>
-                    <a:p>
-                      <a:endParaRPr lang="en-US" sz="1000"/>
-                    </a:p>
-                  </a:txBody>
-                  <a:tcPr marL="88344" marR="88344" marT="44172" marB="44172"/>
-                </a:tc>
-                <a:tc>
-                  <a:txBody>
-                    <a:bodyPr/>
-                    <a:lstStyle/>
-                    <a:p>
-                      <a:endParaRPr lang="en-US" sz="1000"/>
-                    </a:p>
-                  </a:txBody>
-                  <a:tcPr marL="88344" marR="88344" marT="44172" marB="44172"/>
-                </a:tc>
-                <a:tc>
-                  <a:txBody>
-                    <a:bodyPr/>
-                    <a:lstStyle/>
-                    <a:p>
-                      <a:endParaRPr lang="en-US" sz="1000"/>
-                    </a:p>
-                  </a:txBody>
-                  <a:tcPr marL="88344" marR="88344" marT="44172" marB="44172"/>
-                </a:tc>
-                <a:tc>
-                  <a:txBody>
-                    <a:bodyPr/>
-                    <a:lstStyle/>
-                    <a:p>
-                      <a:endParaRPr lang="en-US" sz="1000"/>
-                    </a:p>
-                  </a:txBody>
-                  <a:tcPr marL="88344" marR="88344" marT="44172" marB="44172"/>
-                </a:tc>
-                <a:tc>
-                  <a:txBody>
-                    <a:bodyPr/>
-                    <a:lstStyle/>
-                    <a:p>
-                      <a:endParaRPr lang="en-US" sz="1000"/>
-                    </a:p>
-                  </a:txBody>
-                  <a:tcPr marL="88344" marR="88344" marT="44172" marB="44172"/>
-                </a:tc>
-              </a:tr>
-              <a:tr h="331477">
-                <a:tc>
-                  <a:txBody>
-                    <a:bodyPr/>
-                    <a:lstStyle/>
-                    <a:p>
-                      <a:endParaRPr lang="en-US" sz="1000"/>
-                    </a:p>
-                  </a:txBody>
-                  <a:tcPr marL="88344" marR="88344" marT="44172" marB="44172"/>
-                </a:tc>
-                <a:tc>
-                  <a:txBody>
-                    <a:bodyPr/>
-                    <a:lstStyle/>
-                    <a:p>
-                      <a:endParaRPr lang="en-US" sz="1000"/>
-                    </a:p>
-                  </a:txBody>
-                  <a:tcPr marL="88344" marR="88344" marT="44172" marB="44172"/>
-                </a:tc>
-                <a:tc>
-                  <a:txBody>
-                    <a:bodyPr/>
-                    <a:lstStyle/>
-                    <a:p>
-                      <a:endParaRPr lang="en-US" sz="1000"/>
-                    </a:p>
-                  </a:txBody>
-                  <a:tcPr marL="88344" marR="88344" marT="44172" marB="44172"/>
-                </a:tc>
-                <a:tc>
-                  <a:txBody>
-                    <a:bodyPr/>
-                    <a:lstStyle/>
-                    <a:p>
-                      <a:endParaRPr lang="en-US" sz="1000"/>
-                    </a:p>
-                  </a:txBody>
-                  <a:tcPr marL="88344" marR="88344" marT="44172" marB="44172"/>
-                </a:tc>
-                <a:tc>
-                  <a:txBody>
-                    <a:bodyPr/>
-                    <a:lstStyle/>
-                    <a:p>
-                      <a:endParaRPr lang="en-US" sz="1000"/>
-                    </a:p>
-                  </a:txBody>
-                  <a:tcPr marL="88344" marR="88344" marT="44172" marB="44172"/>
-                </a:tc>
-                <a:tc>
-                  <a:txBody>
-                    <a:bodyPr/>
-                    <a:lstStyle/>
-                    <a:p>
-                      <a:endParaRPr lang="en-US" sz="1000"/>
-                    </a:p>
-                  </a:txBody>
-                  <a:tcPr marL="88344" marR="88344" marT="44172" marB="44172"/>
-                </a:tc>
-              </a:tr>
-              <a:tr h="331477">
-                <a:tc>
-                  <a:txBody>
-                    <a:bodyPr/>
-                    <a:lstStyle/>
-                    <a:p>
-                      <a:endParaRPr lang="en-US" sz="1000"/>
-                    </a:p>
-                  </a:txBody>
-                  <a:tcPr marL="88344" marR="88344" marT="44172" marB="44172"/>
-                </a:tc>
-                <a:tc>
-                  <a:txBody>
-                    <a:bodyPr/>
-                    <a:lstStyle/>
-                    <a:p>
-                      <a:endParaRPr lang="en-US" sz="1000"/>
-                    </a:p>
-                  </a:txBody>
-                  <a:tcPr marL="88344" marR="88344" marT="44172" marB="44172"/>
-                </a:tc>
-                <a:tc>
-                  <a:txBody>
-                    <a:bodyPr/>
-                    <a:lstStyle/>
-                    <a:p>
-                      <a:endParaRPr lang="en-US" sz="1000"/>
-                    </a:p>
-                  </a:txBody>
-                  <a:tcPr marL="88344" marR="88344" marT="44172" marB="44172"/>
-                </a:tc>
-                <a:tc>
-                  <a:txBody>
-                    <a:bodyPr/>
-                    <a:lstStyle/>
-                    <a:p>
-                      <a:endParaRPr lang="en-US" sz="1000"/>
-                    </a:p>
-                  </a:txBody>
-                  <a:tcPr marL="88344" marR="88344" marT="44172" marB="44172"/>
-                </a:tc>
-                <a:tc>
-                  <a:txBody>
-                    <a:bodyPr/>
-                    <a:lstStyle/>
-                    <a:p>
-                      <a:endParaRPr lang="en-US" sz="1000"/>
-                    </a:p>
-                  </a:txBody>
-                  <a:tcPr marL="88344" marR="88344" marT="44172" marB="44172"/>
-                </a:tc>
-                <a:tc>
-                  <a:txBody>
-                    <a:bodyPr/>
-                    <a:lstStyle/>
-                    <a:p>
-                      <a:endParaRPr lang="en-US" sz="1000"/>
-                    </a:p>
-                  </a:txBody>
-                  <a:tcPr marL="88344" marR="88344" marT="44172" marB="44172"/>
-                </a:tc>
-              </a:tr>
-              <a:tr h="331477">
-                <a:tc>
-                  <a:txBody>
-                    <a:bodyPr/>
-                    <a:lstStyle/>
-                    <a:p>
-                      <a:endParaRPr lang="en-US" sz="1000"/>
-                    </a:p>
-                  </a:txBody>
-                  <a:tcPr marL="88344" marR="88344" marT="44172" marB="44172"/>
-                </a:tc>
-                <a:tc>
-                  <a:txBody>
-                    <a:bodyPr/>
-                    <a:lstStyle/>
-                    <a:p>
-                      <a:endParaRPr lang="en-US" sz="1000"/>
-                    </a:p>
-                  </a:txBody>
-                  <a:tcPr marL="88344" marR="88344" marT="44172" marB="44172"/>
-                </a:tc>
-                <a:tc>
-                  <a:txBody>
-                    <a:bodyPr/>
-                    <a:lstStyle/>
-                    <a:p>
-                      <a:endParaRPr lang="en-US" sz="1000"/>
-                    </a:p>
-                  </a:txBody>
-                  <a:tcPr marL="88344" marR="88344" marT="44172" marB="44172"/>
-                </a:tc>
-                <a:tc>
-                  <a:txBody>
-                    <a:bodyPr/>
-                    <a:lstStyle/>
-                    <a:p>
-                      <a:endParaRPr lang="en-US" sz="1000"/>
-                    </a:p>
-                  </a:txBody>
-                  <a:tcPr marL="88344" marR="88344" marT="44172" marB="44172"/>
-                </a:tc>
-                <a:tc>
-                  <a:txBody>
-                    <a:bodyPr/>
-                    <a:lstStyle/>
-                    <a:p>
-                      <a:endParaRPr lang="en-US" sz="1000"/>
-                    </a:p>
-                  </a:txBody>
-                  <a:tcPr marL="88344" marR="88344" marT="44172" marB="44172"/>
-                </a:tc>
-                <a:tc>
-                  <a:txBody>
-                    <a:bodyPr/>
-                    <a:lstStyle/>
-                    <a:p>
-                      <a:endParaRPr lang="en-US" sz="1000"/>
-                    </a:p>
-                  </a:txBody>
-                  <a:tcPr marL="88344" marR="88344" marT="44172" marB="44172"/>
-                </a:tc>
-              </a:tr>
-              <a:tr h="331477">
-                <a:tc>
-                  <a:txBody>
-                    <a:bodyPr/>
-                    <a:lstStyle/>
-                    <a:p>
-                      <a:endParaRPr lang="en-US" sz="1000"/>
-                    </a:p>
-                  </a:txBody>
-                  <a:tcPr marL="88344" marR="88344" marT="44172" marB="44172"/>
-                </a:tc>
-                <a:tc>
-                  <a:txBody>
-                    <a:bodyPr/>
-                    <a:lstStyle/>
-                    <a:p>
-                      <a:endParaRPr lang="en-US" sz="1000"/>
-                    </a:p>
-                  </a:txBody>
-                  <a:tcPr marL="88344" marR="88344" marT="44172" marB="44172"/>
-                </a:tc>
-                <a:tc>
-                  <a:txBody>
-                    <a:bodyPr/>
-                    <a:lstStyle/>
-                    <a:p>
-                      <a:endParaRPr lang="en-US" sz="1000"/>
-                    </a:p>
-                  </a:txBody>
-                  <a:tcPr marL="88344" marR="88344" marT="44172" marB="44172"/>
-                </a:tc>
-                <a:tc>
-                  <a:txBody>
-                    <a:bodyPr/>
-                    <a:lstStyle/>
-                    <a:p>
-                      <a:endParaRPr lang="en-US" sz="1000"/>
-                    </a:p>
-                  </a:txBody>
-                  <a:tcPr marL="88344" marR="88344" marT="44172" marB="44172"/>
-                </a:tc>
-                <a:tc>
-                  <a:txBody>
-                    <a:bodyPr/>
-                    <a:lstStyle/>
-                    <a:p>
-                      <a:endParaRPr lang="en-US" sz="1000"/>
-                    </a:p>
-                  </a:txBody>
-                  <a:tcPr marL="88344" marR="88344" marT="44172" marB="44172"/>
-                </a:tc>
-                <a:tc>
-                  <a:txBody>
-                    <a:bodyPr/>
-                    <a:lstStyle/>
-                    <a:p>
-                      <a:endParaRPr lang="en-US" sz="1000"/>
-                    </a:p>
-                  </a:txBody>
-                  <a:tcPr marL="88344" marR="88344" marT="44172" marB="44172"/>
-                </a:tc>
-              </a:tr>
-            </a:tbl>
-          </a:graphicData>
-        </a:graphic>
-      </p:graphicFrame>
       <p:pic>
         <p:nvPicPr>
-          <p:cNvPr id="5" name="Picture 4"/>
+          <p:cNvPr id="16" name="Picture 15"/>
           <p:cNvPicPr>
             <a:picLocks noChangeAspect="1"/>
           </p:cNvPicPr>
@@ -7102,14 +6670,469 @@
         </p:blipFill>
         <p:spPr>
           <a:xfrm>
-            <a:off x="163772" y="2361767"/>
-            <a:ext cx="11779180" cy="1988859"/>
+            <a:off x="13648" y="1618689"/>
+            <a:ext cx="12087172" cy="2155405"/>
           </a:xfrm>
           <a:prstGeom prst="rect">
             <a:avLst/>
           </a:prstGeom>
         </p:spPr>
       </p:pic>
+      <p:graphicFrame>
+        <p:nvGraphicFramePr>
+          <p:cNvPr id="6" name="Table 5"/>
+          <p:cNvGraphicFramePr>
+            <a:graphicFrameLocks noGrp="1"/>
+          </p:cNvGraphicFramePr>
+          <p:nvPr>
+            <p:extLst>
+              <p:ext uri="{D42A27DB-BD31-4B8C-83A1-F6EECF244321}">
+                <p14:modId xmlns:p14="http://schemas.microsoft.com/office/powerpoint/2010/main" val="216025608"/>
+              </p:ext>
+            </p:extLst>
+          </p:nvPr>
+        </p:nvGraphicFramePr>
+        <p:xfrm>
+          <a:off x="54592" y="1634016"/>
+          <a:ext cx="12064621" cy="2099944"/>
+        </p:xfrm>
+        <a:graphic>
+          <a:graphicData uri="http://schemas.openxmlformats.org/drawingml/2006/table">
+            <a:tbl>
+              <a:tblPr firstRow="1" bandRow="1">
+                <a:tableStyleId>{5940675A-B579-460E-94D1-54222C63F5DA}</a:tableStyleId>
+              </a:tblPr>
+              <a:tblGrid>
+                <a:gridCol w="1095964"/>
+                <a:gridCol w="3612621"/>
+                <a:gridCol w="1001251"/>
+                <a:gridCol w="1055373"/>
+                <a:gridCol w="1407163"/>
+                <a:gridCol w="3892249"/>
+              </a:tblGrid>
+              <a:tr h="359546">
+                <a:tc>
+                  <a:txBody>
+                    <a:bodyPr/>
+                    <a:lstStyle/>
+                    <a:p>
+                      <a:r>
+                        <a:rPr lang="en-US" sz="1800" b="1"/>
+                        <a:t>Model</a:t>
+                      </a:r>
+                    </a:p>
+                  </a:txBody>
+                  <a:tcPr marL="87584" marR="87584" marT="43792" marB="43792">
+                    <a:solidFill>
+                      <a:schemeClr val="bg2"/>
+                    </a:solidFill>
+                  </a:tcPr>
+                </a:tc>
+                <a:tc>
+                  <a:txBody>
+                    <a:bodyPr/>
+                    <a:lstStyle/>
+                    <a:p>
+                      <a:r>
+                        <a:rPr lang="en-US" sz="1800" b="1"/>
+                        <a:t>Probability</a:t>
+                      </a:r>
+                    </a:p>
+                  </a:txBody>
+                  <a:tcPr marL="87584" marR="87584" marT="43792" marB="43792">
+                    <a:solidFill>
+                      <a:schemeClr val="bg2"/>
+                    </a:solidFill>
+                  </a:tcPr>
+                </a:tc>
+                <a:tc>
+                  <a:txBody>
+                    <a:bodyPr/>
+                    <a:lstStyle/>
+                    <a:p>
+                      <a:r>
+                        <a:rPr lang="en-US" sz="1800" b="1"/>
+                        <a:t>Estimate</a:t>
+                      </a:r>
+                    </a:p>
+                  </a:txBody>
+                  <a:tcPr marL="87584" marR="87584" marT="43792" marB="43792">
+                    <a:solidFill>
+                      <a:schemeClr val="bg2"/>
+                    </a:solidFill>
+                  </a:tcPr>
+                </a:tc>
+                <a:tc>
+                  <a:txBody>
+                    <a:bodyPr/>
+                    <a:lstStyle/>
+                    <a:p>
+                      <a:r>
+                        <a:rPr lang="en-US" sz="1800" b="1"/>
+                        <a:t># n-gram</a:t>
+                      </a:r>
+                    </a:p>
+                  </a:txBody>
+                  <a:tcPr marL="87584" marR="87584" marT="43792" marB="43792">
+                    <a:solidFill>
+                      <a:schemeClr val="bg2"/>
+                    </a:solidFill>
+                  </a:tcPr>
+                </a:tc>
+                <a:tc>
+                  <a:txBody>
+                    <a:bodyPr/>
+                    <a:lstStyle/>
+                    <a:p>
+                      <a:r>
+                        <a:rPr lang="en-US" sz="1800" b="1"/>
+                        <a:t>#</a:t>
+                      </a:r>
+                      <a:r>
+                        <a:rPr lang="en-US" sz="1800" b="1" baseline="0"/>
+                        <a:t> "n-1"-gram</a:t>
+                      </a:r>
+                      <a:endParaRPr lang="en-US" sz="1800" b="1"/>
+                    </a:p>
+                  </a:txBody>
+                  <a:tcPr marL="87584" marR="87584" marT="43792" marB="43792">
+                    <a:solidFill>
+                      <a:schemeClr val="bg2"/>
+                    </a:solidFill>
+                  </a:tcPr>
+                </a:tc>
+                <a:tc>
+                  <a:txBody>
+                    <a:bodyPr/>
+                    <a:lstStyle/>
+                    <a:p>
+                      <a:r>
+                        <a:rPr lang="en-US" sz="1800" b="1"/>
+                        <a:t>Other n-grams with same context</a:t>
+                      </a:r>
+                    </a:p>
+                  </a:txBody>
+                  <a:tcPr marL="87584" marR="87584" marT="43792" marB="43792">
+                    <a:solidFill>
+                      <a:schemeClr val="bg2"/>
+                    </a:solidFill>
+                  </a:tcPr>
+                </a:tc>
+              </a:tr>
+              <a:tr h="347608">
+                <a:tc>
+                  <a:txBody>
+                    <a:bodyPr/>
+                    <a:lstStyle/>
+                    <a:p>
+                      <a:endParaRPr lang="en-US" sz="1000"/>
+                    </a:p>
+                  </a:txBody>
+                  <a:tcPr marL="87584" marR="87584" marT="43792" marB="43792"/>
+                </a:tc>
+                <a:tc>
+                  <a:txBody>
+                    <a:bodyPr/>
+                    <a:lstStyle/>
+                    <a:p>
+                      <a:endParaRPr lang="en-US" sz="1000"/>
+                    </a:p>
+                  </a:txBody>
+                  <a:tcPr marL="87584" marR="87584" marT="43792" marB="43792"/>
+                </a:tc>
+                <a:tc>
+                  <a:txBody>
+                    <a:bodyPr/>
+                    <a:lstStyle/>
+                    <a:p>
+                      <a:endParaRPr lang="en-US" sz="1000"/>
+                    </a:p>
+                  </a:txBody>
+                  <a:tcPr marL="87584" marR="87584" marT="43792" marB="43792"/>
+                </a:tc>
+                <a:tc>
+                  <a:txBody>
+                    <a:bodyPr/>
+                    <a:lstStyle/>
+                    <a:p>
+                      <a:endParaRPr lang="en-US" sz="1000"/>
+                    </a:p>
+                  </a:txBody>
+                  <a:tcPr marL="87584" marR="87584" marT="43792" marB="43792"/>
+                </a:tc>
+                <a:tc>
+                  <a:txBody>
+                    <a:bodyPr/>
+                    <a:lstStyle/>
+                    <a:p>
+                      <a:endParaRPr lang="en-US" sz="1000"/>
+                    </a:p>
+                  </a:txBody>
+                  <a:tcPr marL="87584" marR="87584" marT="43792" marB="43792"/>
+                </a:tc>
+                <a:tc>
+                  <a:txBody>
+                    <a:bodyPr/>
+                    <a:lstStyle/>
+                    <a:p>
+                      <a:endParaRPr lang="en-US" sz="1000"/>
+                    </a:p>
+                  </a:txBody>
+                  <a:tcPr marL="87584" marR="87584" marT="43792" marB="43792"/>
+                </a:tc>
+              </a:tr>
+              <a:tr h="347608">
+                <a:tc>
+                  <a:txBody>
+                    <a:bodyPr/>
+                    <a:lstStyle/>
+                    <a:p>
+                      <a:endParaRPr lang="en-US" sz="1000"/>
+                    </a:p>
+                  </a:txBody>
+                  <a:tcPr marL="87584" marR="87584" marT="43792" marB="43792"/>
+                </a:tc>
+                <a:tc>
+                  <a:txBody>
+                    <a:bodyPr/>
+                    <a:lstStyle/>
+                    <a:p>
+                      <a:endParaRPr lang="en-US" sz="1000"/>
+                    </a:p>
+                  </a:txBody>
+                  <a:tcPr marL="87584" marR="87584" marT="43792" marB="43792"/>
+                </a:tc>
+                <a:tc>
+                  <a:txBody>
+                    <a:bodyPr/>
+                    <a:lstStyle/>
+                    <a:p>
+                      <a:endParaRPr lang="en-US" sz="1000"/>
+                    </a:p>
+                  </a:txBody>
+                  <a:tcPr marL="87584" marR="87584" marT="43792" marB="43792"/>
+                </a:tc>
+                <a:tc>
+                  <a:txBody>
+                    <a:bodyPr/>
+                    <a:lstStyle/>
+                    <a:p>
+                      <a:endParaRPr lang="en-US" sz="1000"/>
+                    </a:p>
+                  </a:txBody>
+                  <a:tcPr marL="87584" marR="87584" marT="43792" marB="43792"/>
+                </a:tc>
+                <a:tc>
+                  <a:txBody>
+                    <a:bodyPr/>
+                    <a:lstStyle/>
+                    <a:p>
+                      <a:endParaRPr lang="en-US" sz="1000"/>
+                    </a:p>
+                  </a:txBody>
+                  <a:tcPr marL="87584" marR="87584" marT="43792" marB="43792"/>
+                </a:tc>
+                <a:tc>
+                  <a:txBody>
+                    <a:bodyPr/>
+                    <a:lstStyle/>
+                    <a:p>
+                      <a:endParaRPr lang="en-US" sz="1000"/>
+                    </a:p>
+                  </a:txBody>
+                  <a:tcPr marL="87584" marR="87584" marT="43792" marB="43792"/>
+                </a:tc>
+              </a:tr>
+              <a:tr h="347608">
+                <a:tc>
+                  <a:txBody>
+                    <a:bodyPr/>
+                    <a:lstStyle/>
+                    <a:p>
+                      <a:endParaRPr lang="en-US" sz="1000"/>
+                    </a:p>
+                  </a:txBody>
+                  <a:tcPr marL="87584" marR="87584" marT="43792" marB="43792"/>
+                </a:tc>
+                <a:tc>
+                  <a:txBody>
+                    <a:bodyPr/>
+                    <a:lstStyle/>
+                    <a:p>
+                      <a:endParaRPr lang="en-US" sz="1000"/>
+                    </a:p>
+                  </a:txBody>
+                  <a:tcPr marL="87584" marR="87584" marT="43792" marB="43792"/>
+                </a:tc>
+                <a:tc>
+                  <a:txBody>
+                    <a:bodyPr/>
+                    <a:lstStyle/>
+                    <a:p>
+                      <a:endParaRPr lang="en-US" sz="1000"/>
+                    </a:p>
+                  </a:txBody>
+                  <a:tcPr marL="87584" marR="87584" marT="43792" marB="43792"/>
+                </a:tc>
+                <a:tc>
+                  <a:txBody>
+                    <a:bodyPr/>
+                    <a:lstStyle/>
+                    <a:p>
+                      <a:endParaRPr lang="en-US" sz="1000"/>
+                    </a:p>
+                  </a:txBody>
+                  <a:tcPr marL="87584" marR="87584" marT="43792" marB="43792"/>
+                </a:tc>
+                <a:tc>
+                  <a:txBody>
+                    <a:bodyPr/>
+                    <a:lstStyle/>
+                    <a:p>
+                      <a:endParaRPr lang="en-US" sz="1000"/>
+                    </a:p>
+                  </a:txBody>
+                  <a:tcPr marL="87584" marR="87584" marT="43792" marB="43792"/>
+                </a:tc>
+                <a:tc>
+                  <a:txBody>
+                    <a:bodyPr/>
+                    <a:lstStyle/>
+                    <a:p>
+                      <a:endParaRPr lang="en-US" sz="1000"/>
+                    </a:p>
+                  </a:txBody>
+                  <a:tcPr marL="87584" marR="87584" marT="43792" marB="43792"/>
+                </a:tc>
+              </a:tr>
+              <a:tr h="347608">
+                <a:tc>
+                  <a:txBody>
+                    <a:bodyPr/>
+                    <a:lstStyle/>
+                    <a:p>
+                      <a:endParaRPr lang="en-US" sz="1000"/>
+                    </a:p>
+                  </a:txBody>
+                  <a:tcPr marL="87584" marR="87584" marT="43792" marB="43792"/>
+                </a:tc>
+                <a:tc>
+                  <a:txBody>
+                    <a:bodyPr/>
+                    <a:lstStyle/>
+                    <a:p>
+                      <a:endParaRPr lang="en-US" sz="1000"/>
+                    </a:p>
+                  </a:txBody>
+                  <a:tcPr marL="87584" marR="87584" marT="43792" marB="43792"/>
+                </a:tc>
+                <a:tc>
+                  <a:txBody>
+                    <a:bodyPr/>
+                    <a:lstStyle/>
+                    <a:p>
+                      <a:endParaRPr lang="en-US" sz="1000"/>
+                    </a:p>
+                  </a:txBody>
+                  <a:tcPr marL="87584" marR="87584" marT="43792" marB="43792"/>
+                </a:tc>
+                <a:tc>
+                  <a:txBody>
+                    <a:bodyPr/>
+                    <a:lstStyle/>
+                    <a:p>
+                      <a:endParaRPr lang="en-US" sz="1000"/>
+                    </a:p>
+                  </a:txBody>
+                  <a:tcPr marL="87584" marR="87584" marT="43792" marB="43792"/>
+                </a:tc>
+                <a:tc>
+                  <a:txBody>
+                    <a:bodyPr/>
+                    <a:lstStyle/>
+                    <a:p>
+                      <a:endParaRPr lang="en-US" sz="1000"/>
+                    </a:p>
+                  </a:txBody>
+                  <a:tcPr marL="87584" marR="87584" marT="43792" marB="43792"/>
+                </a:tc>
+                <a:tc>
+                  <a:txBody>
+                    <a:bodyPr/>
+                    <a:lstStyle/>
+                    <a:p>
+                      <a:endParaRPr lang="en-US" sz="1000"/>
+                    </a:p>
+                  </a:txBody>
+                  <a:tcPr marL="87584" marR="87584" marT="43792" marB="43792"/>
+                </a:tc>
+              </a:tr>
+              <a:tr h="347608">
+                <a:tc>
+                  <a:txBody>
+                    <a:bodyPr/>
+                    <a:lstStyle/>
+                    <a:p>
+                      <a:endParaRPr lang="en-US" sz="1000"/>
+                    </a:p>
+                  </a:txBody>
+                  <a:tcPr marL="87584" marR="87584" marT="43792" marB="43792"/>
+                </a:tc>
+                <a:tc>
+                  <a:txBody>
+                    <a:bodyPr/>
+                    <a:lstStyle/>
+                    <a:p>
+                      <a:endParaRPr lang="en-US" sz="1000"/>
+                    </a:p>
+                  </a:txBody>
+                  <a:tcPr marL="87584" marR="87584" marT="43792" marB="43792"/>
+                </a:tc>
+                <a:tc>
+                  <a:txBody>
+                    <a:bodyPr/>
+                    <a:lstStyle/>
+                    <a:p>
+                      <a:endParaRPr lang="en-US" sz="1000"/>
+                    </a:p>
+                  </a:txBody>
+                  <a:tcPr marL="87584" marR="87584" marT="43792" marB="43792"/>
+                </a:tc>
+                <a:tc>
+                  <a:txBody>
+                    <a:bodyPr/>
+                    <a:lstStyle/>
+                    <a:p>
+                      <a:endParaRPr lang="en-US" sz="1000"/>
+                    </a:p>
+                  </a:txBody>
+                  <a:tcPr marL="87584" marR="87584" marT="43792" marB="43792"/>
+                </a:tc>
+                <a:tc>
+                  <a:txBody>
+                    <a:bodyPr/>
+                    <a:lstStyle/>
+                    <a:p>
+                      <a:endParaRPr lang="en-US" sz="1000"/>
+                    </a:p>
+                  </a:txBody>
+                  <a:tcPr marL="87584" marR="87584" marT="43792" marB="43792"/>
+                </a:tc>
+                <a:tc>
+                  <a:txBody>
+                    <a:bodyPr/>
+                    <a:lstStyle/>
+                    <a:p>
+                      <a:endParaRPr lang="en-US" sz="1000"/>
+                    </a:p>
+                  </a:txBody>
+                  <a:tcPr marL="87584" marR="87584" marT="43792" marB="43792"/>
+                </a:tc>
+              </a:tr>
+            </a:tbl>
+          </a:graphicData>
+        </a:graphic>
+      </p:graphicFrame>
     </p:spTree>
     <p:extLst>
       <p:ext uri="{BB962C8B-B14F-4D97-AF65-F5344CB8AC3E}">
@@ -8223,7 +8246,7 @@
           <a:graphicData uri="http://schemas.openxmlformats.org/presentationml/2006/ole">
             <mc:AlternateContent xmlns:mc="http://schemas.openxmlformats.org/markup-compatibility/2006">
               <mc:Choice xmlns:v="urn:schemas-microsoft-com:vml" Requires="v">
-                <p:oleObj spid="_x0000_s1059" name="Worksheet" r:id="rId5" imgW="1892300" imgH="1193800" progId="Excel.Sheet.12">
+                <p:oleObj spid="_x0000_s1067" name="Worksheet" r:id="rId5" imgW="1892300" imgH="1193800" progId="Excel.Sheet.12">
                   <p:embed/>
                 </p:oleObj>
               </mc:Choice>
@@ -8280,7 +8303,7 @@
           <a:graphicData uri="http://schemas.openxmlformats.org/presentationml/2006/ole">
             <mc:AlternateContent xmlns:mc="http://schemas.openxmlformats.org/markup-compatibility/2006">
               <mc:Choice xmlns:v="urn:schemas-microsoft-com:vml" Requires="v">
-                <p:oleObj spid="_x0000_s1060" name="Worksheet" r:id="rId7" imgW="1892300" imgH="1193800" progId="Excel.Sheet.12">
+                <p:oleObj spid="_x0000_s1068" name="Worksheet" r:id="rId7" imgW="1892300" imgH="1193800" progId="Excel.Sheet.12">
                   <p:embed/>
                 </p:oleObj>
               </mc:Choice>

</xml_diff>

<commit_message>
Finish gradient descent animation
</commit_message>
<xml_diff>
--- a/ppt/medium.pptx
+++ b/ppt/medium.pptx
@@ -262,7 +262,7 @@
           <a:lstStyle/>
           <a:p>
             <a:fld id="{DF88F67A-92FA-F745-A6F5-E05B74F10186}" type="datetimeFigureOut">
-              <a:t>5/23/20</a:t>
+              <a:t>5/25/20</a:t>
             </a:fld>
             <a:endParaRPr lang="en-US"/>
           </a:p>
@@ -428,7 +428,7 @@
           <a:lstStyle/>
           <a:p>
             <a:fld id="{DF88F67A-92FA-F745-A6F5-E05B74F10186}" type="datetimeFigureOut">
-              <a:t>5/23/20</a:t>
+              <a:t>5/25/20</a:t>
             </a:fld>
             <a:endParaRPr lang="en-US"/>
           </a:p>
@@ -604,7 +604,7 @@
           <a:lstStyle/>
           <a:p>
             <a:fld id="{DF88F67A-92FA-F745-A6F5-E05B74F10186}" type="datetimeFigureOut">
-              <a:t>5/23/20</a:t>
+              <a:t>5/25/20</a:t>
             </a:fld>
             <a:endParaRPr lang="en-US"/>
           </a:p>
@@ -770,7 +770,7 @@
           <a:lstStyle/>
           <a:p>
             <a:fld id="{DF88F67A-92FA-F745-A6F5-E05B74F10186}" type="datetimeFigureOut">
-              <a:t>5/23/20</a:t>
+              <a:t>5/25/20</a:t>
             </a:fld>
             <a:endParaRPr lang="en-US"/>
           </a:p>
@@ -1013,7 +1013,7 @@
           <a:lstStyle/>
           <a:p>
             <a:fld id="{DF88F67A-92FA-F745-A6F5-E05B74F10186}" type="datetimeFigureOut">
-              <a:t>5/23/20</a:t>
+              <a:t>5/25/20</a:t>
             </a:fld>
             <a:endParaRPr lang="en-US"/>
           </a:p>
@@ -1240,7 +1240,7 @@
           <a:lstStyle/>
           <a:p>
             <a:fld id="{DF88F67A-92FA-F745-A6F5-E05B74F10186}" type="datetimeFigureOut">
-              <a:t>5/23/20</a:t>
+              <a:t>5/25/20</a:t>
             </a:fld>
             <a:endParaRPr lang="en-US"/>
           </a:p>
@@ -1602,7 +1602,7 @@
           <a:lstStyle/>
           <a:p>
             <a:fld id="{DF88F67A-92FA-F745-A6F5-E05B74F10186}" type="datetimeFigureOut">
-              <a:t>5/23/20</a:t>
+              <a:t>5/25/20</a:t>
             </a:fld>
             <a:endParaRPr lang="en-US"/>
           </a:p>
@@ -1717,7 +1717,7 @@
           <a:lstStyle/>
           <a:p>
             <a:fld id="{DF88F67A-92FA-F745-A6F5-E05B74F10186}" type="datetimeFigureOut">
-              <a:t>5/23/20</a:t>
+              <a:t>5/25/20</a:t>
             </a:fld>
             <a:endParaRPr lang="en-US"/>
           </a:p>
@@ -1810,7 +1810,7 @@
           <a:lstStyle/>
           <a:p>
             <a:fld id="{DF88F67A-92FA-F745-A6F5-E05B74F10186}" type="datetimeFigureOut">
-              <a:t>5/23/20</a:t>
+              <a:t>5/25/20</a:t>
             </a:fld>
             <a:endParaRPr lang="en-US"/>
           </a:p>
@@ -2083,7 +2083,7 @@
           <a:lstStyle/>
           <a:p>
             <a:fld id="{DF88F67A-92FA-F745-A6F5-E05B74F10186}" type="datetimeFigureOut">
-              <a:t>5/23/20</a:t>
+              <a:t>5/25/20</a:t>
             </a:fld>
             <a:endParaRPr lang="en-US"/>
           </a:p>
@@ -2333,7 +2333,7 @@
           <a:lstStyle/>
           <a:p>
             <a:fld id="{DF88F67A-92FA-F745-A6F5-E05B74F10186}" type="datetimeFigureOut">
-              <a:t>5/23/20</a:t>
+              <a:t>5/25/20</a:t>
             </a:fld>
             <a:endParaRPr lang="en-US"/>
           </a:p>
@@ -2542,7 +2542,7 @@
           </a:lstStyle>
           <a:p>
             <a:fld id="{DF88F67A-92FA-F745-A6F5-E05B74F10186}" type="datetimeFigureOut">
-              <a:t>5/23/20</a:t>
+              <a:t>5/25/20</a:t>
             </a:fld>
             <a:endParaRPr lang="en-US"/>
           </a:p>
@@ -4218,6 +4218,13 @@
   <p:clrMapOvr>
     <a:masterClrMapping/>
   </p:clrMapOvr>
+  <p:timing>
+    <p:tnLst>
+      <p:par>
+        <p:cTn id="1" dur="indefinite" restart="never" nodeType="tmRoot"/>
+      </p:par>
+    </p:tnLst>
+  </p:timing>
 </p:sld>
 </file>
 
@@ -4529,6 +4536,13 @@
   <p:clrMapOvr>
     <a:masterClrMapping/>
   </p:clrMapOvr>
+  <p:timing>
+    <p:tnLst>
+      <p:par>
+        <p:cTn id="1" dur="indefinite" restart="never" nodeType="tmRoot"/>
+      </p:par>
+    </p:tnLst>
+  </p:timing>
 </p:sld>
 </file>
 
@@ -5858,6 +5872,65 @@
           </a:p>
         </p:txBody>
       </p:sp>
+      <p:pic>
+        <p:nvPicPr>
+          <p:cNvPr id="18" name="Picture 17"/>
+          <p:cNvPicPr>
+            <a:picLocks noChangeAspect="1"/>
+          </p:cNvPicPr>
+          <p:nvPr/>
+        </p:nvPicPr>
+        <p:blipFill rotWithShape="1">
+          <a:blip r:embed="rId2">
+            <a:extLst>
+              <a:ext uri="{28A0092B-C50C-407E-A947-70E740481C1C}">
+                <a14:useLocalDpi xmlns:a14="http://schemas.microsoft.com/office/drawing/2010/main" val="0"/>
+              </a:ext>
+            </a:extLst>
+          </a:blip>
+          <a:srcRect l="-249" t="21644" r="97645" b="67659"/>
+          <a:stretch/>
+        </p:blipFill>
+        <p:spPr>
+          <a:xfrm>
+            <a:off x="1131248" y="5062272"/>
+            <a:ext cx="276447" cy="340242"/>
+          </a:xfrm>
+          <a:prstGeom prst="rect">
+            <a:avLst/>
+          </a:prstGeom>
+        </p:spPr>
+      </p:pic>
+      <p:pic>
+        <p:nvPicPr>
+          <p:cNvPr id="21" name="Picture 20"/>
+          <p:cNvPicPr>
+            <a:picLocks noChangeAspect="1"/>
+          </p:cNvPicPr>
+          <p:nvPr/>
+        </p:nvPicPr>
+        <p:blipFill>
+          <a:blip r:embed="rId3">
+            <a:extLst>
+              <a:ext uri="{28A0092B-C50C-407E-A947-70E740481C1C}">
+                <a14:useLocalDpi xmlns:a14="http://schemas.microsoft.com/office/drawing/2010/main" val="0"/>
+              </a:ext>
+            </a:extLst>
+          </a:blip>
+          <a:stretch>
+            <a:fillRect/>
+          </a:stretch>
+        </p:blipFill>
+        <p:spPr>
+          <a:xfrm>
+            <a:off x="1604652" y="5085339"/>
+            <a:ext cx="294759" cy="300539"/>
+          </a:xfrm>
+          <a:prstGeom prst="rect">
+            <a:avLst/>
+          </a:prstGeom>
+        </p:spPr>
+      </p:pic>
     </p:spTree>
     <p:extLst>
       <p:ext uri="{BB962C8B-B14F-4D97-AF65-F5344CB8AC3E}">
@@ -6398,8 +6471,8 @@
         </p:blipFill>
         <p:spPr>
           <a:xfrm>
-            <a:off x="121556" y="2767380"/>
-            <a:ext cx="11732987" cy="2093989"/>
+            <a:off x="121557" y="2767380"/>
+            <a:ext cx="11732985" cy="2093989"/>
           </a:xfrm>
           <a:prstGeom prst="rect">
             <a:avLst/>
@@ -6687,7 +6760,7 @@
           <p:nvPr>
             <p:extLst>
               <p:ext uri="{D42A27DB-BD31-4B8C-83A1-F6EECF244321}">
-                <p14:modId xmlns:p14="http://schemas.microsoft.com/office/powerpoint/2010/main" val="216025608"/>
+                <p14:modId xmlns:p14="http://schemas.microsoft.com/office/powerpoint/2010/main" val="1221533955"/>
               </p:ext>
             </p:extLst>
           </p:nvPr>
@@ -6790,7 +6863,7 @@
                       </a:r>
                       <a:r>
                         <a:rPr lang="en-US" sz="1800" b="1" baseline="0"/>
-                        <a:t> "n-1"-gram</a:t>
+                        <a:t> (n-1)-gram</a:t>
                       </a:r>
                       <a:endParaRPr lang="en-US" sz="1800" b="1"/>
                     </a:p>
@@ -8086,6 +8159,13 @@
   <p:clrMapOvr>
     <a:masterClrMapping/>
   </p:clrMapOvr>
+  <p:timing>
+    <p:tnLst>
+      <p:par>
+        <p:cTn id="1" dur="indefinite" restart="never" nodeType="tmRoot"/>
+      </p:par>
+    </p:tnLst>
+  </p:timing>
 </p:sld>
 </file>
 
@@ -8246,7 +8326,7 @@
           <a:graphicData uri="http://schemas.openxmlformats.org/presentationml/2006/ole">
             <mc:AlternateContent xmlns:mc="http://schemas.openxmlformats.org/markup-compatibility/2006">
               <mc:Choice xmlns:v="urn:schemas-microsoft-com:vml" Requires="v">
-                <p:oleObj spid="_x0000_s1067" name="Worksheet" r:id="rId5" imgW="1892300" imgH="1193800" progId="Excel.Sheet.12">
+                <p:oleObj spid="_x0000_s1076" name="Worksheet" r:id="rId5" imgW="1892300" imgH="1193800" progId="Excel.Sheet.12">
                   <p:embed/>
                 </p:oleObj>
               </mc:Choice>
@@ -8303,7 +8383,7 @@
           <a:graphicData uri="http://schemas.openxmlformats.org/presentationml/2006/ole">
             <mc:AlternateContent xmlns:mc="http://schemas.openxmlformats.org/markup-compatibility/2006">
               <mc:Choice xmlns:v="urn:schemas-microsoft-com:vml" Requires="v">
-                <p:oleObj spid="_x0000_s1068" name="Worksheet" r:id="rId7" imgW="1892300" imgH="1193800" progId="Excel.Sheet.12">
+                <p:oleObj spid="_x0000_s1077" name="Worksheet" r:id="rId7" imgW="1892300" imgH="1193800" progId="Excel.Sheet.12">
                   <p:embed/>
                 </p:oleObj>
               </mc:Choice>
@@ -8348,6 +8428,13 @@
   <p:clrMapOvr>
     <a:masterClrMapping/>
   </p:clrMapOvr>
+  <p:timing>
+    <p:tnLst>
+      <p:par>
+        <p:cTn id="1" dur="indefinite" restart="never" nodeType="tmRoot"/>
+      </p:par>
+    </p:tnLst>
+  </p:timing>
 </p:sld>
 </file>
 
@@ -8415,6 +8502,17 @@
                 <a:satMod val="400000"/>
               </a:srgbClr>
             </a:duotone>
+            <a:extLst>
+              <a:ext uri="{BEBA8EAE-BF5A-486C-A8C5-ECC9F3942E4B}">
+                <a14:imgProps xmlns:a14="http://schemas.microsoft.com/office/drawing/2010/main">
+                  <a14:imgLayer r:embed="rId4">
+                    <a14:imgEffect>
+                      <a14:brightnessContrast bright="40000"/>
+                    </a14:imgEffect>
+                  </a14:imgLayer>
+                </a14:imgProps>
+              </a:ext>
+            </a:extLst>
           </a:blip>
           <a:stretch>
             <a:fillRect/>
@@ -8440,6 +8538,13 @@
   <p:clrMapOvr>
     <a:masterClrMapping/>
   </p:clrMapOvr>
+  <p:timing>
+    <p:tnLst>
+      <p:par>
+        <p:cTn id="1" dur="indefinite" restart="never" nodeType="tmRoot"/>
+      </p:par>
+    </p:tnLst>
+  </p:timing>
 </p:sld>
 </file>
 
@@ -8638,6 +8743,13 @@
   <p:clrMapOvr>
     <a:masterClrMapping/>
   </p:clrMapOvr>
+  <p:timing>
+    <p:tnLst>
+      <p:par>
+        <p:cTn id="1" dur="indefinite" restart="never" nodeType="tmRoot"/>
+      </p:par>
+    </p:tnLst>
+  </p:timing>
 </p:sld>
 </file>
 
@@ -8848,6 +8960,13 @@
   <p:clrMapOvr>
     <a:masterClrMapping/>
   </p:clrMapOvr>
+  <p:timing>
+    <p:tnLst>
+      <p:par>
+        <p:cTn id="1" dur="indefinite" restart="never" nodeType="tmRoot"/>
+      </p:par>
+    </p:tnLst>
+  </p:timing>
 </p:sld>
 </file>
 

</xml_diff>